<commit_message>
Fixed errors on R Guide
</commit_message>
<xml_diff>
--- a/resources/MTH107-RGuide.pptx
+++ b/resources/MTH107-RGuide.pptx
@@ -1312,7 +1312,7 @@
           </a:ln>
           <a:extLst>
             <a:ext uri="{C572A759-6A51-4108-AA02-DFA0A04FC94B}">
-              <ma14:wrappingTextBoxFlag xmlns="" xmlns:ma14="http://schemas.microsoft.com/office/mac/drawingml/2011/main" val="1"/>
+              <ma14:wrappingTextBoxFlag xmlns:ma14="http://schemas.microsoft.com/office/mac/drawingml/2011/main" xmlns="" val="1"/>
             </a:ext>
           </a:extLst>
         </p:spPr>
@@ -1355,7 +1355,7 @@
           </a:ln>
           <a:extLst>
             <a:ext uri="{C572A759-6A51-4108-AA02-DFA0A04FC94B}">
-              <ma14:wrappingTextBoxFlag xmlns="" xmlns:ma14="http://schemas.microsoft.com/office/mac/drawingml/2011/main" val="1"/>
+              <ma14:wrappingTextBoxFlag xmlns:ma14="http://schemas.microsoft.com/office/mac/drawingml/2011/main" xmlns="" val="1"/>
             </a:ext>
           </a:extLst>
         </p:spPr>
@@ -2553,13 +2553,7 @@
                 <a:rPr lang="en-US" sz="800" dirty="0" smtClean="0">
                   <a:latin typeface="Source Sans Pro Light"/>
                 </a:rPr>
-                <a:t> and put </a:t>
-              </a:r>
-              <a:r>
-                <a:rPr lang="en-US" sz="800" dirty="0" smtClean="0">
-                  <a:latin typeface="Source Sans Pro Light"/>
-                </a:rPr>
-                <a:t>in the </a:t>
+                <a:t> and put in the </a:t>
               </a:r>
               <a:r>
                 <a:rPr lang="en-US" sz="800" dirty="0" err="1" smtClean="0">
@@ -3227,19 +3221,7 @@
                 <a:rPr lang="en-US" sz="800" dirty="0" smtClean="0">
                   <a:latin typeface="Source Sans Pro Light"/>
                 </a:rPr>
-                <a:t> replaced by a number or category </a:t>
-              </a:r>
-              <a:r>
-                <a:rPr lang="en-US" sz="800" dirty="0" smtClean="0">
-                  <a:latin typeface="Source Sans Pro Light"/>
-                </a:rPr>
-                <a:t>name </a:t>
-              </a:r>
-              <a:r>
-                <a:rPr lang="en-US" sz="800" dirty="0" smtClean="0">
-                  <a:latin typeface="Source Sans Pro Light"/>
-                </a:rPr>
-                <a:t>(</a:t>
+                <a:t> replaced by a number or category name (</a:t>
               </a:r>
               <a:r>
                 <a:rPr lang="en-US" sz="800" i="1" dirty="0" smtClean="0">
@@ -3304,7 +3286,7 @@
             </a:ln>
             <a:extLst>
               <a:ext uri="{C572A759-6A51-4108-AA02-DFA0A04FC94B}">
-                <ma14:wrappingTextBoxFlag xmlns="" xmlns:ma14="http://schemas.microsoft.com/office/mac/drawingml/2011/main" val="1"/>
+                <ma14:wrappingTextBoxFlag xmlns:ma14="http://schemas.microsoft.com/office/mac/drawingml/2011/main" xmlns="" val="1"/>
               </a:ext>
             </a:extLst>
           </p:spPr>
@@ -4624,16 +4606,7 @@
                   <a:cs typeface="Source Sans Pro Light"/>
                   <a:sym typeface="Source Sans Pro Light"/>
                 </a:rPr>
-                <a:t> into</a:t>
-              </a:r>
-              <a:r>
-                <a:rPr lang="en-US" sz="800" dirty="0" smtClean="0">
-                  <a:latin typeface="Source Sans Pro Light"/>
-                  <a:ea typeface="Source Sans Pro Light"/>
-                  <a:cs typeface="Source Sans Pro Light"/>
-                  <a:sym typeface="Source Sans Pro Light"/>
-                </a:rPr>
-                <a:t> </a:t>
+                <a:t> into </a:t>
               </a:r>
               <a:r>
                 <a:rPr lang="en-US" sz="800" dirty="0" err="1" smtClean="0">
@@ -4793,7 +4766,7 @@
             </a:ln>
             <a:extLst>
               <a:ext uri="{C572A759-6A51-4108-AA02-DFA0A04FC94B}">
-                <ma14:wrappingTextBoxFlag xmlns="" xmlns:ma14="http://schemas.microsoft.com/office/mac/drawingml/2011/main" val="1"/>
+                <ma14:wrappingTextBoxFlag xmlns:ma14="http://schemas.microsoft.com/office/mac/drawingml/2011/main" xmlns="" val="1"/>
               </a:ext>
             </a:extLst>
           </p:spPr>
@@ -6282,7 +6255,7 @@
             </a:ln>
             <a:extLst>
               <a:ext uri="{C572A759-6A51-4108-AA02-DFA0A04FC94B}">
-                <ma14:wrappingTextBoxFlag xmlns="" xmlns:ma14="http://schemas.microsoft.com/office/mac/drawingml/2011/main" val="1"/>
+                <ma14:wrappingTextBoxFlag xmlns:ma14="http://schemas.microsoft.com/office/mac/drawingml/2011/main" xmlns="" val="1"/>
               </a:ext>
             </a:extLst>
           </p:spPr>
@@ -6535,16 +6508,7 @@
                   </a:solidFill>
                   <a:latin typeface="Source Sans Pro Semibold"/>
                 </a:rPr>
-                <a:t> </a:t>
-              </a:r>
-              <a:r>
-                <a:rPr lang="en-US" sz="800" dirty="0" smtClean="0">
-                  <a:solidFill>
-                    <a:srgbClr val="C00000"/>
-                  </a:solidFill>
-                  <a:latin typeface="Source Sans Pro Semibold"/>
-                </a:rPr>
-                <a:t>label</a:t>
+                <a:t> label</a:t>
               </a:r>
               <a:r>
                 <a:rPr lang="en-US" sz="800" b="1" dirty="0" smtClean="0">
@@ -7046,13 +7010,6 @@
                 </a:rPr>
                 <a:t>(freq2,digits=1,margin=1)</a:t>
               </a:r>
-              <a:endParaRPr lang="en-US" sz="600" b="1" dirty="0">
-                <a:solidFill>
-                  <a:srgbClr val="C00000"/>
-                </a:solidFill>
-                <a:latin typeface="Courier New" panose="02070309020205020404" pitchFamily="49" charset="0"/>
-                <a:cs typeface="Courier New" panose="02070309020205020404" pitchFamily="49" charset="0"/>
-              </a:endParaRPr>
             </a:p>
             <a:p>
               <a:pPr algn="l" latinLnBrk="1"/>
@@ -7160,13 +7117,6 @@
                 </a:rPr>
                 <a:t>(freq2,digits=1,margin=2)</a:t>
               </a:r>
-              <a:endParaRPr lang="en-US" sz="600" b="1" dirty="0">
-                <a:solidFill>
-                  <a:srgbClr val="C00000"/>
-                </a:solidFill>
-                <a:latin typeface="Courier New" panose="02070309020205020404" pitchFamily="49" charset="0"/>
-                <a:cs typeface="Courier New" panose="02070309020205020404" pitchFamily="49" charset="0"/>
-              </a:endParaRPr>
             </a:p>
             <a:p>
               <a:pPr algn="l" latinLnBrk="1"/>
@@ -7487,7 +7437,7 @@
             </a:ln>
             <a:extLst>
               <a:ext uri="{C572A759-6A51-4108-AA02-DFA0A04FC94B}">
-                <ma14:wrappingTextBoxFlag xmlns="" xmlns:ma14="http://schemas.microsoft.com/office/mac/drawingml/2011/main" val="1"/>
+                <ma14:wrappingTextBoxFlag xmlns:ma14="http://schemas.microsoft.com/office/mac/drawingml/2011/main" xmlns="" val="1"/>
               </a:ext>
             </a:extLst>
           </p:spPr>
@@ -7661,16 +7611,7 @@
                   </a:solidFill>
                   <a:latin typeface="Source Sans Pro Semibold"/>
                 </a:rPr>
-                <a:t>(freq2,digits=1</a:t>
-              </a:r>
-              <a:r>
-                <a:rPr lang="en-US" sz="800" dirty="0" smtClean="0">
-                  <a:solidFill>
-                    <a:srgbClr val="C00000"/>
-                  </a:solidFill>
-                  <a:latin typeface="Source Sans Pro Semibold"/>
-                </a:rPr>
-                <a:t>)                               </a:t>
+                <a:t>(freq2,digits=1)                               </a:t>
               </a:r>
               <a:r>
                 <a:rPr lang="en-US" sz="800" dirty="0">
@@ -8095,16 +8036,7 @@
                   <a:cs typeface="Source Sans Pro Light"/>
                   <a:sym typeface="Source Sans Pro Light"/>
                 </a:rPr>
-                <a:t>Histograms and s</a:t>
-              </a:r>
-              <a:r>
-                <a:rPr lang="en-US" sz="800" dirty="0" smtClean="0">
-                  <a:latin typeface="Source Sans Pro Light"/>
-                  <a:ea typeface="Source Sans Pro Light"/>
-                  <a:cs typeface="Source Sans Pro Light"/>
-                  <a:sym typeface="Source Sans Pro Light"/>
-                </a:rPr>
-                <a:t>ummary </a:t>
+                <a:t>Histograms and summary </a:t>
               </a:r>
               <a:r>
                 <a:rPr lang="en-US" sz="800" dirty="0">
@@ -8545,7 +8477,7 @@
                   <a:latin typeface="Courier New" panose="02070309020205020404" pitchFamily="49" charset="0"/>
                   <a:cs typeface="Courier New" panose="02070309020205020404" pitchFamily="49" charset="0"/>
                 </a:rPr>
-                <a:t>="Highway MPG</a:t>
+                <a:t>="Highway </a:t>
               </a:r>
               <a:r>
                 <a:rPr lang="en-US" sz="600" b="1" dirty="0" smtClean="0">
@@ -8555,8 +8487,15 @@
                   <a:latin typeface="Courier New" panose="02070309020205020404" pitchFamily="49" charset="0"/>
                   <a:cs typeface="Courier New" panose="02070309020205020404" pitchFamily="49" charset="0"/>
                 </a:rPr>
-                <a:t>")</a:t>
-              </a:r>
+                <a:t>MPG“,</a:t>
+              </a:r>
+              <a:endParaRPr lang="en-US" sz="600" b="1" dirty="0" smtClean="0">
+                <a:solidFill>
+                  <a:srgbClr val="C00000"/>
+                </a:solidFill>
+                <a:latin typeface="Courier New" panose="02070309020205020404" pitchFamily="49" charset="0"/>
+                <a:cs typeface="Courier New" panose="02070309020205020404" pitchFamily="49" charset="0"/>
+              </a:endParaRPr>
             </a:p>
             <a:p>
               <a:pPr algn="l" latinLnBrk="1"/>
@@ -8638,6 +8577,26 @@
                 <a:t>corr</a:t>
               </a:r>
               <a:r>
+                <a:rPr lang="en-US" sz="600" b="1" dirty="0">
+                  <a:solidFill>
+                    <a:srgbClr val="C00000"/>
+                  </a:solidFill>
+                  <a:latin typeface="Courier New" panose="02070309020205020404" pitchFamily="49" charset="0"/>
+                  <a:cs typeface="Courier New" panose="02070309020205020404" pitchFamily="49" charset="0"/>
+                </a:rPr>
+                <a:t>(~</a:t>
+              </a:r>
+              <a:r>
+                <a:rPr lang="en-US" sz="600" b="1" dirty="0" err="1" smtClean="0">
+                  <a:solidFill>
+                    <a:srgbClr val="C00000"/>
+                  </a:solidFill>
+                  <a:latin typeface="Courier New" panose="02070309020205020404" pitchFamily="49" charset="0"/>
+                  <a:cs typeface="Courier New" panose="02070309020205020404" pitchFamily="49" charset="0"/>
+                </a:rPr>
+                <a:t>HMPG+Weight,data</a:t>
+              </a:r>
+              <a:r>
                 <a:rPr lang="en-US" sz="600" b="1" dirty="0" smtClean="0">
                   <a:solidFill>
                     <a:srgbClr val="C00000"/>
@@ -8645,7 +8604,7 @@
                   <a:latin typeface="Courier New" panose="02070309020205020404" pitchFamily="49" charset="0"/>
                   <a:cs typeface="Courier New" panose="02070309020205020404" pitchFamily="49" charset="0"/>
                 </a:rPr>
-                <a:t>(</a:t>
+                <a:t>=</a:t>
               </a:r>
               <a:r>
                 <a:rPr lang="en-US" sz="600" b="1" dirty="0" err="1" smtClean="0">
@@ -8655,7 +8614,7 @@
                   <a:latin typeface="Courier New" panose="02070309020205020404" pitchFamily="49" charset="0"/>
                   <a:cs typeface="Courier New" panose="02070309020205020404" pitchFamily="49" charset="0"/>
                 </a:rPr>
-                <a:t>HMPG~Weight,data</a:t>
+                <a:t>dfcar,digits</a:t>
               </a:r>
               <a:r>
                 <a:rPr lang="en-US" sz="600" b="1" dirty="0" smtClean="0">
@@ -8665,17 +8624,7 @@
                   <a:latin typeface="Courier New" panose="02070309020205020404" pitchFamily="49" charset="0"/>
                   <a:cs typeface="Courier New" panose="02070309020205020404" pitchFamily="49" charset="0"/>
                 </a:rPr>
-                <a:t>=</a:t>
-              </a:r>
-              <a:r>
-                <a:rPr lang="en-US" sz="600" b="1" dirty="0" err="1" smtClean="0">
-                  <a:solidFill>
-                    <a:srgbClr val="C00000"/>
-                  </a:solidFill>
-                  <a:latin typeface="Courier New" panose="02070309020205020404" pitchFamily="49" charset="0"/>
-                  <a:cs typeface="Courier New" panose="02070309020205020404" pitchFamily="49" charset="0"/>
-                </a:rPr>
-                <a:t>dfcar,digits</a:t>
+                <a:t>=3</a:t>
               </a:r>
               <a:r>
                 <a:rPr lang="en-US" sz="600" b="1" dirty="0" smtClean="0">
@@ -8685,7 +8634,7 @@
                   <a:latin typeface="Courier New" panose="02070309020205020404" pitchFamily="49" charset="0"/>
                   <a:cs typeface="Courier New" panose="02070309020205020404" pitchFamily="49" charset="0"/>
                 </a:rPr>
-                <a:t>=3)</a:t>
+                <a:t>)</a:t>
               </a:r>
               <a:endParaRPr lang="en-US" sz="600" b="1" dirty="0">
                 <a:solidFill>
@@ -8801,16 +8750,7 @@
                   <a:cs typeface="Source Sans Pro Light"/>
                   <a:sym typeface="Source Sans Pro Light"/>
                 </a:rPr>
-                <a:t>Scatterplot and c</a:t>
-              </a:r>
-              <a:r>
-                <a:rPr lang="en-US" sz="800" dirty="0" smtClean="0">
-                  <a:latin typeface="Source Sans Pro Light"/>
-                  <a:ea typeface="Source Sans Pro Light"/>
-                  <a:cs typeface="Source Sans Pro Light"/>
-                  <a:sym typeface="Source Sans Pro Light"/>
-                </a:rPr>
-                <a:t>orrelation coefficient (r) for </a:t>
+                <a:t>Scatterplot and correlation coefficient (r) for </a:t>
               </a:r>
               <a:r>
                 <a:rPr lang="en-US" sz="800" dirty="0">
@@ -9531,61 +9471,25 @@
                   <a:cs typeface="Source Sans Pro Light"/>
                   <a:sym typeface="Source Sans Pro Light"/>
                 </a:rPr>
-                <a:t>Scatterplot and c</a:t>
-              </a:r>
-              <a:r>
-                <a:rPr lang="en-US" sz="800" dirty="0" smtClean="0">
+                <a:t>Scatterplot and correlation coefficient </a:t>
+              </a:r>
+              <a:r>
+                <a:rPr lang="en-US" sz="800" dirty="0">
                   <a:latin typeface="Source Sans Pro Light"/>
                   <a:ea typeface="Source Sans Pro Light"/>
                   <a:cs typeface="Source Sans Pro Light"/>
                   <a:sym typeface="Source Sans Pro Light"/>
                 </a:rPr>
-                <a:t>orrelation coefficient </a:t>
-              </a:r>
-              <a:r>
-                <a:rPr lang="en-US" sz="800" dirty="0">
+                <a:t>(r) </a:t>
+              </a:r>
+              <a:r>
+                <a:rPr lang="en-US" sz="800" dirty="0" smtClean="0">
                   <a:latin typeface="Source Sans Pro Light"/>
                   <a:ea typeface="Source Sans Pro Light"/>
                   <a:cs typeface="Source Sans Pro Light"/>
                   <a:sym typeface="Source Sans Pro Light"/>
                 </a:rPr>
-                <a:t>(r) </a:t>
-              </a:r>
-              <a:r>
-                <a:rPr lang="en-US" sz="800" dirty="0" smtClean="0">
-                  <a:latin typeface="Source Sans Pro Light"/>
-                  <a:ea typeface="Source Sans Pro Light"/>
-                  <a:cs typeface="Source Sans Pro Light"/>
-                  <a:sym typeface="Source Sans Pro Light"/>
-                </a:rPr>
-                <a:t>for </a:t>
-              </a:r>
-              <a:r>
-                <a:rPr lang="en-US" sz="800" dirty="0" smtClean="0">
-                  <a:latin typeface="Source Sans Pro Light"/>
-                  <a:ea typeface="Source Sans Pro Light"/>
-                  <a:cs typeface="Source Sans Pro Light"/>
-                  <a:sym typeface="Source Sans Pro Light"/>
-                </a:rPr>
-                <a:t>all </a:t>
-              </a:r>
-              <a:r>
-                <a:rPr lang="en-US" sz="800" dirty="0" smtClean="0">
-                  <a:latin typeface="Source Sans Pro Light"/>
-                  <a:ea typeface="Source Sans Pro Light"/>
-                  <a:cs typeface="Source Sans Pro Light"/>
-                  <a:sym typeface="Source Sans Pro Light"/>
-                </a:rPr>
-                <a:t>pairs </a:t>
-              </a:r>
-              <a:r>
-                <a:rPr lang="en-US" sz="800" dirty="0" smtClean="0">
-                  <a:latin typeface="Source Sans Pro Light"/>
-                  <a:ea typeface="Source Sans Pro Light"/>
-                  <a:cs typeface="Source Sans Pro Light"/>
-                  <a:sym typeface="Source Sans Pro Light"/>
-                </a:rPr>
-                <a:t>of quantitative variables.</a:t>
+                <a:t>for all pairs of quantitative variables.</a:t>
               </a:r>
               <a:endParaRPr lang="en-US" sz="800" dirty="0">
                 <a:latin typeface="Source Sans Pro Light"/>
@@ -10447,19 +10351,7 @@
                   <a:cs typeface="Source Sans Pro Light"/>
                   <a:sym typeface="Source Sans Pro Light"/>
                 </a:rPr>
-                <a:t>q</a:t>
-              </a:r>
-              <a:r>
-                <a:rPr lang="en-US" sz="800" dirty="0" err="1" smtClean="0">
-                  <a:solidFill>
-                    <a:srgbClr val="C00000"/>
-                  </a:solidFill>
-                  <a:latin typeface="Source Sans Pro Semibold"/>
-                  <a:ea typeface="Source Sans Pro Light"/>
-                  <a:cs typeface="Source Sans Pro Light"/>
-                  <a:sym typeface="Source Sans Pro Light"/>
-                </a:rPr>
-                <a:t>varExpl</a:t>
+                <a:t>qvarExpl</a:t>
               </a:r>
               <a:r>
                 <a:rPr lang="en-US" sz="800" dirty="0" smtClean="0">
@@ -10623,7 +10515,7 @@
             </a:ln>
             <a:extLst>
               <a:ext uri="{C572A759-6A51-4108-AA02-DFA0A04FC94B}">
-                <ma14:wrappingTextBoxFlag xmlns="" xmlns:ma14="http://schemas.microsoft.com/office/mac/drawingml/2011/main" val="1"/>
+                <ma14:wrappingTextBoxFlag xmlns:ma14="http://schemas.microsoft.com/office/mac/drawingml/2011/main" xmlns="" val="1"/>
               </a:ext>
             </a:extLst>
           </p:spPr>
@@ -10749,34 +10641,7 @@
                   </a:solidFill>
                   <a:latin typeface="Source Sans Pro Semibold"/>
                 </a:rPr>
-                <a:t>q</a:t>
-              </a:r>
-              <a:r>
-                <a:rPr lang="en-US" sz="800" dirty="0" err="1" smtClean="0">
-                  <a:solidFill>
-                    <a:srgbClr val="C00000"/>
-                  </a:solidFill>
-                  <a:latin typeface="Source Sans Pro Semibold"/>
-                </a:rPr>
-                <a:t>varResp~qvarEx</a:t>
-              </a:r>
-              <a:r>
-                <a:rPr lang="en-US" sz="800" dirty="0" err="1" smtClean="0">
-                  <a:solidFill>
-                    <a:srgbClr val="C00000"/>
-                  </a:solidFill>
-                  <a:latin typeface="Source Sans Pro Semibold"/>
-                </a:rPr>
-                <a:t>pl</a:t>
-              </a:r>
-              <a:r>
-                <a:rPr lang="en-US" sz="800" dirty="0" err="1" smtClean="0">
-                  <a:solidFill>
-                    <a:srgbClr val="C00000"/>
-                  </a:solidFill>
-                  <a:latin typeface="Source Sans Pro Semibold"/>
-                </a:rPr>
-                <a:t>,data</a:t>
+                <a:t>qvarResp~qvarExpl,data</a:t>
               </a:r>
               <a:r>
                 <a:rPr lang="en-US" sz="800" dirty="0" smtClean="0">
@@ -11881,19 +11746,7 @@
                 <a:rPr lang="en-US" sz="800" dirty="0" smtClean="0">
                   <a:latin typeface="Source Sans Pro Light"/>
                 </a:rPr>
-                <a:t>the </a:t>
-              </a:r>
-              <a:r>
-                <a:rPr lang="en-US" sz="800" dirty="0" smtClean="0">
-                  <a:latin typeface="Source Sans Pro Light"/>
-                </a:rPr>
-                <a:t>quantitative </a:t>
-              </a:r>
-              <a:r>
-                <a:rPr lang="en-US" sz="800" dirty="0" smtClean="0">
-                  <a:latin typeface="Source Sans Pro Light"/>
-                </a:rPr>
-                <a:t>response variable </a:t>
+                <a:t>the quantitative response variable </a:t>
               </a:r>
               <a:r>
                 <a:rPr lang="en-US" sz="800" dirty="0">
@@ -12258,7 +12111,7 @@
             </a:ln>
             <a:extLst>
               <a:ext uri="{C572A759-6A51-4108-AA02-DFA0A04FC94B}">
-                <ma14:wrappingTextBoxFlag xmlns="" xmlns:ma14="http://schemas.microsoft.com/office/mac/drawingml/2011/main" val="1"/>
+                <ma14:wrappingTextBoxFlag xmlns:ma14="http://schemas.microsoft.com/office/mac/drawingml/2011/main" xmlns="" val="1"/>
               </a:ext>
             </a:extLst>
           </p:spPr>
@@ -13096,13 +12949,7 @@
                 <a:rPr lang="en-US" sz="800" dirty="0" smtClean="0">
                   <a:latin typeface="Source Sans Pro Light"/>
                 </a:rPr>
-                <a:t>frequency table </a:t>
-              </a:r>
-              <a:r>
-                <a:rPr lang="en-US" sz="800" dirty="0" smtClean="0">
-                  <a:latin typeface="Source Sans Pro Light"/>
-                </a:rPr>
-                <a:t>in </a:t>
+                <a:t>frequency table in </a:t>
               </a:r>
               <a:r>
                 <a:rPr lang="en-US" sz="800" dirty="0" err="1" smtClean="0">
@@ -13162,49 +13009,19 @@
                   <a:cs typeface="Source Sans Pro Light"/>
                   <a:sym typeface="Source Sans Pro Light"/>
                 </a:rPr>
-                <a:t>categorical r</a:t>
-              </a:r>
-              <a:r>
-                <a:rPr lang="en-US" sz="800" dirty="0" smtClean="0">
-                  <a:latin typeface="Source Sans Pro Light"/>
+                <a:t>categorical response variable in columns and the populations in </a:t>
+              </a:r>
+              <a:r>
+                <a:rPr lang="en-US" sz="800" dirty="0" err="1" smtClean="0">
+                  <a:solidFill>
+                    <a:srgbClr val="C00000"/>
+                  </a:solidFill>
+                  <a:latin typeface="Source Sans Pro Semibold"/>
                   <a:ea typeface="Source Sans Pro Light"/>
                   <a:cs typeface="Source Sans Pro Light"/>
                   <a:sym typeface="Source Sans Pro Light"/>
                 </a:rPr>
-                <a:t>esponse </a:t>
-              </a:r>
-              <a:r>
-                <a:rPr lang="en-US" sz="800" dirty="0" smtClean="0">
-                  <a:latin typeface="Source Sans Pro Light"/>
-                  <a:ea typeface="Source Sans Pro Light"/>
-                  <a:cs typeface="Source Sans Pro Light"/>
-                  <a:sym typeface="Source Sans Pro Light"/>
-                </a:rPr>
-                <a:t>variable in columns and the populations in </a:t>
-              </a:r>
-              <a:r>
-                <a:rPr lang="en-US" sz="800" dirty="0" err="1" smtClean="0">
-                  <a:solidFill>
-                    <a:srgbClr val="C00000"/>
-                  </a:solidFill>
-                  <a:latin typeface="Source Sans Pro Semibold"/>
-                  <a:ea typeface="Source Sans Pro Light"/>
-                  <a:cs typeface="Source Sans Pro Light"/>
-                  <a:sym typeface="Source Sans Pro Light"/>
-                </a:rPr>
-                <a:t>c</a:t>
-              </a:r>
-              <a:r>
-                <a:rPr lang="en-US" sz="800" dirty="0" err="1" smtClean="0">
-                  <a:solidFill>
-                    <a:srgbClr val="C00000"/>
-                  </a:solidFill>
-                  <a:latin typeface="Source Sans Pro Semibold"/>
-                  <a:ea typeface="Source Sans Pro Light"/>
-                  <a:cs typeface="Source Sans Pro Light"/>
-                  <a:sym typeface="Source Sans Pro Light"/>
-                </a:rPr>
-                <a:t>varPop</a:t>
+                <a:t>cvarPop</a:t>
               </a:r>
               <a:r>
                 <a:rPr lang="en-US" sz="800" dirty="0" smtClean="0">
@@ -13269,13 +13086,7 @@
                 <a:rPr lang="en-US" sz="800" dirty="0" smtClean="0">
                   <a:latin typeface="Source Sans Pro Light"/>
                 </a:rPr>
-                <a:t>Extract </a:t>
-              </a:r>
-              <a:r>
-                <a:rPr lang="en-US" sz="800" dirty="0" smtClean="0">
-                  <a:latin typeface="Source Sans Pro Light"/>
-                </a:rPr>
-                <a:t>expected </a:t>
+                <a:t>Extract expected </a:t>
               </a:r>
               <a:r>
                 <a:rPr lang="en-US" sz="800" dirty="0">
@@ -13340,7 +13151,7 @@
             </a:ln>
             <a:extLst>
               <a:ext uri="{C572A759-6A51-4108-AA02-DFA0A04FC94B}">
-                <ma14:wrappingTextBoxFlag xmlns="" xmlns:ma14="http://schemas.microsoft.com/office/mac/drawingml/2011/main" val="1"/>
+                <ma14:wrappingTextBoxFlag xmlns:ma14="http://schemas.microsoft.com/office/mac/drawingml/2011/main" xmlns="" val="1"/>
               </a:ext>
             </a:extLst>
           </p:spPr>
@@ -13730,16 +13541,7 @@
                   </a:solidFill>
                   <a:latin typeface="Source Sans Pro Semibold"/>
                 </a:rPr>
-                <a:t>)       </a:t>
-              </a:r>
-              <a:r>
-                <a:rPr lang="en-US" sz="800" dirty="0" smtClean="0">
-                  <a:solidFill>
-                    <a:srgbClr val="C00000"/>
-                  </a:solidFill>
-                  <a:latin typeface="Source Sans Pro Semibold"/>
-                </a:rPr>
-                <a:t># row percent table</a:t>
+                <a:t>)       # row percent table</a:t>
               </a:r>
               <a:endParaRPr lang="en-US" sz="800" dirty="0">
                 <a:solidFill>
@@ -14423,19 +14225,7 @@
                 <a:rPr lang="en-US" sz="800" dirty="0" smtClean="0">
                   <a:latin typeface="Source Sans Pro Light"/>
                 </a:rPr>
-                <a:t>a </a:t>
-              </a:r>
-              <a:r>
-                <a:rPr lang="en-US" sz="800" dirty="0" smtClean="0">
-                  <a:latin typeface="Source Sans Pro Light"/>
-                </a:rPr>
-                <a:t>percentage, but entered </a:t>
-              </a:r>
-              <a:r>
-                <a:rPr lang="en-US" sz="800" dirty="0" smtClean="0">
-                  <a:latin typeface="Source Sans Pro Light"/>
-                </a:rPr>
-                <a:t>as </a:t>
+                <a:t>a percentage, but entered as </a:t>
               </a:r>
               <a:r>
                 <a:rPr lang="en-US" sz="800" dirty="0">
@@ -14732,7 +14522,7 @@
             </a:ln>
             <a:extLst>
               <a:ext uri="{C572A759-6A51-4108-AA02-DFA0A04FC94B}">
-                <ma14:wrappingTextBoxFlag xmlns="" xmlns:ma14="http://schemas.microsoft.com/office/mac/drawingml/2011/main" val="1"/>
+                <ma14:wrappingTextBoxFlag xmlns:ma14="http://schemas.microsoft.com/office/mac/drawingml/2011/main" xmlns="" val="1"/>
               </a:ext>
             </a:extLst>
           </p:spPr>
@@ -16070,19 +15860,7 @@
                 <a:rPr lang="en-US" sz="800" dirty="0">
                   <a:latin typeface="Source Sans Pro Light"/>
                 </a:rPr>
-                <a:t>is the confidence </a:t>
-              </a:r>
-              <a:r>
-                <a:rPr lang="en-US" sz="800" dirty="0">
-                  <a:latin typeface="Source Sans Pro Light"/>
-                </a:rPr>
-                <a:t>level as a proportion </a:t>
-              </a:r>
-              <a:r>
-                <a:rPr lang="en-US" sz="800" dirty="0">
-                  <a:latin typeface="Source Sans Pro Light"/>
-                </a:rPr>
-                <a:t>(e.g., 0.95)</a:t>
+                <a:t>is the confidence level as a proportion (e.g., 0.95)</a:t>
               </a:r>
             </a:p>
             <a:p>
@@ -16118,16 +15896,7 @@
                   </a:solidFill>
                   <a:latin typeface="Source Sans Pro Light"/>
                 </a:rPr>
-                <a:t> </a:t>
-              </a:r>
-              <a:r>
-                <a:rPr lang="en-US" sz="800" dirty="0" smtClean="0">
-                  <a:solidFill>
-                    <a:schemeClr val="tx1"/>
-                  </a:solidFill>
-                  <a:latin typeface="Source Sans Pro Light"/>
-                </a:rPr>
-                <a:t>if the </a:t>
+                <a:t> if the </a:t>
               </a:r>
               <a:r>
                 <a:rPr lang="en-US" sz="800" dirty="0" err="1" smtClean="0">
@@ -16438,7 +16207,7 @@
             </a:ln>
             <a:extLst>
               <a:ext uri="{C572A759-6A51-4108-AA02-DFA0A04FC94B}">
-                <ma14:wrappingTextBoxFlag xmlns="" xmlns:ma14="http://schemas.microsoft.com/office/mac/drawingml/2011/main" val="1"/>
+                <ma14:wrappingTextBoxFlag xmlns:ma14="http://schemas.microsoft.com/office/mac/drawingml/2011/main" xmlns="" val="1"/>
               </a:ext>
             </a:extLst>
           </p:spPr>
@@ -16540,19 +16309,7 @@
                 <a:rPr lang="en-US" sz="800" dirty="0" smtClean="0">
                   <a:latin typeface="Source Sans Pro Light"/>
                 </a:rPr>
-                <a:t>Goodness-of-fit for one-way </a:t>
-              </a:r>
-              <a:r>
-                <a:rPr lang="en-US" sz="800" dirty="0" smtClean="0">
-                  <a:latin typeface="Source Sans Pro Light"/>
-                </a:rPr>
-                <a:t>frequency table </a:t>
-              </a:r>
-              <a:r>
-                <a:rPr lang="en-US" sz="800" dirty="0" smtClean="0">
-                  <a:latin typeface="Source Sans Pro Light"/>
-                </a:rPr>
-                <a:t>in </a:t>
+                <a:t>Goodness-of-fit for one-way frequency table in </a:t>
               </a:r>
               <a:r>
                 <a:rPr lang="en-US" sz="800" dirty="0" err="1" smtClean="0">
@@ -16715,7 +16472,7 @@
             </a:ln>
             <a:extLst>
               <a:ext uri="{C572A759-6A51-4108-AA02-DFA0A04FC94B}">
-                <ma14:wrappingTextBoxFlag xmlns="" xmlns:ma14="http://schemas.microsoft.com/office/mac/drawingml/2011/main" val="1"/>
+                <ma14:wrappingTextBoxFlag xmlns:ma14="http://schemas.microsoft.com/office/mac/drawingml/2011/main" xmlns="" val="1"/>
               </a:ext>
             </a:extLst>
           </p:spPr>
@@ -16832,25 +16589,7 @@
                   </a:solidFill>
                   <a:latin typeface="Source Sans Pro Semibold"/>
                 </a:rPr>
-                <a:t>c(lvl1=##,lvl2=##,lvl3=##) )         </a:t>
-              </a:r>
-              <a:r>
-                <a:rPr lang="en-US" sz="800" dirty="0" smtClean="0">
-                  <a:solidFill>
-                    <a:srgbClr val="C00000"/>
-                  </a:solidFill>
-                  <a:latin typeface="Source Sans Pro Semibold"/>
-                </a:rPr>
-                <a:t>  # </a:t>
-              </a:r>
-              <a:r>
-                <a:rPr lang="en-US" sz="800" dirty="0" smtClean="0">
-                  <a:solidFill>
-                    <a:srgbClr val="C00000"/>
-                  </a:solidFill>
-                  <a:latin typeface="Source Sans Pro Semibold"/>
-                </a:rPr>
-                <a:t>if summarized data</a:t>
+                <a:t>c(lvl1=##,lvl2=##,lvl3=##) )           # if summarized data</a:t>
               </a:r>
             </a:p>
             <a:p>
@@ -16907,7 +16646,16 @@
                   </a:solidFill>
                   <a:latin typeface="Source Sans Pro Semibold"/>
                 </a:rPr>
-                <a:t>cvarResp</a:t>
+                <a:t>cvarResp,data</a:t>
+              </a:r>
+              <a:r>
+                <a:rPr lang="en-US" sz="800" dirty="0" smtClean="0">
+                  <a:solidFill>
+                    <a:srgbClr val="C00000"/>
+                  </a:solidFill>
+                  <a:latin typeface="Source Sans Pro Semibold"/>
+                </a:rPr>
+                <a:t>=</a:t>
               </a:r>
               <a:r>
                 <a:rPr lang="en-US" sz="800" dirty="0" err="1" smtClean="0">
@@ -16916,24 +16664,6 @@
                   </a:solidFill>
                   <a:latin typeface="Source Sans Pro Semibold"/>
                 </a:rPr>
-                <a:t>,data</a:t>
-              </a:r>
-              <a:r>
-                <a:rPr lang="en-US" sz="800" dirty="0" smtClean="0">
-                  <a:solidFill>
-                    <a:srgbClr val="C00000"/>
-                  </a:solidFill>
-                  <a:latin typeface="Source Sans Pro Semibold"/>
-                </a:rPr>
-                <a:t>=</a:t>
-              </a:r>
-              <a:r>
-                <a:rPr lang="en-US" sz="800" dirty="0" err="1" smtClean="0">
-                  <a:solidFill>
-                    <a:srgbClr val="C00000"/>
-                  </a:solidFill>
-                  <a:latin typeface="Source Sans Pro Semibold"/>
-                </a:rPr>
                 <a:t>dfobj</a:t>
               </a:r>
               <a:r>
@@ -16943,25 +16673,7 @@
                   </a:solidFill>
                   <a:latin typeface="Source Sans Pro Semibold"/>
                 </a:rPr>
-                <a:t>) )    </a:t>
-              </a:r>
-              <a:r>
-                <a:rPr lang="en-US" sz="800" dirty="0" smtClean="0">
-                  <a:solidFill>
-                    <a:srgbClr val="C00000"/>
-                  </a:solidFill>
-                  <a:latin typeface="Source Sans Pro Semibold"/>
-                </a:rPr>
-                <a:t># </a:t>
-              </a:r>
-              <a:r>
-                <a:rPr lang="en-US" sz="800" dirty="0" smtClean="0">
-                  <a:solidFill>
-                    <a:srgbClr val="C00000"/>
-                  </a:solidFill>
-                  <a:latin typeface="Source Sans Pro Semibold"/>
-                </a:rPr>
-                <a:t>if raw data</a:t>
+                <a:t>) )    # if raw data</a:t>
               </a:r>
             </a:p>
             <a:p>

</xml_diff>

<commit_message>
Updated R FUnction Guide
</commit_message>
<xml_diff>
--- a/resources/MTH107-RGuide.pptx
+++ b/resources/MTH107-RGuide.pptx
@@ -1144,7 +1144,7 @@
           </a:ln>
           <a:extLst>
             <a:ext uri="{C572A759-6A51-4108-AA02-DFA0A04FC94B}">
-              <ma14:wrappingTextBoxFlag xmlns="" xmlns:ma14="http://schemas.microsoft.com/office/mac/drawingml/2011/main" val="1"/>
+              <ma14:wrappingTextBoxFlag xmlns:ma14="http://schemas.microsoft.com/office/mac/drawingml/2011/main" xmlns="" val="1"/>
             </a:ext>
           </a:extLst>
         </p:spPr>
@@ -1187,7 +1187,7 @@
           </a:ln>
           <a:extLst>
             <a:ext uri="{C572A759-6A51-4108-AA02-DFA0A04FC94B}">
-              <ma14:wrappingTextBoxFlag xmlns="" xmlns:ma14="http://schemas.microsoft.com/office/mac/drawingml/2011/main" val="1"/>
+              <ma14:wrappingTextBoxFlag xmlns:ma14="http://schemas.microsoft.com/office/mac/drawingml/2011/main" xmlns="" val="1"/>
             </a:ext>
           </a:extLst>
         </p:spPr>
@@ -1871,7 +1871,7 @@
             </a:ln>
             <a:extLst>
               <a:ext uri="{C572A759-6A51-4108-AA02-DFA0A04FC94B}">
-                <ma14:wrappingTextBoxFlag xmlns="" xmlns:ma14="http://schemas.microsoft.com/office/mac/drawingml/2011/main" val="1"/>
+                <ma14:wrappingTextBoxFlag xmlns:ma14="http://schemas.microsoft.com/office/mac/drawingml/2011/main" xmlns="" val="1"/>
               </a:ext>
             </a:extLst>
           </p:spPr>
@@ -2457,7 +2457,7 @@
             </a:ln>
             <a:extLst>
               <a:ext uri="{C572A759-6A51-4108-AA02-DFA0A04FC94B}">
-                <ma14:wrappingTextBoxFlag xmlns="" xmlns:ma14="http://schemas.microsoft.com/office/mac/drawingml/2011/main" val="1"/>
+                <ma14:wrappingTextBoxFlag xmlns:ma14="http://schemas.microsoft.com/office/mac/drawingml/2011/main" xmlns="" val="1"/>
               </a:ext>
             </a:extLst>
           </p:spPr>
@@ -3204,7 +3204,7 @@
             </a:ln>
             <a:extLst>
               <a:ext uri="{C572A759-6A51-4108-AA02-DFA0A04FC94B}">
-                <ma14:wrappingTextBoxFlag xmlns="" xmlns:ma14="http://schemas.microsoft.com/office/mac/drawingml/2011/main" val="1"/>
+                <ma14:wrappingTextBoxFlag xmlns:ma14="http://schemas.microsoft.com/office/mac/drawingml/2011/main" xmlns="" val="1"/>
               </a:ext>
             </a:extLst>
           </p:spPr>
@@ -4282,7 +4282,7 @@
             </a:ln>
             <a:extLst>
               <a:ext uri="{C572A759-6A51-4108-AA02-DFA0A04FC94B}">
-                <ma14:wrappingTextBoxFlag xmlns="" xmlns:ma14="http://schemas.microsoft.com/office/mac/drawingml/2011/main" val="1"/>
+                <ma14:wrappingTextBoxFlag xmlns:ma14="http://schemas.microsoft.com/office/mac/drawingml/2011/main" xmlns="" val="1"/>
               </a:ext>
             </a:extLst>
           </p:spPr>
@@ -6481,7 +6481,7 @@
             </a:ln>
             <a:extLst>
               <a:ext uri="{C572A759-6A51-4108-AA02-DFA0A04FC94B}">
-                <ma14:wrappingTextBoxFlag xmlns="" xmlns:ma14="http://schemas.microsoft.com/office/mac/drawingml/2011/main" val="1"/>
+                <ma14:wrappingTextBoxFlag xmlns:ma14="http://schemas.microsoft.com/office/mac/drawingml/2011/main" xmlns="" val="1"/>
               </a:ext>
             </a:extLst>
           </p:spPr>
@@ -9084,7 +9084,7 @@
             </a:ln>
             <a:extLst>
               <a:ext uri="{C572A759-6A51-4108-AA02-DFA0A04FC94B}">
-                <ma14:wrappingTextBoxFlag xmlns="" xmlns:ma14="http://schemas.microsoft.com/office/mac/drawingml/2011/main" val="1"/>
+                <ma14:wrappingTextBoxFlag xmlns:ma14="http://schemas.microsoft.com/office/mac/drawingml/2011/main" xmlns="" val="1"/>
               </a:ext>
             </a:extLst>
           </p:spPr>
@@ -9293,552 +9293,11 @@
         <p:grpSpPr>
           <a:xfrm>
             <a:off x="6138475" y="164088"/>
-            <a:ext cx="2931800" cy="3614101"/>
+            <a:ext cx="2931800" cy="3643732"/>
             <a:chOff x="6151175" y="62488"/>
-            <a:chExt cx="2931800" cy="3614101"/>
+            <a:chExt cx="2931800" cy="3643732"/>
           </a:xfrm>
         </p:grpSpPr>
-        <p:sp>
-          <p:nvSpPr>
-            <p:cNvPr id="105" name="Shape 34"/>
-            <p:cNvSpPr/>
-            <p:nvPr/>
-          </p:nvSpPr>
-          <p:spPr>
-            <a:xfrm>
-              <a:off x="6156895" y="2780697"/>
-              <a:ext cx="2926080" cy="895892"/>
-            </a:xfrm>
-            <a:prstGeom prst="rect">
-              <a:avLst/>
-            </a:prstGeom>
-            <a:solidFill>
-              <a:srgbClr val="FCFAEE"/>
-            </a:solidFill>
-            <a:ln w="12700">
-              <a:miter lim="400000"/>
-            </a:ln>
-          </p:spPr>
-          <p:txBody>
-            <a:bodyPr lIns="18288" tIns="45720" rIns="0" bIns="0" anchor="t">
-              <a:noAutofit/>
-            </a:bodyPr>
-            <a:lstStyle/>
-            <a:p>
-              <a:pPr algn="l" latinLnBrk="1"/>
-              <a:r>
-                <a:rPr lang="en-US" sz="600" dirty="0" smtClean="0">
-                  <a:latin typeface="Courier New" panose="02070309020205020404" pitchFamily="49" charset="0"/>
-                  <a:cs typeface="Courier New" panose="02070309020205020404" pitchFamily="49" charset="0"/>
-                </a:rPr>
-                <a:t>&gt; </a:t>
-              </a:r>
-              <a:r>
-                <a:rPr lang="en-US" sz="600" b="1" dirty="0" err="1" smtClean="0">
-                  <a:solidFill>
-                    <a:schemeClr val="accent2">
-                      <a:lumMod val="50000"/>
-                    </a:schemeClr>
-                  </a:solidFill>
-                  <a:latin typeface="Courier New" panose="02070309020205020404" pitchFamily="49" charset="0"/>
-                  <a:cs typeface="Courier New" panose="02070309020205020404" pitchFamily="49" charset="0"/>
-                </a:rPr>
-                <a:t>setwd</a:t>
-              </a:r>
-              <a:r>
-                <a:rPr lang="en-US" sz="600" b="1" dirty="0">
-                  <a:solidFill>
-                    <a:schemeClr val="accent2">
-                      <a:lumMod val="50000"/>
-                    </a:schemeClr>
-                  </a:solidFill>
-                  <a:latin typeface="Courier New" panose="02070309020205020404" pitchFamily="49" charset="0"/>
-                  <a:cs typeface="Courier New" panose="02070309020205020404" pitchFamily="49" charset="0"/>
-                </a:rPr>
-                <a:t>("</a:t>
-              </a:r>
-              <a:r>
-                <a:rPr lang="en-US" sz="600" b="1" dirty="0">
-                  <a:solidFill>
-                    <a:srgbClr val="C00000"/>
-                  </a:solidFill>
-                  <a:latin typeface="Courier New" panose="02070309020205020404" pitchFamily="49" charset="0"/>
-                  <a:cs typeface="Courier New" panose="02070309020205020404" pitchFamily="49" charset="0"/>
-                </a:rPr>
-                <a:t>C:/aaaWork/Web/GitHub/NCMTH107</a:t>
-              </a:r>
-              <a:r>
-                <a:rPr lang="en-US" sz="600" b="1" dirty="0">
-                  <a:solidFill>
-                    <a:schemeClr val="accent2">
-                      <a:lumMod val="50000"/>
-                    </a:schemeClr>
-                  </a:solidFill>
-                  <a:latin typeface="Courier New" panose="02070309020205020404" pitchFamily="49" charset="0"/>
-                  <a:cs typeface="Courier New" panose="02070309020205020404" pitchFamily="49" charset="0"/>
-                </a:rPr>
-                <a:t>")</a:t>
-              </a:r>
-              <a:r>
-                <a:rPr lang="en-US" sz="600" dirty="0">
-                  <a:latin typeface="Courier New" panose="02070309020205020404" pitchFamily="49" charset="0"/>
-                  <a:cs typeface="Courier New" panose="02070309020205020404" pitchFamily="49" charset="0"/>
-                </a:rPr>
-                <a:t/>
-              </a:r>
-              <a:br>
-                <a:rPr lang="en-US" sz="600" dirty="0">
-                  <a:latin typeface="Courier New" panose="02070309020205020404" pitchFamily="49" charset="0"/>
-                  <a:cs typeface="Courier New" panose="02070309020205020404" pitchFamily="49" charset="0"/>
-                </a:rPr>
-              </a:br>
-              <a:r>
-                <a:rPr lang="en-US" sz="600" dirty="0" smtClean="0">
-                  <a:latin typeface="Courier New" panose="02070309020205020404" pitchFamily="49" charset="0"/>
-                  <a:cs typeface="Courier New" panose="02070309020205020404" pitchFamily="49" charset="0"/>
-                </a:rPr>
-                <a:t>&gt; </a:t>
-              </a:r>
-              <a:r>
-                <a:rPr lang="en-US" sz="600" b="1" dirty="0" err="1" smtClean="0">
-                  <a:solidFill>
-                    <a:srgbClr val="C00000"/>
-                  </a:solidFill>
-                  <a:latin typeface="Courier New" panose="02070309020205020404" pitchFamily="49" charset="0"/>
-                  <a:cs typeface="Courier New" panose="02070309020205020404" pitchFamily="49" charset="0"/>
-                </a:rPr>
-                <a:t>dfcar</a:t>
-              </a:r>
-              <a:r>
-                <a:rPr lang="en-US" sz="600" b="1" dirty="0" smtClean="0">
-                  <a:solidFill>
-                    <a:srgbClr val="C00000"/>
-                  </a:solidFill>
-                  <a:latin typeface="Courier New" panose="02070309020205020404" pitchFamily="49" charset="0"/>
-                  <a:cs typeface="Courier New" panose="02070309020205020404" pitchFamily="49" charset="0"/>
-                </a:rPr>
-                <a:t> </a:t>
-              </a:r>
-              <a:r>
-                <a:rPr lang="en-US" sz="600" b="1" dirty="0">
-                  <a:solidFill>
-                    <a:schemeClr val="accent2">
-                      <a:lumMod val="50000"/>
-                    </a:schemeClr>
-                  </a:solidFill>
-                  <a:latin typeface="Courier New" panose="02070309020205020404" pitchFamily="49" charset="0"/>
-                  <a:cs typeface="Courier New" panose="02070309020205020404" pitchFamily="49" charset="0"/>
-                </a:rPr>
-                <a:t>&lt;- read.csv</a:t>
-              </a:r>
-              <a:r>
-                <a:rPr lang="en-US" sz="600" b="1" dirty="0" smtClean="0">
-                  <a:solidFill>
-                    <a:schemeClr val="accent2">
-                      <a:lumMod val="50000"/>
-                    </a:schemeClr>
-                  </a:solidFill>
-                  <a:latin typeface="Courier New" panose="02070309020205020404" pitchFamily="49" charset="0"/>
-                  <a:cs typeface="Courier New" panose="02070309020205020404" pitchFamily="49" charset="0"/>
-                </a:rPr>
-                <a:t>("</a:t>
-              </a:r>
-              <a:r>
-                <a:rPr lang="en-US" sz="600" b="1" dirty="0" smtClean="0">
-                  <a:solidFill>
-                    <a:srgbClr val="C00000"/>
-                  </a:solidFill>
-                  <a:latin typeface="Courier New" panose="02070309020205020404" pitchFamily="49" charset="0"/>
-                  <a:cs typeface="Courier New" panose="02070309020205020404" pitchFamily="49" charset="0"/>
-                </a:rPr>
-                <a:t>93cars.csv</a:t>
-              </a:r>
-              <a:r>
-                <a:rPr lang="en-US" sz="600" b="1" dirty="0">
-                  <a:solidFill>
-                    <a:schemeClr val="accent2">
-                      <a:lumMod val="50000"/>
-                    </a:schemeClr>
-                  </a:solidFill>
-                  <a:latin typeface="Courier New" panose="02070309020205020404" pitchFamily="49" charset="0"/>
-                  <a:cs typeface="Courier New" panose="02070309020205020404" pitchFamily="49" charset="0"/>
-                </a:rPr>
-                <a:t>")</a:t>
-              </a:r>
-              <a:r>
-                <a:rPr lang="en-US" sz="600" dirty="0">
-                  <a:latin typeface="Courier New" panose="02070309020205020404" pitchFamily="49" charset="0"/>
-                  <a:cs typeface="Courier New" panose="02070309020205020404" pitchFamily="49" charset="0"/>
-                </a:rPr>
-                <a:t/>
-              </a:r>
-              <a:br>
-                <a:rPr lang="en-US" sz="600" dirty="0">
-                  <a:latin typeface="Courier New" panose="02070309020205020404" pitchFamily="49" charset="0"/>
-                  <a:cs typeface="Courier New" panose="02070309020205020404" pitchFamily="49" charset="0"/>
-                </a:rPr>
-              </a:br>
-              <a:r>
-                <a:rPr lang="en-US" sz="600" dirty="0" smtClean="0">
-                  <a:latin typeface="Courier New" panose="02070309020205020404" pitchFamily="49" charset="0"/>
-                  <a:cs typeface="Courier New" panose="02070309020205020404" pitchFamily="49" charset="0"/>
-                </a:rPr>
-                <a:t>&gt; </a:t>
-              </a:r>
-              <a:r>
-                <a:rPr lang="en-US" sz="600" b="1" dirty="0" err="1" smtClean="0">
-                  <a:solidFill>
-                    <a:schemeClr val="accent2">
-                      <a:lumMod val="50000"/>
-                    </a:schemeClr>
-                  </a:solidFill>
-                  <a:latin typeface="Courier New" panose="02070309020205020404" pitchFamily="49" charset="0"/>
-                  <a:cs typeface="Courier New" panose="02070309020205020404" pitchFamily="49" charset="0"/>
-                </a:rPr>
-                <a:t>str</a:t>
-              </a:r>
-              <a:r>
-                <a:rPr lang="en-US" sz="600" b="1" dirty="0" smtClean="0">
-                  <a:solidFill>
-                    <a:schemeClr val="accent2">
-                      <a:lumMod val="50000"/>
-                    </a:schemeClr>
-                  </a:solidFill>
-                  <a:latin typeface="Courier New" panose="02070309020205020404" pitchFamily="49" charset="0"/>
-                  <a:cs typeface="Courier New" panose="02070309020205020404" pitchFamily="49" charset="0"/>
-                </a:rPr>
-                <a:t>(</a:t>
-              </a:r>
-              <a:r>
-                <a:rPr lang="en-US" sz="600" b="1" dirty="0" err="1" smtClean="0">
-                  <a:solidFill>
-                    <a:srgbClr val="C00000"/>
-                  </a:solidFill>
-                  <a:latin typeface="Courier New" panose="02070309020205020404" pitchFamily="49" charset="0"/>
-                  <a:cs typeface="Courier New" panose="02070309020205020404" pitchFamily="49" charset="0"/>
-                </a:rPr>
-                <a:t>dfcar</a:t>
-              </a:r>
-              <a:r>
-                <a:rPr lang="en-US" sz="600" b="1" dirty="0" smtClean="0">
-                  <a:solidFill>
-                    <a:schemeClr val="accent2">
-                      <a:lumMod val="50000"/>
-                    </a:schemeClr>
-                  </a:solidFill>
-                  <a:latin typeface="Courier New" panose="02070309020205020404" pitchFamily="49" charset="0"/>
-                  <a:cs typeface="Courier New" panose="02070309020205020404" pitchFamily="49" charset="0"/>
-                </a:rPr>
-                <a:t>)</a:t>
-              </a:r>
-              <a:endParaRPr lang="en-US" sz="600" b="1" dirty="0">
-                <a:solidFill>
-                  <a:schemeClr val="accent2">
-                    <a:lumMod val="50000"/>
-                  </a:schemeClr>
-                </a:solidFill>
-                <a:latin typeface="Courier New" panose="02070309020205020404" pitchFamily="49" charset="0"/>
-                <a:cs typeface="Courier New" panose="02070309020205020404" pitchFamily="49" charset="0"/>
-              </a:endParaRPr>
-            </a:p>
-            <a:p>
-              <a:pPr algn="l"/>
-              <a:r>
-                <a:rPr lang="en-US" sz="600" dirty="0">
-                  <a:latin typeface="Courier New" panose="02070309020205020404" pitchFamily="49" charset="0"/>
-                  <a:cs typeface="Courier New" panose="02070309020205020404" pitchFamily="49" charset="0"/>
-                </a:rPr>
-                <a:t>'</a:t>
-              </a:r>
-              <a:r>
-                <a:rPr lang="en-US" sz="600" dirty="0" err="1">
-                  <a:latin typeface="Courier New" panose="02070309020205020404" pitchFamily="49" charset="0"/>
-                  <a:cs typeface="Courier New" panose="02070309020205020404" pitchFamily="49" charset="0"/>
-                </a:rPr>
-                <a:t>data.frame</a:t>
-              </a:r>
-              <a:r>
-                <a:rPr lang="en-US" sz="600" dirty="0">
-                  <a:latin typeface="Courier New" panose="02070309020205020404" pitchFamily="49" charset="0"/>
-                  <a:cs typeface="Courier New" panose="02070309020205020404" pitchFamily="49" charset="0"/>
-                </a:rPr>
-                <a:t>':    93 obs. of  26 variables:</a:t>
-              </a:r>
-              <a:br>
-                <a:rPr lang="en-US" sz="600" dirty="0">
-                  <a:latin typeface="Courier New" panose="02070309020205020404" pitchFamily="49" charset="0"/>
-                  <a:cs typeface="Courier New" panose="02070309020205020404" pitchFamily="49" charset="0"/>
-                </a:rPr>
-              </a:br>
-              <a:r>
-                <a:rPr lang="en-US" sz="600" dirty="0">
-                  <a:latin typeface="Courier New" panose="02070309020205020404" pitchFamily="49" charset="0"/>
-                  <a:cs typeface="Courier New" panose="02070309020205020404" pitchFamily="49" charset="0"/>
-                </a:rPr>
-                <a:t>  $ Type    </a:t>
-              </a:r>
-              <a:r>
-                <a:rPr lang="en-US" sz="600" dirty="0" smtClean="0">
-                  <a:latin typeface="Courier New" panose="02070309020205020404" pitchFamily="49" charset="0"/>
-                  <a:cs typeface="Courier New" panose="02070309020205020404" pitchFamily="49" charset="0"/>
-                </a:rPr>
-                <a:t>: </a:t>
-              </a:r>
-              <a:r>
-                <a:rPr lang="en-US" sz="600" dirty="0">
-                  <a:latin typeface="Courier New" panose="02070309020205020404" pitchFamily="49" charset="0"/>
-                  <a:cs typeface="Courier New" panose="02070309020205020404" pitchFamily="49" charset="0"/>
-                </a:rPr>
-                <a:t>Factor w/ 6 levels "</a:t>
-              </a:r>
-              <a:r>
-                <a:rPr lang="en-US" sz="600" dirty="0" err="1" smtClean="0">
-                  <a:latin typeface="Courier New" panose="02070309020205020404" pitchFamily="49" charset="0"/>
-                  <a:cs typeface="Courier New" panose="02070309020205020404" pitchFamily="49" charset="0"/>
-                </a:rPr>
-                <a:t>Compact","Large</a:t>
-              </a:r>
-              <a:r>
-                <a:rPr lang="en-US" sz="600" dirty="0" smtClean="0">
-                  <a:latin typeface="Courier New" panose="02070309020205020404" pitchFamily="49" charset="0"/>
-                  <a:cs typeface="Courier New" panose="02070309020205020404" pitchFamily="49" charset="0"/>
-                </a:rPr>
-                <a:t>": </a:t>
-              </a:r>
-              <a:r>
-                <a:rPr lang="en-US" sz="600" dirty="0">
-                  <a:latin typeface="Courier New" panose="02070309020205020404" pitchFamily="49" charset="0"/>
-                  <a:cs typeface="Courier New" panose="02070309020205020404" pitchFamily="49" charset="0"/>
-                </a:rPr>
-                <a:t>4 </a:t>
-              </a:r>
-              <a:r>
-                <a:rPr lang="en-US" sz="600" dirty="0" smtClean="0">
-                  <a:latin typeface="Courier New" panose="02070309020205020404" pitchFamily="49" charset="0"/>
-                  <a:cs typeface="Courier New" panose="02070309020205020404" pitchFamily="49" charset="0"/>
-                </a:rPr>
-                <a:t>3 3 ...</a:t>
-              </a:r>
-              <a:r>
-                <a:rPr lang="en-US" sz="600" dirty="0">
-                  <a:latin typeface="Courier New" panose="02070309020205020404" pitchFamily="49" charset="0"/>
-                  <a:cs typeface="Courier New" panose="02070309020205020404" pitchFamily="49" charset="0"/>
-                </a:rPr>
-                <a:t/>
-              </a:r>
-              <a:br>
-                <a:rPr lang="en-US" sz="600" dirty="0">
-                  <a:latin typeface="Courier New" panose="02070309020205020404" pitchFamily="49" charset="0"/>
-                  <a:cs typeface="Courier New" panose="02070309020205020404" pitchFamily="49" charset="0"/>
-                </a:rPr>
-              </a:br>
-              <a:r>
-                <a:rPr lang="en-US" sz="600" dirty="0">
-                  <a:latin typeface="Courier New" panose="02070309020205020404" pitchFamily="49" charset="0"/>
-                  <a:cs typeface="Courier New" panose="02070309020205020404" pitchFamily="49" charset="0"/>
-                </a:rPr>
-                <a:t>  $ HMPG    </a:t>
-              </a:r>
-              <a:r>
-                <a:rPr lang="en-US" sz="600" dirty="0" smtClean="0">
-                  <a:latin typeface="Courier New" panose="02070309020205020404" pitchFamily="49" charset="0"/>
-                  <a:cs typeface="Courier New" panose="02070309020205020404" pitchFamily="49" charset="0"/>
-                </a:rPr>
-                <a:t>: </a:t>
-              </a:r>
-              <a:r>
-                <a:rPr lang="en-US" sz="600" dirty="0" err="1">
-                  <a:latin typeface="Courier New" panose="02070309020205020404" pitchFamily="49" charset="0"/>
-                  <a:cs typeface="Courier New" panose="02070309020205020404" pitchFamily="49" charset="0"/>
-                </a:rPr>
-                <a:t>int</a:t>
-              </a:r>
-              <a:r>
-                <a:rPr lang="en-US" sz="600" dirty="0">
-                  <a:latin typeface="Courier New" panose="02070309020205020404" pitchFamily="49" charset="0"/>
-                  <a:cs typeface="Courier New" panose="02070309020205020404" pitchFamily="49" charset="0"/>
-                </a:rPr>
-                <a:t>  31 25 26 26 30 </a:t>
-              </a:r>
-              <a:r>
-                <a:rPr lang="en-US" sz="600" dirty="0" smtClean="0">
-                  <a:latin typeface="Courier New" panose="02070309020205020404" pitchFamily="49" charset="0"/>
-                  <a:cs typeface="Courier New" panose="02070309020205020404" pitchFamily="49" charset="0"/>
-                </a:rPr>
-                <a:t>31 28 25 27 25...</a:t>
-              </a:r>
-              <a:r>
-                <a:rPr lang="en-US" sz="600" dirty="0">
-                  <a:latin typeface="Courier New" panose="02070309020205020404" pitchFamily="49" charset="0"/>
-                  <a:cs typeface="Courier New" panose="02070309020205020404" pitchFamily="49" charset="0"/>
-                </a:rPr>
-                <a:t/>
-              </a:r>
-              <a:br>
-                <a:rPr lang="en-US" sz="600" dirty="0">
-                  <a:latin typeface="Courier New" panose="02070309020205020404" pitchFamily="49" charset="0"/>
-                  <a:cs typeface="Courier New" panose="02070309020205020404" pitchFamily="49" charset="0"/>
-                </a:rPr>
-              </a:br>
-              <a:r>
-                <a:rPr lang="en-US" sz="600" dirty="0">
-                  <a:latin typeface="Courier New" panose="02070309020205020404" pitchFamily="49" charset="0"/>
-                  <a:cs typeface="Courier New" panose="02070309020205020404" pitchFamily="49" charset="0"/>
-                </a:rPr>
-                <a:t>  $ Manual  </a:t>
-              </a:r>
-              <a:r>
-                <a:rPr lang="en-US" sz="600" dirty="0" smtClean="0">
-                  <a:latin typeface="Courier New" panose="02070309020205020404" pitchFamily="49" charset="0"/>
-                  <a:cs typeface="Courier New" panose="02070309020205020404" pitchFamily="49" charset="0"/>
-                </a:rPr>
-                <a:t>: </a:t>
-              </a:r>
-              <a:r>
-                <a:rPr lang="en-US" sz="600" dirty="0">
-                  <a:latin typeface="Courier New" panose="02070309020205020404" pitchFamily="49" charset="0"/>
-                  <a:cs typeface="Courier New" panose="02070309020205020404" pitchFamily="49" charset="0"/>
-                </a:rPr>
-                <a:t>Factor w/ 2 levels "</a:t>
-              </a:r>
-              <a:r>
-                <a:rPr lang="en-US" sz="600" dirty="0" err="1" smtClean="0">
-                  <a:latin typeface="Courier New" panose="02070309020205020404" pitchFamily="49" charset="0"/>
-                  <a:cs typeface="Courier New" panose="02070309020205020404" pitchFamily="49" charset="0"/>
-                </a:rPr>
-                <a:t>No","Yes</a:t>
-              </a:r>
-              <a:r>
-                <a:rPr lang="en-US" sz="600" dirty="0" smtClean="0">
-                  <a:latin typeface="Courier New" panose="02070309020205020404" pitchFamily="49" charset="0"/>
-                  <a:cs typeface="Courier New" panose="02070309020205020404" pitchFamily="49" charset="0"/>
-                </a:rPr>
-                <a:t>": </a:t>
-              </a:r>
-              <a:r>
-                <a:rPr lang="en-US" sz="600" dirty="0">
-                  <a:latin typeface="Courier New" panose="02070309020205020404" pitchFamily="49" charset="0"/>
-                  <a:cs typeface="Courier New" panose="02070309020205020404" pitchFamily="49" charset="0"/>
-                </a:rPr>
-                <a:t>2 </a:t>
-              </a:r>
-              <a:r>
-                <a:rPr lang="en-US" sz="600" dirty="0" smtClean="0">
-                  <a:latin typeface="Courier New" panose="02070309020205020404" pitchFamily="49" charset="0"/>
-                  <a:cs typeface="Courier New" panose="02070309020205020404" pitchFamily="49" charset="0"/>
-                </a:rPr>
-                <a:t>2 2 2 2 1 1 ...</a:t>
-              </a:r>
-              <a:r>
-                <a:rPr lang="en-US" sz="600" dirty="0">
-                  <a:latin typeface="Courier New" panose="02070309020205020404" pitchFamily="49" charset="0"/>
-                  <a:cs typeface="Courier New" panose="02070309020205020404" pitchFamily="49" charset="0"/>
-                </a:rPr>
-                <a:t/>
-              </a:r>
-              <a:br>
-                <a:rPr lang="en-US" sz="600" dirty="0">
-                  <a:latin typeface="Courier New" panose="02070309020205020404" pitchFamily="49" charset="0"/>
-                  <a:cs typeface="Courier New" panose="02070309020205020404" pitchFamily="49" charset="0"/>
-                </a:rPr>
-              </a:br>
-              <a:r>
-                <a:rPr lang="en-US" sz="600" dirty="0">
-                  <a:latin typeface="Courier New" panose="02070309020205020404" pitchFamily="49" charset="0"/>
-                  <a:cs typeface="Courier New" panose="02070309020205020404" pitchFamily="49" charset="0"/>
-                </a:rPr>
-                <a:t>  $ Weight  </a:t>
-              </a:r>
-              <a:r>
-                <a:rPr lang="en-US" sz="600" dirty="0" smtClean="0">
-                  <a:latin typeface="Courier New" panose="02070309020205020404" pitchFamily="49" charset="0"/>
-                  <a:cs typeface="Courier New" panose="02070309020205020404" pitchFamily="49" charset="0"/>
-                </a:rPr>
-                <a:t>: </a:t>
-              </a:r>
-              <a:r>
-                <a:rPr lang="en-US" sz="600" dirty="0" err="1">
-                  <a:latin typeface="Courier New" panose="02070309020205020404" pitchFamily="49" charset="0"/>
-                  <a:cs typeface="Courier New" panose="02070309020205020404" pitchFamily="49" charset="0"/>
-                </a:rPr>
-                <a:t>int</a:t>
-              </a:r>
-              <a:r>
-                <a:rPr lang="en-US" sz="600" dirty="0">
-                  <a:latin typeface="Courier New" panose="02070309020205020404" pitchFamily="49" charset="0"/>
-                  <a:cs typeface="Courier New" panose="02070309020205020404" pitchFamily="49" charset="0"/>
-                </a:rPr>
-                <a:t>  2705 3560 3375 3</a:t>
-              </a:r>
-              <a:r>
-                <a:rPr lang="en-US" sz="600" dirty="0" smtClean="0">
-                  <a:latin typeface="Courier New" panose="02070309020205020404" pitchFamily="49" charset="0"/>
-                  <a:cs typeface="Courier New" panose="02070309020205020404" pitchFamily="49" charset="0"/>
-                </a:rPr>
-                <a:t>405 3640 2880 3470 </a:t>
-              </a:r>
-              <a:r>
-                <a:rPr lang="en-US" sz="600" dirty="0">
-                  <a:latin typeface="Courier New" panose="02070309020205020404" pitchFamily="49" charset="0"/>
-                  <a:cs typeface="Courier New" panose="02070309020205020404" pitchFamily="49" charset="0"/>
-                </a:rPr>
-                <a:t>...</a:t>
-              </a:r>
-              <a:br>
-                <a:rPr lang="en-US" sz="600" dirty="0">
-                  <a:latin typeface="Courier New" panose="02070309020205020404" pitchFamily="49" charset="0"/>
-                  <a:cs typeface="Courier New" panose="02070309020205020404" pitchFamily="49" charset="0"/>
-                </a:rPr>
-              </a:br>
-              <a:r>
-                <a:rPr lang="en-US" sz="600" dirty="0">
-                  <a:latin typeface="Courier New" panose="02070309020205020404" pitchFamily="49" charset="0"/>
-                  <a:cs typeface="Courier New" panose="02070309020205020404" pitchFamily="49" charset="0"/>
-                </a:rPr>
-                <a:t>  $ </a:t>
-              </a:r>
-              <a:r>
-                <a:rPr lang="en-US" sz="600" dirty="0" smtClean="0">
-                  <a:latin typeface="Courier New" panose="02070309020205020404" pitchFamily="49" charset="0"/>
-                  <a:cs typeface="Courier New" panose="02070309020205020404" pitchFamily="49" charset="0"/>
-                </a:rPr>
-                <a:t>Domestic: </a:t>
-              </a:r>
-              <a:r>
-                <a:rPr lang="en-US" sz="600" dirty="0">
-                  <a:latin typeface="Courier New" panose="02070309020205020404" pitchFamily="49" charset="0"/>
-                  <a:cs typeface="Courier New" panose="02070309020205020404" pitchFamily="49" charset="0"/>
-                </a:rPr>
-                <a:t>Factor w/ 2 levels "</a:t>
-              </a:r>
-              <a:r>
-                <a:rPr lang="en-US" sz="600" dirty="0" err="1">
-                  <a:latin typeface="Courier New" panose="02070309020205020404" pitchFamily="49" charset="0"/>
-                  <a:cs typeface="Courier New" panose="02070309020205020404" pitchFamily="49" charset="0"/>
-                </a:rPr>
-                <a:t>No","Yes</a:t>
-              </a:r>
-              <a:r>
-                <a:rPr lang="en-US" sz="600" dirty="0">
-                  <a:latin typeface="Courier New" panose="02070309020205020404" pitchFamily="49" charset="0"/>
-                  <a:cs typeface="Courier New" panose="02070309020205020404" pitchFamily="49" charset="0"/>
-                </a:rPr>
-                <a:t>": 1 </a:t>
-              </a:r>
-              <a:r>
-                <a:rPr lang="en-US" sz="600" dirty="0" smtClean="0">
-                  <a:latin typeface="Courier New" panose="02070309020205020404" pitchFamily="49" charset="0"/>
-                  <a:cs typeface="Courier New" panose="02070309020205020404" pitchFamily="49" charset="0"/>
-                </a:rPr>
-                <a:t>1 1 1 1 2 2 ...</a:t>
-              </a:r>
-              <a:endParaRPr lang="en-US" sz="600" dirty="0">
-                <a:latin typeface="Courier New" panose="02070309020205020404" pitchFamily="49" charset="0"/>
-                <a:cs typeface="Courier New" panose="02070309020205020404" pitchFamily="49" charset="0"/>
-              </a:endParaRPr>
-            </a:p>
-          </p:txBody>
-        </p:sp>
         <p:sp>
           <p:nvSpPr>
             <p:cNvPr id="106" name="Shape 34"/>
@@ -9848,7 +9307,7 @@
           <p:spPr>
             <a:xfrm>
               <a:off x="6151285" y="200952"/>
-              <a:ext cx="2926080" cy="2598891"/>
+              <a:ext cx="2926080" cy="2663978"/>
             </a:xfrm>
             <a:prstGeom prst="roundRect">
               <a:avLst>
@@ -10288,31 +9747,31 @@
                 <a:defRPr sz="1800"/>
               </a:pPr>
               <a:r>
-                <a:rPr lang="en-US" sz="800" dirty="0">
+                <a:rPr lang="en-US" sz="800" dirty="0" smtClean="0">
                   <a:latin typeface="Calibri Light" panose="020F0302020204030204" pitchFamily="34" charset="0"/>
                   <a:ea typeface="Source Sans Pro Light"/>
                   <a:cs typeface="Calibri Light" panose="020F0302020204030204" pitchFamily="34" charset="0"/>
                   <a:sym typeface="Source Sans Pro Light"/>
                 </a:rPr>
-                <a:t>Start script and save it in the same folder </a:t>
-              </a:r>
-              <a:r>
-                <a:rPr lang="en-US" sz="800" dirty="0" smtClean="0">
+                <a:t>Open “R Assignment </a:t>
+              </a:r>
+              <a:r>
+                <a:rPr lang="en-US" sz="800" dirty="0" err="1" smtClean="0">
                   <a:latin typeface="Calibri Light" panose="020F0302020204030204" pitchFamily="34" charset="0"/>
                   <a:ea typeface="Source Sans Pro Light"/>
                   <a:cs typeface="Calibri Light" panose="020F0302020204030204" pitchFamily="34" charset="0"/>
                   <a:sym typeface="Source Sans Pro Light"/>
                 </a:rPr>
-                <a:t>with </a:t>
-              </a:r>
-              <a:r>
-                <a:rPr lang="en-US" sz="800" dirty="0">
+                <a:t>Template.Rmd</a:t>
+              </a:r>
+              <a:r>
+                <a:rPr lang="en-US" sz="800" dirty="0" smtClean="0">
                   <a:latin typeface="Calibri Light" panose="020F0302020204030204" pitchFamily="34" charset="0"/>
                   <a:ea typeface="Source Sans Pro Light"/>
                   <a:cs typeface="Calibri Light" panose="020F0302020204030204" pitchFamily="34" charset="0"/>
                   <a:sym typeface="Source Sans Pro Light"/>
                 </a:rPr>
-                <a:t>the CSV file.</a:t>
+                <a:t>” file.</a:t>
               </a:r>
             </a:p>
             <a:p>
@@ -10334,34 +9793,34 @@
                   <a:cs typeface="Calibri Light" panose="020F0302020204030204" pitchFamily="34" charset="0"/>
                   <a:sym typeface="Source Sans Pro Light"/>
                 </a:rPr>
-                <a:t>Select </a:t>
-              </a:r>
-              <a:r>
-                <a:rPr lang="en-US" sz="800" i="1" dirty="0" smtClean="0">
+                <a:t>Change title on line 2 (keep the </a:t>
+              </a:r>
+              <a:r>
+                <a:rPr lang="en-US" sz="800" dirty="0">
                   <a:latin typeface="Calibri Light" panose="020F0302020204030204" pitchFamily="34" charset="0"/>
                   <a:ea typeface="Source Sans Pro Light"/>
                   <a:cs typeface="Calibri Light" panose="020F0302020204030204" pitchFamily="34" charset="0"/>
                   <a:sym typeface="Source Sans Pro Light"/>
                 </a:rPr>
-                <a:t>Session</a:t>
-              </a:r>
-              <a:r>
-                <a:rPr lang="en-US" sz="800" i="1" dirty="0">
+                <a:t>quotes). Save file </a:t>
+              </a:r>
+              <a:r>
+                <a:rPr lang="en-US" sz="800" dirty="0" smtClean="0">
                   <a:latin typeface="Calibri Light" panose="020F0302020204030204" pitchFamily="34" charset="0"/>
                   <a:ea typeface="Source Sans Pro Light"/>
                   <a:cs typeface="Calibri Light" panose="020F0302020204030204" pitchFamily="34" charset="0"/>
                   <a:sym typeface="Source Sans Pro Light"/>
                 </a:rPr>
-                <a:t>, Set Working Directory, To Source File </a:t>
-              </a:r>
-              <a:r>
-                <a:rPr lang="en-US" sz="800" i="1" dirty="0" smtClean="0">
+                <a:t>with </a:t>
+              </a:r>
+              <a:r>
+                <a:rPr lang="en-US" sz="800" dirty="0">
                   <a:latin typeface="Calibri Light" panose="020F0302020204030204" pitchFamily="34" charset="0"/>
                   <a:ea typeface="Source Sans Pro Light"/>
                   <a:cs typeface="Calibri Light" panose="020F0302020204030204" pitchFamily="34" charset="0"/>
                   <a:sym typeface="Source Sans Pro Light"/>
                 </a:rPr>
-                <a:t>…</a:t>
+                <a:t>new </a:t>
               </a:r>
               <a:r>
                 <a:rPr lang="en-US" sz="800" dirty="0" smtClean="0">
@@ -10370,9 +9829,9 @@
                   <a:cs typeface="Calibri Light" panose="020F0302020204030204" pitchFamily="34" charset="0"/>
                   <a:sym typeface="Source Sans Pro Light"/>
                 </a:rPr>
-                <a:t> menus</a:t>
-              </a:r>
-              <a:endParaRPr lang="en-US" sz="800" dirty="0">
+                <a:t>name.</a:t>
+              </a:r>
+              <a:endParaRPr lang="en-US" sz="800" dirty="0" smtClean="0">
                 <a:latin typeface="Calibri Light" panose="020F0302020204030204" pitchFamily="34" charset="0"/>
                 <a:ea typeface="Source Sans Pro Light"/>
                 <a:cs typeface="Calibri Light" panose="020F0302020204030204" pitchFamily="34" charset="0"/>
@@ -10392,86 +9851,71 @@
                 <a:defRPr sz="1800"/>
               </a:pPr>
               <a:r>
-                <a:rPr lang="en-US" sz="800" dirty="0">
+                <a:rPr lang="en-US" sz="800" dirty="0" smtClean="0">
                   <a:latin typeface="Calibri Light" panose="020F0302020204030204" pitchFamily="34" charset="0"/>
                   <a:ea typeface="Source Sans Pro Light"/>
                   <a:cs typeface="Calibri Light" panose="020F0302020204030204" pitchFamily="34" charset="0"/>
                   <a:sym typeface="Source Sans Pro Light"/>
                 </a:rPr>
-                <a:t>Copy </a:t>
-              </a:r>
-              <a:r>
-                <a:rPr lang="en-US" sz="800" dirty="0">
-                  <a:solidFill>
-                    <a:schemeClr val="tx1"/>
-                  </a:solidFill>
+                <a:t>In an R code chunk (between </a:t>
+              </a:r>
+              <a:r>
+                <a:rPr lang="en-US" sz="700" dirty="0" smtClean="0">
+                  <a:latin typeface="Courier New" panose="02070309020205020404" pitchFamily="49" charset="0"/>
+                  <a:ea typeface="Source Sans Pro Light"/>
+                  <a:cs typeface="Courier New" panose="02070309020205020404" pitchFamily="49" charset="0"/>
+                  <a:sym typeface="Source Sans Pro Light"/>
+                </a:rPr>
+                <a:t>```{R}</a:t>
+              </a:r>
+              <a:r>
+                <a:rPr lang="en-US" sz="800" dirty="0" smtClean="0">
                   <a:latin typeface="Calibri Light" panose="020F0302020204030204" pitchFamily="34" charset="0"/>
                   <a:ea typeface="Source Sans Pro Light"/>
                   <a:cs typeface="Calibri Light" panose="020F0302020204030204" pitchFamily="34" charset="0"/>
                   <a:sym typeface="Source Sans Pro Light"/>
                 </a:rPr>
-                <a:t>resulting </a:t>
-              </a:r>
-              <a:r>
-                <a:rPr lang="en-US" sz="700" b="1" dirty="0" err="1">
-                  <a:solidFill>
-                    <a:schemeClr val="tx1"/>
-                  </a:solidFill>
-                  <a:latin typeface="Lucida Console" panose="020B0609040504020204" pitchFamily="49" charset="0"/>
+                <a:t> and </a:t>
+              </a:r>
+              <a:r>
+                <a:rPr lang="en-US" sz="700" dirty="0">
+                  <a:latin typeface="Courier New" panose="02070309020205020404" pitchFamily="49" charset="0"/>
+                  <a:ea typeface="Source Sans Pro Light"/>
+                  <a:cs typeface="Courier New" panose="02070309020205020404" pitchFamily="49" charset="0"/>
+                  <a:sym typeface="Source Sans Pro Light"/>
+                </a:rPr>
+                <a:t>```</a:t>
+              </a:r>
+              <a:r>
+                <a:rPr lang="en-US" sz="800" dirty="0" smtClean="0">
+                  <a:latin typeface="Calibri Light" panose="020F0302020204030204" pitchFamily="34" charset="0"/>
                   <a:ea typeface="Source Sans Pro Light"/>
                   <a:cs typeface="Calibri Light" panose="020F0302020204030204" pitchFamily="34" charset="0"/>
                   <a:sym typeface="Source Sans Pro Light"/>
                 </a:rPr>
-                <a:t>setwd</a:t>
-              </a:r>
-              <a:r>
-                <a:rPr lang="en-US" sz="700" b="1" dirty="0">
-                  <a:solidFill>
-                    <a:schemeClr val="tx1"/>
-                  </a:solidFill>
-                  <a:latin typeface="Lucida Console" panose="020B0609040504020204" pitchFamily="49" charset="0"/>
+                <a:t>), do the following ..</a:t>
+              </a:r>
+              <a:r>
+                <a:rPr lang="en-US" sz="800" dirty="0" smtClean="0">
+                  <a:solidFill>
+                    <a:schemeClr val="tx1"/>
+                  </a:solidFill>
+                  <a:latin typeface="Calibri Light" panose="020F0302020204030204" pitchFamily="34" charset="0"/>
                   <a:ea typeface="Source Sans Pro Light"/>
                   <a:cs typeface="Calibri Light" panose="020F0302020204030204" pitchFamily="34" charset="0"/>
                   <a:sym typeface="Source Sans Pro Light"/>
                 </a:rPr>
-                <a:t>() </a:t>
-              </a:r>
-              <a:r>
-                <a:rPr lang="en-US" sz="800" dirty="0">
-                  <a:solidFill>
-                    <a:schemeClr val="tx1"/>
-                  </a:solidFill>
-                  <a:latin typeface="Calibri Light" panose="020F0302020204030204" pitchFamily="34" charset="0"/>
-                  <a:ea typeface="Source Sans Pro Light"/>
-                  <a:cs typeface="Calibri Light" panose="020F0302020204030204" pitchFamily="34" charset="0"/>
-                  <a:sym typeface="Source Sans Pro Light"/>
-                </a:rPr>
-                <a:t>code to </a:t>
-              </a:r>
-              <a:r>
-                <a:rPr lang="en-US" sz="800" dirty="0" smtClean="0">
-                  <a:solidFill>
-                    <a:schemeClr val="tx1"/>
-                  </a:solidFill>
-                  <a:latin typeface="Calibri Light" panose="020F0302020204030204" pitchFamily="34" charset="0"/>
-                  <a:ea typeface="Source Sans Pro Light"/>
-                  <a:cs typeface="Calibri Light" panose="020F0302020204030204" pitchFamily="34" charset="0"/>
-                  <a:sym typeface="Source Sans Pro Light"/>
-                </a:rPr>
-                <a:t>your script</a:t>
-              </a:r>
-              <a:r>
-                <a:rPr lang="en-US" sz="800" dirty="0">
-                  <a:solidFill>
-                    <a:schemeClr val="tx1"/>
-                  </a:solidFill>
-                  <a:latin typeface="Calibri Light" panose="020F0302020204030204" pitchFamily="34" charset="0"/>
-                  <a:ea typeface="Source Sans Pro Light"/>
-                  <a:cs typeface="Calibri Light" panose="020F0302020204030204" pitchFamily="34" charset="0"/>
-                  <a:sym typeface="Source Sans Pro Light"/>
-                </a:rPr>
                 <a:t>.</a:t>
               </a:r>
+              <a:endParaRPr lang="en-US" sz="800" dirty="0">
+                <a:solidFill>
+                  <a:schemeClr val="tx1"/>
+                </a:solidFill>
+                <a:latin typeface="Calibri Light" panose="020F0302020204030204" pitchFamily="34" charset="0"/>
+                <a:ea typeface="Source Sans Pro Light"/>
+                <a:cs typeface="Calibri Light" panose="020F0302020204030204" pitchFamily="34" charset="0"/>
+                <a:sym typeface="Source Sans Pro Light"/>
+              </a:endParaRPr>
             </a:p>
             <a:p>
               <a:pPr marL="95704" indent="-95704" algn="l">
@@ -10739,7 +10183,7 @@
             </a:ln>
             <a:extLst>
               <a:ext uri="{C572A759-6A51-4108-AA02-DFA0A04FC94B}">
-                <ma14:wrappingTextBoxFlag xmlns="" xmlns:ma14="http://schemas.microsoft.com/office/mac/drawingml/2011/main" val="1"/>
+                <ma14:wrappingTextBoxFlag xmlns:ma14="http://schemas.microsoft.com/office/mac/drawingml/2011/main" xmlns="" val="1"/>
               </a:ext>
             </a:extLst>
           </p:spPr>
@@ -11043,6 +10487,481 @@
                 </a:rPr>
                 <a:t>)</a:t>
               </a:r>
+            </a:p>
+          </p:txBody>
+        </p:sp>
+        <p:sp>
+          <p:nvSpPr>
+            <p:cNvPr id="105" name="Shape 34"/>
+            <p:cNvSpPr/>
+            <p:nvPr/>
+          </p:nvSpPr>
+          <p:spPr>
+            <a:xfrm>
+              <a:off x="6156895" y="2810328"/>
+              <a:ext cx="2926080" cy="895892"/>
+            </a:xfrm>
+            <a:prstGeom prst="rect">
+              <a:avLst/>
+            </a:prstGeom>
+            <a:solidFill>
+              <a:srgbClr val="FCFAEE"/>
+            </a:solidFill>
+            <a:ln w="12700">
+              <a:miter lim="400000"/>
+            </a:ln>
+          </p:spPr>
+          <p:txBody>
+            <a:bodyPr lIns="18288" tIns="45720" rIns="0" bIns="0" anchor="t">
+              <a:noAutofit/>
+            </a:bodyPr>
+            <a:lstStyle/>
+            <a:p>
+              <a:pPr algn="l" latinLnBrk="1"/>
+              <a:r>
+                <a:rPr lang="en-US" sz="600" dirty="0" smtClean="0">
+                  <a:latin typeface="Courier New" panose="02070309020205020404" pitchFamily="49" charset="0"/>
+                  <a:cs typeface="Courier New" panose="02070309020205020404" pitchFamily="49" charset="0"/>
+                </a:rPr>
+                <a:t>&gt; </a:t>
+              </a:r>
+              <a:r>
+                <a:rPr lang="en-US" sz="600" b="1" dirty="0" err="1" smtClean="0">
+                  <a:solidFill>
+                    <a:srgbClr val="C00000"/>
+                  </a:solidFill>
+                  <a:latin typeface="Courier New" panose="02070309020205020404" pitchFamily="49" charset="0"/>
+                  <a:cs typeface="Courier New" panose="02070309020205020404" pitchFamily="49" charset="0"/>
+                </a:rPr>
+                <a:t>dfcar</a:t>
+              </a:r>
+              <a:r>
+                <a:rPr lang="en-US" sz="600" b="1" dirty="0" smtClean="0">
+                  <a:solidFill>
+                    <a:srgbClr val="C00000"/>
+                  </a:solidFill>
+                  <a:latin typeface="Courier New" panose="02070309020205020404" pitchFamily="49" charset="0"/>
+                  <a:cs typeface="Courier New" panose="02070309020205020404" pitchFamily="49" charset="0"/>
+                </a:rPr>
+                <a:t> </a:t>
+              </a:r>
+              <a:r>
+                <a:rPr lang="en-US" sz="600" b="1" dirty="0">
+                  <a:solidFill>
+                    <a:schemeClr val="accent2">
+                      <a:lumMod val="50000"/>
+                    </a:schemeClr>
+                  </a:solidFill>
+                  <a:latin typeface="Courier New" panose="02070309020205020404" pitchFamily="49" charset="0"/>
+                  <a:cs typeface="Courier New" panose="02070309020205020404" pitchFamily="49" charset="0"/>
+                </a:rPr>
+                <a:t>&lt;- read.csv</a:t>
+              </a:r>
+              <a:r>
+                <a:rPr lang="en-US" sz="600" b="1" dirty="0" smtClean="0">
+                  <a:solidFill>
+                    <a:schemeClr val="accent2">
+                      <a:lumMod val="50000"/>
+                    </a:schemeClr>
+                  </a:solidFill>
+                  <a:latin typeface="Courier New" panose="02070309020205020404" pitchFamily="49" charset="0"/>
+                  <a:cs typeface="Courier New" panose="02070309020205020404" pitchFamily="49" charset="0"/>
+                </a:rPr>
+                <a:t>("</a:t>
+              </a:r>
+              <a:r>
+                <a:rPr lang="en-US" sz="600" b="1" dirty="0" smtClean="0">
+                  <a:solidFill>
+                    <a:srgbClr val="C00000"/>
+                  </a:solidFill>
+                  <a:latin typeface="Courier New" panose="02070309020205020404" pitchFamily="49" charset="0"/>
+                  <a:cs typeface="Courier New" panose="02070309020205020404" pitchFamily="49" charset="0"/>
+                </a:rPr>
+                <a:t>93cars.csv</a:t>
+              </a:r>
+              <a:r>
+                <a:rPr lang="en-US" sz="600" b="1" dirty="0">
+                  <a:solidFill>
+                    <a:schemeClr val="accent2">
+                      <a:lumMod val="50000"/>
+                    </a:schemeClr>
+                  </a:solidFill>
+                  <a:latin typeface="Courier New" panose="02070309020205020404" pitchFamily="49" charset="0"/>
+                  <a:cs typeface="Courier New" panose="02070309020205020404" pitchFamily="49" charset="0"/>
+                </a:rPr>
+                <a:t>")</a:t>
+              </a:r>
+              <a:r>
+                <a:rPr lang="en-US" sz="600" dirty="0">
+                  <a:latin typeface="Courier New" panose="02070309020205020404" pitchFamily="49" charset="0"/>
+                  <a:cs typeface="Courier New" panose="02070309020205020404" pitchFamily="49" charset="0"/>
+                </a:rPr>
+                <a:t/>
+              </a:r>
+              <a:br>
+                <a:rPr lang="en-US" sz="600" dirty="0">
+                  <a:latin typeface="Courier New" panose="02070309020205020404" pitchFamily="49" charset="0"/>
+                  <a:cs typeface="Courier New" panose="02070309020205020404" pitchFamily="49" charset="0"/>
+                </a:rPr>
+              </a:br>
+              <a:r>
+                <a:rPr lang="en-US" sz="600" dirty="0" smtClean="0">
+                  <a:latin typeface="Courier New" panose="02070309020205020404" pitchFamily="49" charset="0"/>
+                  <a:cs typeface="Courier New" panose="02070309020205020404" pitchFamily="49" charset="0"/>
+                </a:rPr>
+                <a:t>&gt; </a:t>
+              </a:r>
+              <a:r>
+                <a:rPr lang="en-US" sz="600" b="1" dirty="0" err="1" smtClean="0">
+                  <a:solidFill>
+                    <a:schemeClr val="accent2">
+                      <a:lumMod val="50000"/>
+                    </a:schemeClr>
+                  </a:solidFill>
+                  <a:latin typeface="Courier New" panose="02070309020205020404" pitchFamily="49" charset="0"/>
+                  <a:cs typeface="Courier New" panose="02070309020205020404" pitchFamily="49" charset="0"/>
+                </a:rPr>
+                <a:t>str</a:t>
+              </a:r>
+              <a:r>
+                <a:rPr lang="en-US" sz="600" b="1" dirty="0" smtClean="0">
+                  <a:solidFill>
+                    <a:schemeClr val="accent2">
+                      <a:lumMod val="50000"/>
+                    </a:schemeClr>
+                  </a:solidFill>
+                  <a:latin typeface="Courier New" panose="02070309020205020404" pitchFamily="49" charset="0"/>
+                  <a:cs typeface="Courier New" panose="02070309020205020404" pitchFamily="49" charset="0"/>
+                </a:rPr>
+                <a:t>(</a:t>
+              </a:r>
+              <a:r>
+                <a:rPr lang="en-US" sz="600" b="1" dirty="0" err="1" smtClean="0">
+                  <a:solidFill>
+                    <a:srgbClr val="C00000"/>
+                  </a:solidFill>
+                  <a:latin typeface="Courier New" panose="02070309020205020404" pitchFamily="49" charset="0"/>
+                  <a:cs typeface="Courier New" panose="02070309020205020404" pitchFamily="49" charset="0"/>
+                </a:rPr>
+                <a:t>dfcar</a:t>
+              </a:r>
+              <a:r>
+                <a:rPr lang="en-US" sz="600" b="1" dirty="0" smtClean="0">
+                  <a:solidFill>
+                    <a:schemeClr val="accent2">
+                      <a:lumMod val="50000"/>
+                    </a:schemeClr>
+                  </a:solidFill>
+                  <a:latin typeface="Courier New" panose="02070309020205020404" pitchFamily="49" charset="0"/>
+                  <a:cs typeface="Courier New" panose="02070309020205020404" pitchFamily="49" charset="0"/>
+                </a:rPr>
+                <a:t>)</a:t>
+              </a:r>
+              <a:endParaRPr lang="en-US" sz="600" b="1" dirty="0">
+                <a:solidFill>
+                  <a:schemeClr val="accent2">
+                    <a:lumMod val="50000"/>
+                  </a:schemeClr>
+                </a:solidFill>
+                <a:latin typeface="Courier New" panose="02070309020205020404" pitchFamily="49" charset="0"/>
+                <a:cs typeface="Courier New" panose="02070309020205020404" pitchFamily="49" charset="0"/>
+              </a:endParaRPr>
+            </a:p>
+            <a:p>
+              <a:pPr algn="l"/>
+              <a:r>
+                <a:rPr lang="en-US" sz="600" dirty="0">
+                  <a:latin typeface="Courier New" panose="02070309020205020404" pitchFamily="49" charset="0"/>
+                  <a:cs typeface="Courier New" panose="02070309020205020404" pitchFamily="49" charset="0"/>
+                </a:rPr>
+                <a:t>'</a:t>
+              </a:r>
+              <a:r>
+                <a:rPr lang="en-US" sz="600" dirty="0" err="1">
+                  <a:latin typeface="Courier New" panose="02070309020205020404" pitchFamily="49" charset="0"/>
+                  <a:cs typeface="Courier New" panose="02070309020205020404" pitchFamily="49" charset="0"/>
+                </a:rPr>
+                <a:t>data.frame</a:t>
+              </a:r>
+              <a:r>
+                <a:rPr lang="en-US" sz="600" dirty="0">
+                  <a:latin typeface="Courier New" panose="02070309020205020404" pitchFamily="49" charset="0"/>
+                  <a:cs typeface="Courier New" panose="02070309020205020404" pitchFamily="49" charset="0"/>
+                </a:rPr>
+                <a:t>':    93 obs. of  26 variables:</a:t>
+              </a:r>
+              <a:br>
+                <a:rPr lang="en-US" sz="600" dirty="0">
+                  <a:latin typeface="Courier New" panose="02070309020205020404" pitchFamily="49" charset="0"/>
+                  <a:cs typeface="Courier New" panose="02070309020205020404" pitchFamily="49" charset="0"/>
+                </a:rPr>
+              </a:br>
+              <a:r>
+                <a:rPr lang="en-US" sz="600" dirty="0">
+                  <a:latin typeface="Courier New" panose="02070309020205020404" pitchFamily="49" charset="0"/>
+                  <a:cs typeface="Courier New" panose="02070309020205020404" pitchFamily="49" charset="0"/>
+                </a:rPr>
+                <a:t>  $ Type    </a:t>
+              </a:r>
+              <a:r>
+                <a:rPr lang="en-US" sz="600" dirty="0" smtClean="0">
+                  <a:latin typeface="Courier New" panose="02070309020205020404" pitchFamily="49" charset="0"/>
+                  <a:cs typeface="Courier New" panose="02070309020205020404" pitchFamily="49" charset="0"/>
+                </a:rPr>
+                <a:t>: </a:t>
+              </a:r>
+              <a:r>
+                <a:rPr lang="en-US" sz="600" dirty="0">
+                  <a:latin typeface="Courier New" panose="02070309020205020404" pitchFamily="49" charset="0"/>
+                  <a:cs typeface="Courier New" panose="02070309020205020404" pitchFamily="49" charset="0"/>
+                </a:rPr>
+                <a:t>Factor w/ 6 levels "</a:t>
+              </a:r>
+              <a:r>
+                <a:rPr lang="en-US" sz="600" dirty="0" err="1" smtClean="0">
+                  <a:latin typeface="Courier New" panose="02070309020205020404" pitchFamily="49" charset="0"/>
+                  <a:cs typeface="Courier New" panose="02070309020205020404" pitchFamily="49" charset="0"/>
+                </a:rPr>
+                <a:t>Compact","Large</a:t>
+              </a:r>
+              <a:r>
+                <a:rPr lang="en-US" sz="600" dirty="0" smtClean="0">
+                  <a:latin typeface="Courier New" panose="02070309020205020404" pitchFamily="49" charset="0"/>
+                  <a:cs typeface="Courier New" panose="02070309020205020404" pitchFamily="49" charset="0"/>
+                </a:rPr>
+                <a:t>": </a:t>
+              </a:r>
+              <a:r>
+                <a:rPr lang="en-US" sz="600" dirty="0">
+                  <a:latin typeface="Courier New" panose="02070309020205020404" pitchFamily="49" charset="0"/>
+                  <a:cs typeface="Courier New" panose="02070309020205020404" pitchFamily="49" charset="0"/>
+                </a:rPr>
+                <a:t>4 </a:t>
+              </a:r>
+              <a:r>
+                <a:rPr lang="en-US" sz="600" dirty="0" smtClean="0">
+                  <a:latin typeface="Courier New" panose="02070309020205020404" pitchFamily="49" charset="0"/>
+                  <a:cs typeface="Courier New" panose="02070309020205020404" pitchFamily="49" charset="0"/>
+                </a:rPr>
+                <a:t>3 3 ...</a:t>
+              </a:r>
+              <a:r>
+                <a:rPr lang="en-US" sz="600" dirty="0">
+                  <a:latin typeface="Courier New" panose="02070309020205020404" pitchFamily="49" charset="0"/>
+                  <a:cs typeface="Courier New" panose="02070309020205020404" pitchFamily="49" charset="0"/>
+                </a:rPr>
+                <a:t/>
+              </a:r>
+              <a:br>
+                <a:rPr lang="en-US" sz="600" dirty="0">
+                  <a:latin typeface="Courier New" panose="02070309020205020404" pitchFamily="49" charset="0"/>
+                  <a:cs typeface="Courier New" panose="02070309020205020404" pitchFamily="49" charset="0"/>
+                </a:rPr>
+              </a:br>
+              <a:r>
+                <a:rPr lang="en-US" sz="600" dirty="0">
+                  <a:latin typeface="Courier New" panose="02070309020205020404" pitchFamily="49" charset="0"/>
+                  <a:cs typeface="Courier New" panose="02070309020205020404" pitchFamily="49" charset="0"/>
+                </a:rPr>
+                <a:t>  $ HMPG    </a:t>
+              </a:r>
+              <a:r>
+                <a:rPr lang="en-US" sz="600" dirty="0" smtClean="0">
+                  <a:latin typeface="Courier New" panose="02070309020205020404" pitchFamily="49" charset="0"/>
+                  <a:cs typeface="Courier New" panose="02070309020205020404" pitchFamily="49" charset="0"/>
+                </a:rPr>
+                <a:t>: </a:t>
+              </a:r>
+              <a:r>
+                <a:rPr lang="en-US" sz="600" dirty="0" err="1">
+                  <a:latin typeface="Courier New" panose="02070309020205020404" pitchFamily="49" charset="0"/>
+                  <a:cs typeface="Courier New" panose="02070309020205020404" pitchFamily="49" charset="0"/>
+                </a:rPr>
+                <a:t>int</a:t>
+              </a:r>
+              <a:r>
+                <a:rPr lang="en-US" sz="600" dirty="0">
+                  <a:latin typeface="Courier New" panose="02070309020205020404" pitchFamily="49" charset="0"/>
+                  <a:cs typeface="Courier New" panose="02070309020205020404" pitchFamily="49" charset="0"/>
+                </a:rPr>
+                <a:t>  31 25 26 26 30 </a:t>
+              </a:r>
+              <a:r>
+                <a:rPr lang="en-US" sz="600" dirty="0" smtClean="0">
+                  <a:latin typeface="Courier New" panose="02070309020205020404" pitchFamily="49" charset="0"/>
+                  <a:cs typeface="Courier New" panose="02070309020205020404" pitchFamily="49" charset="0"/>
+                </a:rPr>
+                <a:t>31 28 25 27 25...</a:t>
+              </a:r>
+              <a:r>
+                <a:rPr lang="en-US" sz="600" dirty="0">
+                  <a:latin typeface="Courier New" panose="02070309020205020404" pitchFamily="49" charset="0"/>
+                  <a:cs typeface="Courier New" panose="02070309020205020404" pitchFamily="49" charset="0"/>
+                </a:rPr>
+                <a:t/>
+              </a:r>
+              <a:br>
+                <a:rPr lang="en-US" sz="600" dirty="0">
+                  <a:latin typeface="Courier New" panose="02070309020205020404" pitchFamily="49" charset="0"/>
+                  <a:cs typeface="Courier New" panose="02070309020205020404" pitchFamily="49" charset="0"/>
+                </a:rPr>
+              </a:br>
+              <a:r>
+                <a:rPr lang="en-US" sz="600" dirty="0">
+                  <a:latin typeface="Courier New" panose="02070309020205020404" pitchFamily="49" charset="0"/>
+                  <a:cs typeface="Courier New" panose="02070309020205020404" pitchFamily="49" charset="0"/>
+                </a:rPr>
+                <a:t>  $ Manual  </a:t>
+              </a:r>
+              <a:r>
+                <a:rPr lang="en-US" sz="600" dirty="0" smtClean="0">
+                  <a:latin typeface="Courier New" panose="02070309020205020404" pitchFamily="49" charset="0"/>
+                  <a:cs typeface="Courier New" panose="02070309020205020404" pitchFamily="49" charset="0"/>
+                </a:rPr>
+                <a:t>: </a:t>
+              </a:r>
+              <a:r>
+                <a:rPr lang="en-US" sz="600" dirty="0">
+                  <a:latin typeface="Courier New" panose="02070309020205020404" pitchFamily="49" charset="0"/>
+                  <a:cs typeface="Courier New" panose="02070309020205020404" pitchFamily="49" charset="0"/>
+                </a:rPr>
+                <a:t>Factor w/ 2 levels "</a:t>
+              </a:r>
+              <a:r>
+                <a:rPr lang="en-US" sz="600" dirty="0" err="1" smtClean="0">
+                  <a:latin typeface="Courier New" panose="02070309020205020404" pitchFamily="49" charset="0"/>
+                  <a:cs typeface="Courier New" panose="02070309020205020404" pitchFamily="49" charset="0"/>
+                </a:rPr>
+                <a:t>No","Yes</a:t>
+              </a:r>
+              <a:r>
+                <a:rPr lang="en-US" sz="600" dirty="0" smtClean="0">
+                  <a:latin typeface="Courier New" panose="02070309020205020404" pitchFamily="49" charset="0"/>
+                  <a:cs typeface="Courier New" panose="02070309020205020404" pitchFamily="49" charset="0"/>
+                </a:rPr>
+                <a:t>": </a:t>
+              </a:r>
+              <a:r>
+                <a:rPr lang="en-US" sz="600" dirty="0">
+                  <a:latin typeface="Courier New" panose="02070309020205020404" pitchFamily="49" charset="0"/>
+                  <a:cs typeface="Courier New" panose="02070309020205020404" pitchFamily="49" charset="0"/>
+                </a:rPr>
+                <a:t>2 </a:t>
+              </a:r>
+              <a:r>
+                <a:rPr lang="en-US" sz="600" dirty="0" smtClean="0">
+                  <a:latin typeface="Courier New" panose="02070309020205020404" pitchFamily="49" charset="0"/>
+                  <a:cs typeface="Courier New" panose="02070309020205020404" pitchFamily="49" charset="0"/>
+                </a:rPr>
+                <a:t>2 2 2 2 1 1 ...</a:t>
+              </a:r>
+              <a:r>
+                <a:rPr lang="en-US" sz="600" dirty="0">
+                  <a:latin typeface="Courier New" panose="02070309020205020404" pitchFamily="49" charset="0"/>
+                  <a:cs typeface="Courier New" panose="02070309020205020404" pitchFamily="49" charset="0"/>
+                </a:rPr>
+                <a:t/>
+              </a:r>
+              <a:br>
+                <a:rPr lang="en-US" sz="600" dirty="0">
+                  <a:latin typeface="Courier New" panose="02070309020205020404" pitchFamily="49" charset="0"/>
+                  <a:cs typeface="Courier New" panose="02070309020205020404" pitchFamily="49" charset="0"/>
+                </a:rPr>
+              </a:br>
+              <a:r>
+                <a:rPr lang="en-US" sz="600" dirty="0">
+                  <a:latin typeface="Courier New" panose="02070309020205020404" pitchFamily="49" charset="0"/>
+                  <a:cs typeface="Courier New" panose="02070309020205020404" pitchFamily="49" charset="0"/>
+                </a:rPr>
+                <a:t>  $ Weight  </a:t>
+              </a:r>
+              <a:r>
+                <a:rPr lang="en-US" sz="600" dirty="0" smtClean="0">
+                  <a:latin typeface="Courier New" panose="02070309020205020404" pitchFamily="49" charset="0"/>
+                  <a:cs typeface="Courier New" panose="02070309020205020404" pitchFamily="49" charset="0"/>
+                </a:rPr>
+                <a:t>: </a:t>
+              </a:r>
+              <a:r>
+                <a:rPr lang="en-US" sz="600" dirty="0" err="1">
+                  <a:latin typeface="Courier New" panose="02070309020205020404" pitchFamily="49" charset="0"/>
+                  <a:cs typeface="Courier New" panose="02070309020205020404" pitchFamily="49" charset="0"/>
+                </a:rPr>
+                <a:t>int</a:t>
+              </a:r>
+              <a:r>
+                <a:rPr lang="en-US" sz="600" dirty="0">
+                  <a:latin typeface="Courier New" panose="02070309020205020404" pitchFamily="49" charset="0"/>
+                  <a:cs typeface="Courier New" panose="02070309020205020404" pitchFamily="49" charset="0"/>
+                </a:rPr>
+                <a:t>  2705 3560 3375 3</a:t>
+              </a:r>
+              <a:r>
+                <a:rPr lang="en-US" sz="600" dirty="0" smtClean="0">
+                  <a:latin typeface="Courier New" panose="02070309020205020404" pitchFamily="49" charset="0"/>
+                  <a:cs typeface="Courier New" panose="02070309020205020404" pitchFamily="49" charset="0"/>
+                </a:rPr>
+                <a:t>405 3640 2880 3470 </a:t>
+              </a:r>
+              <a:r>
+                <a:rPr lang="en-US" sz="600" dirty="0">
+                  <a:latin typeface="Courier New" panose="02070309020205020404" pitchFamily="49" charset="0"/>
+                  <a:cs typeface="Courier New" panose="02070309020205020404" pitchFamily="49" charset="0"/>
+                </a:rPr>
+                <a:t>...</a:t>
+              </a:r>
+              <a:br>
+                <a:rPr lang="en-US" sz="600" dirty="0">
+                  <a:latin typeface="Courier New" panose="02070309020205020404" pitchFamily="49" charset="0"/>
+                  <a:cs typeface="Courier New" panose="02070309020205020404" pitchFamily="49" charset="0"/>
+                </a:rPr>
+              </a:br>
+              <a:r>
+                <a:rPr lang="en-US" sz="600" dirty="0">
+                  <a:latin typeface="Courier New" panose="02070309020205020404" pitchFamily="49" charset="0"/>
+                  <a:cs typeface="Courier New" panose="02070309020205020404" pitchFamily="49" charset="0"/>
+                </a:rPr>
+                <a:t>  $ </a:t>
+              </a:r>
+              <a:r>
+                <a:rPr lang="en-US" sz="600" dirty="0" smtClean="0">
+                  <a:latin typeface="Courier New" panose="02070309020205020404" pitchFamily="49" charset="0"/>
+                  <a:cs typeface="Courier New" panose="02070309020205020404" pitchFamily="49" charset="0"/>
+                </a:rPr>
+                <a:t>Domestic: </a:t>
+              </a:r>
+              <a:r>
+                <a:rPr lang="en-US" sz="600" dirty="0">
+                  <a:latin typeface="Courier New" panose="02070309020205020404" pitchFamily="49" charset="0"/>
+                  <a:cs typeface="Courier New" panose="02070309020205020404" pitchFamily="49" charset="0"/>
+                </a:rPr>
+                <a:t>Factor w/ 2 levels "</a:t>
+              </a:r>
+              <a:r>
+                <a:rPr lang="en-US" sz="600" dirty="0" err="1">
+                  <a:latin typeface="Courier New" panose="02070309020205020404" pitchFamily="49" charset="0"/>
+                  <a:cs typeface="Courier New" panose="02070309020205020404" pitchFamily="49" charset="0"/>
+                </a:rPr>
+                <a:t>No","Yes</a:t>
+              </a:r>
+              <a:r>
+                <a:rPr lang="en-US" sz="600" dirty="0">
+                  <a:latin typeface="Courier New" panose="02070309020205020404" pitchFamily="49" charset="0"/>
+                  <a:cs typeface="Courier New" panose="02070309020205020404" pitchFamily="49" charset="0"/>
+                </a:rPr>
+                <a:t>": 1 </a:t>
+              </a:r>
+              <a:r>
+                <a:rPr lang="en-US" sz="600" dirty="0" smtClean="0">
+                  <a:latin typeface="Courier New" panose="02070309020205020404" pitchFamily="49" charset="0"/>
+                  <a:cs typeface="Courier New" panose="02070309020205020404" pitchFamily="49" charset="0"/>
+                </a:rPr>
+                <a:t>1 1 1 1 2 2 ...</a:t>
+              </a:r>
+              <a:endParaRPr lang="en-US" sz="600" dirty="0">
+                <a:latin typeface="Courier New" panose="02070309020205020404" pitchFamily="49" charset="0"/>
+                <a:cs typeface="Courier New" panose="02070309020205020404" pitchFamily="49" charset="0"/>
+              </a:endParaRPr>
             </a:p>
           </p:txBody>
         </p:sp>
@@ -11144,8 +11063,8 @@
         </p:nvSpPr>
         <p:spPr>
           <a:xfrm>
-            <a:off x="8230129" y="6639280"/>
-            <a:ext cx="813925" cy="248705"/>
+            <a:off x="8223717" y="6639280"/>
+            <a:ext cx="826749" cy="248705"/>
           </a:xfrm>
           <a:prstGeom prst="rect">
             <a:avLst/>
@@ -11192,7 +11111,7 @@
               <a:tabLst/>
             </a:pPr>
             <a:r>
-              <a:rPr kumimoji="0" lang="en-US" sz="900" b="0" i="0" u="none" strike="noStrike" cap="none" spc="0" normalizeH="0" baseline="0" dirty="0" smtClean="0">
+              <a:rPr kumimoji="0" lang="en-US" sz="900" b="0" i="0" u="none" strike="noStrike" cap="none" spc="0" normalizeH="0" baseline="0" smtClean="0">
                 <a:ln>
                   <a:noFill/>
                 </a:ln>
@@ -11209,7 +11128,7 @@
               <a:t>Revised </a:t>
             </a:r>
             <a:r>
-              <a:rPr lang="en-US" sz="900" dirty="0" smtClean="0">
+              <a:rPr lang="en-US" sz="900" smtClean="0">
                 <a:solidFill>
                   <a:schemeClr val="bg1">
                     <a:lumMod val="50000"/>
@@ -11217,10 +11136,10 @@
                 </a:solidFill>
                 <a:latin typeface="Calibri" panose="020F0502020204030204" pitchFamily="34" charset="0"/>
               </a:rPr>
-              <a:t>Oct</a:t>
+              <a:t>Dec</a:t>
             </a:r>
             <a:r>
-              <a:rPr kumimoji="0" lang="en-US" sz="900" b="0" i="0" u="none" strike="noStrike" cap="none" spc="0" normalizeH="0" baseline="0" dirty="0" smtClean="0">
+              <a:rPr kumimoji="0" lang="en-US" sz="900" b="0" i="0" u="none" strike="noStrike" cap="none" spc="0" normalizeH="0" baseline="0" smtClean="0">
                 <a:ln>
                   <a:noFill/>
                 </a:ln>
@@ -11363,7 +11282,7 @@
           </a:ln>
           <a:extLst>
             <a:ext uri="{C572A759-6A51-4108-AA02-DFA0A04FC94B}">
-              <ma14:wrappingTextBoxFlag xmlns="" xmlns:ma14="http://schemas.microsoft.com/office/mac/drawingml/2011/main" val="1"/>
+              <ma14:wrappingTextBoxFlag xmlns:ma14="http://schemas.microsoft.com/office/mac/drawingml/2011/main" xmlns="" val="1"/>
             </a:ext>
           </a:extLst>
         </p:spPr>
@@ -12287,7 +12206,7 @@
                   <a:latin typeface="Courier New" panose="02070309020205020404" pitchFamily="49" charset="0"/>
                   <a:cs typeface="Courier New" panose="02070309020205020404" pitchFamily="49" charset="0"/>
                 </a:rPr>
-                <a:t>  labs(x</a:t>
+                <a:t>  </a:t>
               </a:r>
               <a:r>
                 <a:rPr lang="en-US" sz="600" b="1" dirty="0">
@@ -12299,6 +12218,52 @@
                   <a:latin typeface="Courier New" panose="02070309020205020404" pitchFamily="49" charset="0"/>
                   <a:cs typeface="Courier New" panose="02070309020205020404" pitchFamily="49" charset="0"/>
                 </a:rPr>
+                <a:t>labs(y="Frequency of </a:t>
+              </a:r>
+              <a:r>
+                <a:rPr lang="en-US" sz="600" b="1" dirty="0" err="1" smtClean="0">
+                  <a:solidFill>
+                    <a:srgbClr val="C00000"/>
+                  </a:solidFill>
+                  <a:latin typeface="Courier New" panose="02070309020205020404" pitchFamily="49" charset="0"/>
+                  <a:cs typeface="Courier New" panose="02070309020205020404" pitchFamily="49" charset="0"/>
+                </a:rPr>
+                <a:t>Cars</a:t>
+              </a:r>
+              <a:r>
+                <a:rPr lang="en-US" sz="600" b="1" dirty="0" err="1">
+                  <a:solidFill>
+                    <a:schemeClr val="accent2">
+                      <a:lumMod val="50000"/>
+                    </a:schemeClr>
+                  </a:solidFill>
+                  <a:latin typeface="Courier New" panose="02070309020205020404" pitchFamily="49" charset="0"/>
+                  <a:cs typeface="Courier New" panose="02070309020205020404" pitchFamily="49" charset="0"/>
+                </a:rPr>
+                <a:t>"</a:t>
+              </a:r>
+              <a:r>
+                <a:rPr lang="en-US" sz="600" b="1" dirty="0" err="1" smtClean="0">
+                  <a:solidFill>
+                    <a:schemeClr val="accent2">
+                      <a:lumMod val="50000"/>
+                    </a:schemeClr>
+                  </a:solidFill>
+                  <a:latin typeface="Courier New" panose="02070309020205020404" pitchFamily="49" charset="0"/>
+                  <a:cs typeface="Courier New" panose="02070309020205020404" pitchFamily="49" charset="0"/>
+                </a:rPr>
+                <a:t>,x</a:t>
+              </a:r>
+              <a:r>
+                <a:rPr lang="en-US" sz="600" b="1" dirty="0">
+                  <a:solidFill>
+                    <a:schemeClr val="accent2">
+                      <a:lumMod val="50000"/>
+                    </a:schemeClr>
+                  </a:solidFill>
+                  <a:latin typeface="Courier New" panose="02070309020205020404" pitchFamily="49" charset="0"/>
+                  <a:cs typeface="Courier New" panose="02070309020205020404" pitchFamily="49" charset="0"/>
+                </a:rPr>
                 <a:t>="</a:t>
               </a:r>
               <a:r>
@@ -12309,29 +12274,19 @@
                   <a:latin typeface="Courier New" panose="02070309020205020404" pitchFamily="49" charset="0"/>
                   <a:cs typeface="Courier New" panose="02070309020205020404" pitchFamily="49" charset="0"/>
                 </a:rPr>
-                <a:t>Highway </a:t>
-              </a:r>
-              <a:r>
-                <a:rPr lang="en-US" sz="600" b="1" dirty="0" err="1">
-                  <a:solidFill>
-                    <a:srgbClr val="C00000"/>
-                  </a:solidFill>
-                  <a:latin typeface="Courier New" panose="02070309020205020404" pitchFamily="49" charset="0"/>
-                  <a:cs typeface="Courier New" panose="02070309020205020404" pitchFamily="49" charset="0"/>
-                </a:rPr>
-                <a:t>MPG</a:t>
-              </a:r>
-              <a:r>
-                <a:rPr lang="en-US" sz="600" b="1" dirty="0" err="1">
-                  <a:solidFill>
-                    <a:schemeClr val="accent2">
-                      <a:lumMod val="50000"/>
-                    </a:schemeClr>
-                  </a:solidFill>
-                  <a:latin typeface="Courier New" panose="02070309020205020404" pitchFamily="49" charset="0"/>
-                  <a:cs typeface="Courier New" panose="02070309020205020404" pitchFamily="49" charset="0"/>
-                </a:rPr>
-                <a:t>",y</a:t>
+                <a:t>Highway MPG</a:t>
+              </a:r>
+              <a:r>
+                <a:rPr lang="en-US" sz="600" b="1" dirty="0" smtClean="0">
+                  <a:solidFill>
+                    <a:schemeClr val="accent2">
+                      <a:lumMod val="50000"/>
+                    </a:schemeClr>
+                  </a:solidFill>
+                  <a:latin typeface="Courier New" panose="02070309020205020404" pitchFamily="49" charset="0"/>
+                  <a:cs typeface="Courier New" panose="02070309020205020404" pitchFamily="49" charset="0"/>
+                </a:rPr>
+                <a:t>") </a:t>
               </a:r>
               <a:r>
                 <a:rPr lang="en-US" sz="600" b="1" dirty="0">
@@ -12343,29 +12298,7 @@
                   <a:latin typeface="Courier New" panose="02070309020205020404" pitchFamily="49" charset="0"/>
                   <a:cs typeface="Courier New" panose="02070309020205020404" pitchFamily="49" charset="0"/>
                 </a:rPr>
-                <a:t>="Frequency of </a:t>
-              </a:r>
-              <a:r>
-                <a:rPr lang="en-US" sz="600" b="1" dirty="0">
-                  <a:solidFill>
-                    <a:srgbClr val="C00000"/>
-                  </a:solidFill>
-                  <a:latin typeface="Courier New" panose="02070309020205020404" pitchFamily="49" charset="0"/>
-                  <a:cs typeface="Courier New" panose="02070309020205020404" pitchFamily="49" charset="0"/>
-                </a:rPr>
-                <a:t>Cars</a:t>
-              </a:r>
-              <a:r>
-                <a:rPr lang="en-US" sz="600" b="1" dirty="0">
-                  <a:solidFill>
-                    <a:schemeClr val="accent2">
-                      <a:lumMod val="50000"/>
-                    </a:schemeClr>
-                  </a:solidFill>
-                  <a:latin typeface="Courier New" panose="02070309020205020404" pitchFamily="49" charset="0"/>
-                  <a:cs typeface="Courier New" panose="02070309020205020404" pitchFamily="49" charset="0"/>
-                </a:rPr>
-                <a:t>") +</a:t>
+                <a:t>+</a:t>
               </a:r>
             </a:p>
             <a:p>
@@ -13637,7 +13570,74 @@
                   </a:solidFill>
                   <a:latin typeface="Calibri" panose="020F0502020204030204" pitchFamily="34" charset="0"/>
                 </a:rPr>
-                <a:t> labs(x=</a:t>
+                <a:t> </a:t>
+              </a:r>
+              <a:r>
+                <a:rPr lang="en-US" sz="800" dirty="0" smtClean="0">
+                  <a:solidFill>
+                    <a:schemeClr val="accent2">
+                      <a:lumMod val="50000"/>
+                    </a:schemeClr>
+                  </a:solidFill>
+                  <a:latin typeface="Calibri" panose="020F0502020204030204" pitchFamily="34" charset="0"/>
+                </a:rPr>
+                <a:t>labs(</a:t>
+              </a:r>
+              <a:r>
+                <a:rPr lang="en-US" sz="800" dirty="0">
+                  <a:solidFill>
+                    <a:schemeClr val="accent2">
+                      <a:lumMod val="50000"/>
+                    </a:schemeClr>
+                  </a:solidFill>
+                  <a:latin typeface="Calibri" panose="020F0502020204030204" pitchFamily="34" charset="0"/>
+                  <a:cs typeface="Courier New" panose="02070309020205020404" pitchFamily="49" charset="0"/>
+                </a:rPr>
+                <a:t>y="Frequency of </a:t>
+              </a:r>
+              <a:r>
+                <a:rPr lang="en-US" sz="800" dirty="0" err="1" smtClean="0">
+                  <a:solidFill>
+                    <a:srgbClr val="C00000"/>
+                  </a:solidFill>
+                  <a:latin typeface="Calibri" panose="020F0502020204030204" pitchFamily="34" charset="0"/>
+                  <a:cs typeface="Courier New" panose="02070309020205020404" pitchFamily="49" charset="0"/>
+                </a:rPr>
+                <a:t>XXX</a:t>
+              </a:r>
+              <a:r>
+                <a:rPr lang="en-US" sz="800" dirty="0" err="1" smtClean="0">
+                  <a:solidFill>
+                    <a:schemeClr val="accent2">
+                      <a:lumMod val="50000"/>
+                    </a:schemeClr>
+                  </a:solidFill>
+                  <a:latin typeface="Calibri" panose="020F0502020204030204" pitchFamily="34" charset="0"/>
+                  <a:cs typeface="Courier New" panose="02070309020205020404" pitchFamily="49" charset="0"/>
+                </a:rPr>
+                <a:t>“,</a:t>
+              </a:r>
+              <a:r>
+                <a:rPr lang="en-US" sz="800" dirty="0" err="1" smtClean="0">
+                  <a:solidFill>
+                    <a:schemeClr val="accent2">
+                      <a:lumMod val="50000"/>
+                    </a:schemeClr>
+                  </a:solidFill>
+                  <a:latin typeface="Calibri" panose="020F0502020204030204" pitchFamily="34" charset="0"/>
+                </a:rPr>
+                <a:t>x</a:t>
+              </a:r>
+              <a:r>
+                <a:rPr lang="en-US" sz="800" dirty="0" smtClean="0">
+                  <a:solidFill>
+                    <a:schemeClr val="accent2">
+                      <a:lumMod val="50000"/>
+                    </a:schemeClr>
+                  </a:solidFill>
+                  <a:latin typeface="Calibri" panose="020F0502020204030204" pitchFamily="34" charset="0"/>
+                </a:rPr>
+                <a:t>=</a:t>
               </a:r>
               <a:r>
                 <a:rPr lang="en-US" sz="800" b="1" dirty="0" smtClean="0">
@@ -13676,74 +13676,7 @@
                   </a:solidFill>
                   <a:latin typeface="Calibri" panose="020F0502020204030204" pitchFamily="34" charset="0"/>
                 </a:rPr>
-                <a:t> </a:t>
-              </a:r>
-              <a:r>
-                <a:rPr lang="en-US" sz="800" dirty="0" err="1" smtClean="0">
-                  <a:solidFill>
-                    <a:srgbClr val="C00000"/>
-                  </a:solidFill>
-                  <a:latin typeface="Calibri" panose="020F0502020204030204" pitchFamily="34" charset="0"/>
-                </a:rPr>
-                <a:t>label</a:t>
-              </a:r>
-              <a:r>
-                <a:rPr lang="en-US" sz="800" dirty="0" err="1">
-                  <a:solidFill>
-                    <a:schemeClr val="accent2">
-                      <a:lumMod val="50000"/>
-                    </a:schemeClr>
-                  </a:solidFill>
-                  <a:latin typeface="Calibri" panose="020F0502020204030204" pitchFamily="34" charset="0"/>
-                  <a:cs typeface="Courier New" panose="02070309020205020404" pitchFamily="49" charset="0"/>
-                </a:rPr>
-                <a:t>",</a:t>
-              </a:r>
-              <a:r>
-                <a:rPr lang="en-US" sz="800" dirty="0" err="1" smtClean="0">
-                  <a:solidFill>
-                    <a:schemeClr val="accent2">
-                      <a:lumMod val="50000"/>
-                    </a:schemeClr>
-                  </a:solidFill>
-                  <a:latin typeface="Calibri" panose="020F0502020204030204" pitchFamily="34" charset="0"/>
-                  <a:cs typeface="Courier New" panose="02070309020205020404" pitchFamily="49" charset="0"/>
-                </a:rPr>
-                <a:t>y</a:t>
-              </a:r>
-              <a:r>
-                <a:rPr lang="en-US" sz="800" dirty="0">
-                  <a:solidFill>
-                    <a:schemeClr val="accent2">
-                      <a:lumMod val="50000"/>
-                    </a:schemeClr>
-                  </a:solidFill>
-                  <a:latin typeface="Calibri" panose="020F0502020204030204" pitchFamily="34" charset="0"/>
-                  <a:cs typeface="Courier New" panose="02070309020205020404" pitchFamily="49" charset="0"/>
-                </a:rPr>
-                <a:t>="</a:t>
-              </a:r>
-              <a:r>
-                <a:rPr lang="en-US" sz="800" dirty="0" smtClean="0">
-                  <a:solidFill>
-                    <a:schemeClr val="accent2">
-                      <a:lumMod val="50000"/>
-                    </a:schemeClr>
-                  </a:solidFill>
-                  <a:latin typeface="Calibri" panose="020F0502020204030204" pitchFamily="34" charset="0"/>
-                  <a:cs typeface="Courier New" panose="02070309020205020404" pitchFamily="49" charset="0"/>
-                </a:rPr>
-                <a:t>Frequency of </a:t>
-              </a:r>
-              <a:r>
-                <a:rPr lang="en-US" sz="800" dirty="0" smtClean="0">
-                  <a:solidFill>
-                    <a:srgbClr val="C00000"/>
-                  </a:solidFill>
-                  <a:latin typeface="Calibri" panose="020F0502020204030204" pitchFamily="34" charset="0"/>
-                  <a:cs typeface="Courier New" panose="02070309020205020404" pitchFamily="49" charset="0"/>
-                </a:rPr>
-                <a:t>XXX</a:t>
+                <a:t> label</a:t>
               </a:r>
               <a:r>
                 <a:rPr lang="en-US" sz="800" dirty="0" smtClean="0">
@@ -13766,7 +13699,18 @@
                   </a:solidFill>
                   <a:latin typeface="Calibri" panose="020F0502020204030204" pitchFamily="34" charset="0"/>
                 </a:rPr>
-                <a:t>) +</a:t>
+                <a:t>) </a:t>
+              </a:r>
+              <a:r>
+                <a:rPr lang="en-US" sz="800" dirty="0" smtClean="0">
+                  <a:solidFill>
+                    <a:schemeClr val="accent2">
+                      <a:lumMod val="50000"/>
+                    </a:schemeClr>
+                  </a:solidFill>
+                  <a:latin typeface="Calibri" panose="020F0502020204030204" pitchFamily="34" charset="0"/>
+                </a:rPr>
+                <a:t>+</a:t>
               </a:r>
             </a:p>
             <a:p>
@@ -14015,7 +13959,7 @@
             </a:ln>
             <a:extLst>
               <a:ext uri="{C572A759-6A51-4108-AA02-DFA0A04FC94B}">
-                <ma14:wrappingTextBoxFlag xmlns="" xmlns:ma14="http://schemas.microsoft.com/office/mac/drawingml/2011/main" val="1"/>
+                <ma14:wrappingTextBoxFlag xmlns:ma14="http://schemas.microsoft.com/office/mac/drawingml/2011/main" xmlns="" val="1"/>
               </a:ext>
             </a:extLst>
           </p:spPr>
@@ -14677,7 +14621,7 @@
                   <a:latin typeface="Courier New" panose="02070309020205020404" pitchFamily="49" charset="0"/>
                   <a:cs typeface="Courier New" panose="02070309020205020404" pitchFamily="49" charset="0"/>
                 </a:rPr>
-                <a:t>  labs(x</a:t>
+                <a:t>  </a:t>
               </a:r>
               <a:r>
                 <a:rPr lang="en-US" sz="600" b="1" dirty="0">
@@ -14689,6 +14633,52 @@
                   <a:latin typeface="Courier New" panose="02070309020205020404" pitchFamily="49" charset="0"/>
                   <a:cs typeface="Courier New" panose="02070309020205020404" pitchFamily="49" charset="0"/>
                 </a:rPr>
+                <a:t>labs(y="Frequency of </a:t>
+              </a:r>
+              <a:r>
+                <a:rPr lang="en-US" sz="600" b="1" dirty="0" err="1" smtClean="0">
+                  <a:solidFill>
+                    <a:srgbClr val="C00000"/>
+                  </a:solidFill>
+                  <a:latin typeface="Courier New" panose="02070309020205020404" pitchFamily="49" charset="0"/>
+                  <a:cs typeface="Courier New" panose="02070309020205020404" pitchFamily="49" charset="0"/>
+                </a:rPr>
+                <a:t>Cars</a:t>
+              </a:r>
+              <a:r>
+                <a:rPr lang="en-US" sz="600" b="1" dirty="0" err="1">
+                  <a:solidFill>
+                    <a:schemeClr val="accent2">
+                      <a:lumMod val="50000"/>
+                    </a:schemeClr>
+                  </a:solidFill>
+                  <a:latin typeface="Courier New" panose="02070309020205020404" pitchFamily="49" charset="0"/>
+                  <a:cs typeface="Courier New" panose="02070309020205020404" pitchFamily="49" charset="0"/>
+                </a:rPr>
+                <a:t>"</a:t>
+              </a:r>
+              <a:r>
+                <a:rPr lang="en-US" sz="600" b="1" dirty="0" err="1" smtClean="0">
+                  <a:solidFill>
+                    <a:schemeClr val="accent2">
+                      <a:lumMod val="50000"/>
+                    </a:schemeClr>
+                  </a:solidFill>
+                  <a:latin typeface="Courier New" panose="02070309020205020404" pitchFamily="49" charset="0"/>
+                  <a:cs typeface="Courier New" panose="02070309020205020404" pitchFamily="49" charset="0"/>
+                </a:rPr>
+                <a:t>,x</a:t>
+              </a:r>
+              <a:r>
+                <a:rPr lang="en-US" sz="600" b="1" dirty="0">
+                  <a:solidFill>
+                    <a:schemeClr val="accent2">
+                      <a:lumMod val="50000"/>
+                    </a:schemeClr>
+                  </a:solidFill>
+                  <a:latin typeface="Courier New" panose="02070309020205020404" pitchFamily="49" charset="0"/>
+                  <a:cs typeface="Courier New" panose="02070309020205020404" pitchFamily="49" charset="0"/>
+                </a:rPr>
                 <a:t>="</a:t>
               </a:r>
               <a:r>
@@ -14699,29 +14689,19 @@
                   <a:latin typeface="Courier New" panose="02070309020205020404" pitchFamily="49" charset="0"/>
                   <a:cs typeface="Courier New" panose="02070309020205020404" pitchFamily="49" charset="0"/>
                 </a:rPr>
-                <a:t>Type of </a:t>
-              </a:r>
-              <a:r>
-                <a:rPr lang="en-US" sz="600" b="1" dirty="0" err="1">
-                  <a:solidFill>
-                    <a:srgbClr val="C00000"/>
-                  </a:solidFill>
-                  <a:latin typeface="Courier New" panose="02070309020205020404" pitchFamily="49" charset="0"/>
-                  <a:cs typeface="Courier New" panose="02070309020205020404" pitchFamily="49" charset="0"/>
-                </a:rPr>
-                <a:t>Car</a:t>
-              </a:r>
-              <a:r>
-                <a:rPr lang="en-US" sz="600" b="1" dirty="0" err="1">
-                  <a:solidFill>
-                    <a:schemeClr val="accent2">
-                      <a:lumMod val="50000"/>
-                    </a:schemeClr>
-                  </a:solidFill>
-                  <a:latin typeface="Courier New" panose="02070309020205020404" pitchFamily="49" charset="0"/>
-                  <a:cs typeface="Courier New" panose="02070309020205020404" pitchFamily="49" charset="0"/>
-                </a:rPr>
-                <a:t>",y</a:t>
+                <a:t>Type of Car</a:t>
+              </a:r>
+              <a:r>
+                <a:rPr lang="en-US" sz="600" b="1" dirty="0" smtClean="0">
+                  <a:solidFill>
+                    <a:schemeClr val="accent2">
+                      <a:lumMod val="50000"/>
+                    </a:schemeClr>
+                  </a:solidFill>
+                  <a:latin typeface="Courier New" panose="02070309020205020404" pitchFamily="49" charset="0"/>
+                  <a:cs typeface="Courier New" panose="02070309020205020404" pitchFamily="49" charset="0"/>
+                </a:rPr>
+                <a:t>") </a:t>
               </a:r>
               <a:r>
                 <a:rPr lang="en-US" sz="600" b="1" dirty="0">
@@ -14733,29 +14713,7 @@
                   <a:latin typeface="Courier New" panose="02070309020205020404" pitchFamily="49" charset="0"/>
                   <a:cs typeface="Courier New" panose="02070309020205020404" pitchFamily="49" charset="0"/>
                 </a:rPr>
-                <a:t>="Frequency of </a:t>
-              </a:r>
-              <a:r>
-                <a:rPr lang="en-US" sz="600" b="1" dirty="0">
-                  <a:solidFill>
-                    <a:srgbClr val="C00000"/>
-                  </a:solidFill>
-                  <a:latin typeface="Courier New" panose="02070309020205020404" pitchFamily="49" charset="0"/>
-                  <a:cs typeface="Courier New" panose="02070309020205020404" pitchFamily="49" charset="0"/>
-                </a:rPr>
-                <a:t>Cars</a:t>
-              </a:r>
-              <a:r>
-                <a:rPr lang="en-US" sz="600" b="1" dirty="0">
-                  <a:solidFill>
-                    <a:schemeClr val="accent2">
-                      <a:lumMod val="50000"/>
-                    </a:schemeClr>
-                  </a:solidFill>
-                  <a:latin typeface="Courier New" panose="02070309020205020404" pitchFamily="49" charset="0"/>
-                  <a:cs typeface="Courier New" panose="02070309020205020404" pitchFamily="49" charset="0"/>
-                </a:rPr>
-                <a:t>") +</a:t>
+                <a:t>+</a:t>
               </a:r>
             </a:p>
             <a:p>
@@ -15043,7 +15001,7 @@
             </a:ln>
             <a:extLst>
               <a:ext uri="{C572A759-6A51-4108-AA02-DFA0A04FC94B}">
-                <ma14:wrappingTextBoxFlag xmlns="" xmlns:ma14="http://schemas.microsoft.com/office/mac/drawingml/2011/main" val="1"/>
+                <ma14:wrappingTextBoxFlag xmlns:ma14="http://schemas.microsoft.com/office/mac/drawingml/2011/main" xmlns="" val="1"/>
               </a:ext>
             </a:extLst>
           </p:spPr>
@@ -15571,7 +15529,74 @@
                   </a:solidFill>
                   <a:latin typeface="Calibri" panose="020F0502020204030204" pitchFamily="34" charset="0"/>
                 </a:rPr>
-                <a:t>  labs(x=</a:t>
+                <a:t>  </a:t>
+              </a:r>
+              <a:r>
+                <a:rPr lang="en-US" sz="800" dirty="0" smtClean="0">
+                  <a:solidFill>
+                    <a:schemeClr val="accent2">
+                      <a:lumMod val="50000"/>
+                    </a:schemeClr>
+                  </a:solidFill>
+                  <a:latin typeface="Calibri" panose="020F0502020204030204" pitchFamily="34" charset="0"/>
+                </a:rPr>
+                <a:t>labs(</a:t>
+              </a:r>
+              <a:r>
+                <a:rPr lang="en-US" sz="800" dirty="0">
+                  <a:solidFill>
+                    <a:schemeClr val="accent2">
+                      <a:lumMod val="50000"/>
+                    </a:schemeClr>
+                  </a:solidFill>
+                  <a:latin typeface="Calibri" panose="020F0502020204030204" pitchFamily="34" charset="0"/>
+                  <a:cs typeface="Courier New" panose="02070309020205020404" pitchFamily="49" charset="0"/>
+                </a:rPr>
+                <a:t>y="Frequency of </a:t>
+              </a:r>
+              <a:r>
+                <a:rPr lang="en-US" sz="800" dirty="0" err="1" smtClean="0">
+                  <a:solidFill>
+                    <a:srgbClr val="C00000"/>
+                  </a:solidFill>
+                  <a:latin typeface="Calibri" panose="020F0502020204030204" pitchFamily="34" charset="0"/>
+                  <a:cs typeface="Courier New" panose="02070309020205020404" pitchFamily="49" charset="0"/>
+                </a:rPr>
+                <a:t>XXX</a:t>
+              </a:r>
+              <a:r>
+                <a:rPr lang="en-US" sz="800" dirty="0" err="1" smtClean="0">
+                  <a:solidFill>
+                    <a:schemeClr val="accent2">
+                      <a:lumMod val="50000"/>
+                    </a:schemeClr>
+                  </a:solidFill>
+                  <a:latin typeface="Calibri" panose="020F0502020204030204" pitchFamily="34" charset="0"/>
+                  <a:cs typeface="Courier New" panose="02070309020205020404" pitchFamily="49" charset="0"/>
+                </a:rPr>
+                <a:t>“,</a:t>
+              </a:r>
+              <a:r>
+                <a:rPr lang="en-US" sz="800" dirty="0" err="1" smtClean="0">
+                  <a:solidFill>
+                    <a:schemeClr val="accent2">
+                      <a:lumMod val="50000"/>
+                    </a:schemeClr>
+                  </a:solidFill>
+                  <a:latin typeface="Calibri" panose="020F0502020204030204" pitchFamily="34" charset="0"/>
+                </a:rPr>
+                <a:t>x</a:t>
+              </a:r>
+              <a:r>
+                <a:rPr lang="en-US" sz="800" dirty="0">
+                  <a:solidFill>
+                    <a:schemeClr val="accent2">
+                      <a:lumMod val="50000"/>
+                    </a:schemeClr>
+                  </a:solidFill>
+                  <a:latin typeface="Calibri" panose="020F0502020204030204" pitchFamily="34" charset="0"/>
+                </a:rPr>
+                <a:t>=</a:t>
               </a:r>
               <a:r>
                 <a:rPr lang="en-US" sz="800" b="1" dirty="0">
@@ -15613,59 +15638,13 @@
                 <a:t> </a:t>
               </a:r>
               <a:r>
-                <a:rPr lang="en-US" sz="800" dirty="0" err="1">
+                <a:rPr lang="en-US" sz="800" dirty="0">
                   <a:solidFill>
                     <a:srgbClr val="C00000"/>
                   </a:solidFill>
                   <a:latin typeface="Calibri" panose="020F0502020204030204" pitchFamily="34" charset="0"/>
                 </a:rPr>
                 <a:t>label</a:t>
-              </a:r>
-              <a:r>
-                <a:rPr lang="en-US" sz="800" dirty="0" err="1">
-                  <a:solidFill>
-                    <a:schemeClr val="accent2">
-                      <a:lumMod val="50000"/>
-                    </a:schemeClr>
-                  </a:solidFill>
-                  <a:latin typeface="Calibri" panose="020F0502020204030204" pitchFamily="34" charset="0"/>
-                  <a:cs typeface="Courier New" panose="02070309020205020404" pitchFamily="49" charset="0"/>
-                </a:rPr>
-                <a:t>",y</a:t>
-              </a:r>
-              <a:r>
-                <a:rPr lang="en-US" sz="800" dirty="0">
-                  <a:solidFill>
-                    <a:schemeClr val="accent2">
-                      <a:lumMod val="50000"/>
-                    </a:schemeClr>
-                  </a:solidFill>
-                  <a:latin typeface="Calibri" panose="020F0502020204030204" pitchFamily="34" charset="0"/>
-                  <a:cs typeface="Courier New" panose="02070309020205020404" pitchFamily="49" charset="0"/>
-                </a:rPr>
-                <a:t>="</a:t>
-              </a:r>
-              <a:r>
-                <a:rPr lang="en-US" sz="800" dirty="0" smtClean="0">
-                  <a:solidFill>
-                    <a:schemeClr val="accent2">
-                      <a:lumMod val="50000"/>
-                    </a:schemeClr>
-                  </a:solidFill>
-                  <a:latin typeface="Calibri" panose="020F0502020204030204" pitchFamily="34" charset="0"/>
-                  <a:cs typeface="Courier New" panose="02070309020205020404" pitchFamily="49" charset="0"/>
-                </a:rPr>
-                <a:t>Frequency of </a:t>
-              </a:r>
-              <a:r>
-                <a:rPr lang="en-US" sz="800" dirty="0" smtClean="0">
-                  <a:solidFill>
-                    <a:srgbClr val="C00000"/>
-                  </a:solidFill>
-                  <a:latin typeface="Calibri" panose="020F0502020204030204" pitchFamily="34" charset="0"/>
-                  <a:cs typeface="Courier New" panose="02070309020205020404" pitchFamily="49" charset="0"/>
-                </a:rPr>
-                <a:t>XXX</a:t>
               </a:r>
               <a:r>
                 <a:rPr lang="en-US" sz="800" dirty="0" smtClean="0">
@@ -16289,7 +16268,7 @@
           </a:ln>
           <a:extLst>
             <a:ext uri="{C572A759-6A51-4108-AA02-DFA0A04FC94B}">
-              <ma14:wrappingTextBoxFlag xmlns="" xmlns:ma14="http://schemas.microsoft.com/office/mac/drawingml/2011/main" val="1"/>
+              <ma14:wrappingTextBoxFlag xmlns:ma14="http://schemas.microsoft.com/office/mac/drawingml/2011/main" xmlns="" val="1"/>
             </a:ext>
           </a:extLst>
         </p:spPr>
@@ -16823,7 +16802,7 @@
                   <a:latin typeface="Courier New" panose="02070309020205020404" pitchFamily="49" charset="0"/>
                   <a:cs typeface="Courier New" panose="02070309020205020404" pitchFamily="49" charset="0"/>
                 </a:rPr>
-                <a:t>  labs(x</a:t>
+                <a:t>  </a:t>
               </a:r>
               <a:r>
                 <a:rPr lang="en-US" sz="600" b="1" dirty="0">
@@ -16835,6 +16814,52 @@
                   <a:latin typeface="Courier New" panose="02070309020205020404" pitchFamily="49" charset="0"/>
                   <a:cs typeface="Courier New" panose="02070309020205020404" pitchFamily="49" charset="0"/>
                 </a:rPr>
+                <a:t>labs(y="Frequency of </a:t>
+              </a:r>
+              <a:r>
+                <a:rPr lang="en-US" sz="600" b="1" dirty="0" err="1" smtClean="0">
+                  <a:solidFill>
+                    <a:srgbClr val="C00000"/>
+                  </a:solidFill>
+                  <a:latin typeface="Courier New" panose="02070309020205020404" pitchFamily="49" charset="0"/>
+                  <a:cs typeface="Courier New" panose="02070309020205020404" pitchFamily="49" charset="0"/>
+                </a:rPr>
+                <a:t>Cars</a:t>
+              </a:r>
+              <a:r>
+                <a:rPr lang="en-US" sz="600" b="1" dirty="0" err="1">
+                  <a:solidFill>
+                    <a:schemeClr val="accent2">
+                      <a:lumMod val="50000"/>
+                    </a:schemeClr>
+                  </a:solidFill>
+                  <a:latin typeface="Courier New" panose="02070309020205020404" pitchFamily="49" charset="0"/>
+                  <a:cs typeface="Courier New" panose="02070309020205020404" pitchFamily="49" charset="0"/>
+                </a:rPr>
+                <a:t>"</a:t>
+              </a:r>
+              <a:r>
+                <a:rPr lang="en-US" sz="600" b="1" dirty="0" err="1" smtClean="0">
+                  <a:solidFill>
+                    <a:schemeClr val="accent2">
+                      <a:lumMod val="50000"/>
+                    </a:schemeClr>
+                  </a:solidFill>
+                  <a:latin typeface="Courier New" panose="02070309020205020404" pitchFamily="49" charset="0"/>
+                  <a:cs typeface="Courier New" panose="02070309020205020404" pitchFamily="49" charset="0"/>
+                </a:rPr>
+                <a:t>,x</a:t>
+              </a:r>
+              <a:r>
+                <a:rPr lang="en-US" sz="600" b="1" dirty="0">
+                  <a:solidFill>
+                    <a:schemeClr val="accent2">
+                      <a:lumMod val="50000"/>
+                    </a:schemeClr>
+                  </a:solidFill>
+                  <a:latin typeface="Courier New" panose="02070309020205020404" pitchFamily="49" charset="0"/>
+                  <a:cs typeface="Courier New" panose="02070309020205020404" pitchFamily="49" charset="0"/>
+                </a:rPr>
                 <a:t>="</a:t>
               </a:r>
               <a:r>
@@ -16845,29 +16870,19 @@
                   <a:latin typeface="Courier New" panose="02070309020205020404" pitchFamily="49" charset="0"/>
                   <a:cs typeface="Courier New" panose="02070309020205020404" pitchFamily="49" charset="0"/>
                 </a:rPr>
-                <a:t>Highway </a:t>
-              </a:r>
-              <a:r>
-                <a:rPr lang="en-US" sz="600" b="1" dirty="0" err="1">
-                  <a:solidFill>
-                    <a:srgbClr val="C00000"/>
-                  </a:solidFill>
-                  <a:latin typeface="Courier New" panose="02070309020205020404" pitchFamily="49" charset="0"/>
-                  <a:cs typeface="Courier New" panose="02070309020205020404" pitchFamily="49" charset="0"/>
-                </a:rPr>
-                <a:t>MPG</a:t>
-              </a:r>
-              <a:r>
-                <a:rPr lang="en-US" sz="600" b="1" dirty="0" err="1">
-                  <a:solidFill>
-                    <a:schemeClr val="accent2">
-                      <a:lumMod val="50000"/>
-                    </a:schemeClr>
-                  </a:solidFill>
-                  <a:latin typeface="Courier New" panose="02070309020205020404" pitchFamily="49" charset="0"/>
-                  <a:cs typeface="Courier New" panose="02070309020205020404" pitchFamily="49" charset="0"/>
-                </a:rPr>
-                <a:t>",y</a:t>
+                <a:t>Highway MPG</a:t>
+              </a:r>
+              <a:r>
+                <a:rPr lang="en-US" sz="600" b="1" dirty="0" smtClean="0">
+                  <a:solidFill>
+                    <a:schemeClr val="accent2">
+                      <a:lumMod val="50000"/>
+                    </a:schemeClr>
+                  </a:solidFill>
+                  <a:latin typeface="Courier New" panose="02070309020205020404" pitchFamily="49" charset="0"/>
+                  <a:cs typeface="Courier New" panose="02070309020205020404" pitchFamily="49" charset="0"/>
+                </a:rPr>
+                <a:t>") </a:t>
               </a:r>
               <a:r>
                 <a:rPr lang="en-US" sz="600" b="1" dirty="0">
@@ -16879,29 +16894,7 @@
                   <a:latin typeface="Courier New" panose="02070309020205020404" pitchFamily="49" charset="0"/>
                   <a:cs typeface="Courier New" panose="02070309020205020404" pitchFamily="49" charset="0"/>
                 </a:rPr>
-                <a:t>="Frequency of </a:t>
-              </a:r>
-              <a:r>
-                <a:rPr lang="en-US" sz="600" b="1" dirty="0">
-                  <a:solidFill>
-                    <a:srgbClr val="C00000"/>
-                  </a:solidFill>
-                  <a:latin typeface="Courier New" panose="02070309020205020404" pitchFamily="49" charset="0"/>
-                  <a:cs typeface="Courier New" panose="02070309020205020404" pitchFamily="49" charset="0"/>
-                </a:rPr>
-                <a:t>Cars</a:t>
-              </a:r>
-              <a:r>
-                <a:rPr lang="en-US" sz="600" b="1" dirty="0">
-                  <a:solidFill>
-                    <a:schemeClr val="accent2">
-                      <a:lumMod val="50000"/>
-                    </a:schemeClr>
-                  </a:solidFill>
-                  <a:latin typeface="Courier New" panose="02070309020205020404" pitchFamily="49" charset="0"/>
-                  <a:cs typeface="Courier New" panose="02070309020205020404" pitchFamily="49" charset="0"/>
-                </a:rPr>
-                <a:t>") +</a:t>
+                <a:t>+</a:t>
               </a:r>
             </a:p>
             <a:p>
@@ -18480,7 +18473,7 @@
             </a:ln>
             <a:extLst>
               <a:ext uri="{C572A759-6A51-4108-AA02-DFA0A04FC94B}">
-                <ma14:wrappingTextBoxFlag xmlns="" xmlns:ma14="http://schemas.microsoft.com/office/mac/drawingml/2011/main" val="1"/>
+                <ma14:wrappingTextBoxFlag xmlns:ma14="http://schemas.microsoft.com/office/mac/drawingml/2011/main" xmlns="" val="1"/>
               </a:ext>
             </a:extLst>
           </p:spPr>
@@ -18990,6 +18983,98 @@
                 <a:t>&gt; </a:t>
               </a:r>
               <a:r>
+                <a:rPr lang="en-US" sz="600" b="1" dirty="0" err="1" smtClean="0">
+                  <a:solidFill>
+                    <a:schemeClr val="accent2">
+                      <a:lumMod val="50000"/>
+                    </a:schemeClr>
+                  </a:solidFill>
+                  <a:latin typeface="Courier New" panose="02070309020205020404" pitchFamily="49" charset="0"/>
+                  <a:cs typeface="Courier New" panose="02070309020205020404" pitchFamily="49" charset="0"/>
+                </a:rPr>
+                <a:t>ggplot</a:t>
+              </a:r>
+              <a:r>
+                <a:rPr lang="en-US" sz="600" b="1" dirty="0" smtClean="0">
+                  <a:solidFill>
+                    <a:schemeClr val="accent2">
+                      <a:lumMod val="50000"/>
+                    </a:schemeClr>
+                  </a:solidFill>
+                  <a:latin typeface="Courier New" panose="02070309020205020404" pitchFamily="49" charset="0"/>
+                  <a:cs typeface="Courier New" panose="02070309020205020404" pitchFamily="49" charset="0"/>
+                </a:rPr>
+                <a:t>(data=</a:t>
+              </a:r>
+              <a:r>
+                <a:rPr lang="en-US" sz="600" b="1" dirty="0" err="1" smtClean="0">
+                  <a:solidFill>
+                    <a:srgbClr val="C00000"/>
+                  </a:solidFill>
+                  <a:latin typeface="Courier New" panose="02070309020205020404" pitchFamily="49" charset="0"/>
+                  <a:cs typeface="Courier New" panose="02070309020205020404" pitchFamily="49" charset="0"/>
+                </a:rPr>
+                <a:t>dfcar</a:t>
+              </a:r>
+              <a:r>
+                <a:rPr lang="en-US" sz="600" b="1" dirty="0" err="1" smtClean="0">
+                  <a:solidFill>
+                    <a:schemeClr val="accent2">
+                      <a:lumMod val="50000"/>
+                    </a:schemeClr>
+                  </a:solidFill>
+                  <a:latin typeface="Courier New" panose="02070309020205020404" pitchFamily="49" charset="0"/>
+                  <a:cs typeface="Courier New" panose="02070309020205020404" pitchFamily="49" charset="0"/>
+                </a:rPr>
+                <a:t>,mapping</a:t>
+              </a:r>
+              <a:r>
+                <a:rPr lang="en-US" sz="600" b="1" dirty="0" smtClean="0">
+                  <a:solidFill>
+                    <a:schemeClr val="accent2">
+                      <a:lumMod val="50000"/>
+                    </a:schemeClr>
+                  </a:solidFill>
+                  <a:latin typeface="Courier New" panose="02070309020205020404" pitchFamily="49" charset="0"/>
+                  <a:cs typeface="Courier New" panose="02070309020205020404" pitchFamily="49" charset="0"/>
+                </a:rPr>
+                <a:t>=</a:t>
+              </a:r>
+              <a:r>
+                <a:rPr lang="en-US" sz="600" b="1" dirty="0" err="1" smtClean="0">
+                  <a:solidFill>
+                    <a:schemeClr val="accent2">
+                      <a:lumMod val="50000"/>
+                    </a:schemeClr>
+                  </a:solidFill>
+                  <a:latin typeface="Courier New" panose="02070309020205020404" pitchFamily="49" charset="0"/>
+                  <a:cs typeface="Courier New" panose="02070309020205020404" pitchFamily="49" charset="0"/>
+                </a:rPr>
+                <a:t>aes</a:t>
+              </a:r>
+              <a:r>
+                <a:rPr lang="en-US" sz="600" b="1" dirty="0" smtClean="0">
+                  <a:solidFill>
+                    <a:schemeClr val="accent2">
+                      <a:lumMod val="50000"/>
+                    </a:schemeClr>
+                  </a:solidFill>
+                  <a:latin typeface="Courier New" panose="02070309020205020404" pitchFamily="49" charset="0"/>
+                  <a:cs typeface="Courier New" panose="02070309020205020404" pitchFamily="49" charset="0"/>
+                </a:rPr>
+                <a:t>(y=</a:t>
+              </a:r>
+              <a:r>
+                <a:rPr lang="en-US" sz="600" b="1" dirty="0" err="1" smtClean="0">
+                  <a:solidFill>
+                    <a:srgbClr val="C00000"/>
+                  </a:solidFill>
+                  <a:latin typeface="Courier New" panose="02070309020205020404" pitchFamily="49" charset="0"/>
+                  <a:cs typeface="Courier New" panose="02070309020205020404" pitchFamily="49" charset="0"/>
+                </a:rPr>
+                <a:t>HMPG</a:t>
+              </a:r>
+              <a:r>
                 <a:rPr lang="en-US" sz="600" b="1" dirty="0" err="1">
                   <a:solidFill>
                     <a:schemeClr val="accent2">
@@ -18999,7 +19084,53 @@
                   <a:latin typeface="Courier New" panose="02070309020205020404" pitchFamily="49" charset="0"/>
                   <a:cs typeface="Courier New" panose="02070309020205020404" pitchFamily="49" charset="0"/>
                 </a:rPr>
-                <a:t>ggplot</a:t>
+                <a:t>,</a:t>
+              </a:r>
+              <a:r>
+                <a:rPr lang="en-US" sz="600" b="1" dirty="0" err="1" smtClean="0">
+                  <a:solidFill>
+                    <a:schemeClr val="accent2">
+                      <a:lumMod val="50000"/>
+                    </a:schemeClr>
+                  </a:solidFill>
+                  <a:latin typeface="Courier New" panose="02070309020205020404" pitchFamily="49" charset="0"/>
+                  <a:cs typeface="Courier New" panose="02070309020205020404" pitchFamily="49" charset="0"/>
+                </a:rPr>
+                <a:t>x</a:t>
+              </a:r>
+              <a:r>
+                <a:rPr lang="en-US" sz="600" b="1" dirty="0" smtClean="0">
+                  <a:solidFill>
+                    <a:schemeClr val="accent2">
+                      <a:lumMod val="50000"/>
+                    </a:schemeClr>
+                  </a:solidFill>
+                  <a:latin typeface="Courier New" panose="02070309020205020404" pitchFamily="49" charset="0"/>
+                  <a:cs typeface="Courier New" panose="02070309020205020404" pitchFamily="49" charset="0"/>
+                </a:rPr>
+                <a:t>=</a:t>
+              </a:r>
+              <a:r>
+                <a:rPr lang="en-US" sz="600" b="1" dirty="0" smtClean="0">
+                  <a:solidFill>
+                    <a:srgbClr val="C00000"/>
+                  </a:solidFill>
+                  <a:latin typeface="Courier New" panose="02070309020205020404" pitchFamily="49" charset="0"/>
+                  <a:cs typeface="Courier New" panose="02070309020205020404" pitchFamily="49" charset="0"/>
+                </a:rPr>
+                <a:t>Weight</a:t>
+              </a:r>
+              <a:r>
+                <a:rPr lang="en-US" sz="600" b="1" dirty="0" smtClean="0">
+                  <a:solidFill>
+                    <a:schemeClr val="accent2">
+                      <a:lumMod val="50000"/>
+                    </a:schemeClr>
+                  </a:solidFill>
+                  <a:latin typeface="Courier New" panose="02070309020205020404" pitchFamily="49" charset="0"/>
+                  <a:cs typeface="Courier New" panose="02070309020205020404" pitchFamily="49" charset="0"/>
+                </a:rPr>
+                <a:t>)) </a:t>
               </a:r>
               <a:r>
                 <a:rPr lang="en-US" sz="600" b="1" dirty="0">
@@ -19011,17 +19142,118 @@
                   <a:latin typeface="Courier New" panose="02070309020205020404" pitchFamily="49" charset="0"/>
                   <a:cs typeface="Courier New" panose="02070309020205020404" pitchFamily="49" charset="0"/>
                 </a:rPr>
-                <a:t>(data=</a:t>
+                <a:t>+</a:t>
+              </a:r>
+            </a:p>
+            <a:p>
+              <a:pPr algn="l" latinLnBrk="1"/>
+              <a:r>
+                <a:rPr lang="en-US" sz="600" b="1" dirty="0">
+                  <a:solidFill>
+                    <a:schemeClr val="accent2">
+                      <a:lumMod val="50000"/>
+                    </a:schemeClr>
+                  </a:solidFill>
+                  <a:latin typeface="Courier New" panose="02070309020205020404" pitchFamily="49" charset="0"/>
+                  <a:cs typeface="Courier New" panose="02070309020205020404" pitchFamily="49" charset="0"/>
+                </a:rPr>
+                <a:t>  </a:t>
+              </a:r>
+              <a:r>
+                <a:rPr lang="en-US" sz="600" b="1" dirty="0" smtClean="0">
+                  <a:solidFill>
+                    <a:schemeClr val="accent2">
+                      <a:lumMod val="50000"/>
+                    </a:schemeClr>
+                  </a:solidFill>
+                  <a:latin typeface="Courier New" panose="02070309020205020404" pitchFamily="49" charset="0"/>
+                  <a:cs typeface="Courier New" panose="02070309020205020404" pitchFamily="49" charset="0"/>
+                </a:rPr>
+                <a:t>  </a:t>
+              </a:r>
+              <a:r>
+                <a:rPr lang="en-US" sz="600" b="1" dirty="0" err="1" smtClean="0">
+                  <a:solidFill>
+                    <a:schemeClr val="accent2">
+                      <a:lumMod val="50000"/>
+                    </a:schemeClr>
+                  </a:solidFill>
+                  <a:latin typeface="Courier New" panose="02070309020205020404" pitchFamily="49" charset="0"/>
+                  <a:cs typeface="Courier New" panose="02070309020205020404" pitchFamily="49" charset="0"/>
+                </a:rPr>
+                <a:t>geom_point</a:t>
+              </a:r>
+              <a:r>
+                <a:rPr lang="en-US" sz="600" b="1" dirty="0" smtClean="0">
+                  <a:solidFill>
+                    <a:schemeClr val="accent2">
+                      <a:lumMod val="50000"/>
+                    </a:schemeClr>
+                  </a:solidFill>
+                  <a:latin typeface="Courier New" panose="02070309020205020404" pitchFamily="49" charset="0"/>
+                  <a:cs typeface="Courier New" panose="02070309020205020404" pitchFamily="49" charset="0"/>
+                </a:rPr>
+                <a:t>(</a:t>
+              </a:r>
+              <a:r>
+                <a:rPr lang="en-US" sz="600" b="1" dirty="0" err="1" smtClean="0">
+                  <a:solidFill>
+                    <a:schemeClr val="accent2">
+                      <a:lumMod val="50000"/>
+                    </a:schemeClr>
+                  </a:solidFill>
+                  <a:latin typeface="Courier New" panose="02070309020205020404" pitchFamily="49" charset="0"/>
+                  <a:cs typeface="Courier New" panose="02070309020205020404" pitchFamily="49" charset="0"/>
+                </a:rPr>
+                <a:t>pch</a:t>
+              </a:r>
+              <a:r>
+                <a:rPr lang="en-US" sz="600" b="1" dirty="0" smtClean="0">
+                  <a:solidFill>
+                    <a:schemeClr val="accent2">
+                      <a:lumMod val="50000"/>
+                    </a:schemeClr>
+                  </a:solidFill>
+                  <a:latin typeface="Courier New" panose="02070309020205020404" pitchFamily="49" charset="0"/>
+                  <a:cs typeface="Courier New" panose="02070309020205020404" pitchFamily="49" charset="0"/>
+                </a:rPr>
+                <a:t>=21,color</a:t>
+              </a:r>
+              <a:r>
+                <a:rPr lang="en-US" sz="600" b="1" dirty="0">
+                  <a:solidFill>
+                    <a:schemeClr val="accent2">
+                      <a:lumMod val="50000"/>
+                    </a:schemeClr>
+                  </a:solidFill>
+                  <a:latin typeface="Courier New" panose="02070309020205020404" pitchFamily="49" charset="0"/>
+                  <a:cs typeface="Courier New" panose="02070309020205020404" pitchFamily="49" charset="0"/>
+                </a:rPr>
+                <a:t>="</a:t>
               </a:r>
               <a:r>
                 <a:rPr lang="en-US" sz="600" b="1" dirty="0" err="1">
                   <a:solidFill>
-                    <a:srgbClr val="C00000"/>
-                  </a:solidFill>
-                  <a:latin typeface="Courier New" panose="02070309020205020404" pitchFamily="49" charset="0"/>
-                  <a:cs typeface="Courier New" panose="02070309020205020404" pitchFamily="49" charset="0"/>
-                </a:rPr>
-                <a:t>dfcar</a:t>
+                    <a:schemeClr val="accent2">
+                      <a:lumMod val="50000"/>
+                    </a:schemeClr>
+                  </a:solidFill>
+                  <a:latin typeface="Courier New" panose="02070309020205020404" pitchFamily="49" charset="0"/>
+                  <a:cs typeface="Courier New" panose="02070309020205020404" pitchFamily="49" charset="0"/>
+                </a:rPr>
+                <a:t>black",fill</a:t>
+              </a:r>
+              <a:r>
+                <a:rPr lang="en-US" sz="600" b="1" dirty="0">
+                  <a:solidFill>
+                    <a:schemeClr val="accent2">
+                      <a:lumMod val="50000"/>
+                    </a:schemeClr>
+                  </a:solidFill>
+                  <a:latin typeface="Courier New" panose="02070309020205020404" pitchFamily="49" charset="0"/>
+                  <a:cs typeface="Courier New" panose="02070309020205020404" pitchFamily="49" charset="0"/>
+                </a:rPr>
+                <a:t>="</a:t>
               </a:r>
               <a:r>
                 <a:rPr lang="en-US" sz="600" b="1" dirty="0" err="1">
@@ -19033,7 +19265,19 @@
                   <a:latin typeface="Courier New" panose="02070309020205020404" pitchFamily="49" charset="0"/>
                   <a:cs typeface="Courier New" panose="02070309020205020404" pitchFamily="49" charset="0"/>
                 </a:rPr>
-                <a:t>,mapping</a:t>
+                <a:t>lightgray</a:t>
+              </a:r>
+              <a:r>
+                <a:rPr lang="en-US" sz="600" b="1" dirty="0" smtClean="0">
+                  <a:solidFill>
+                    <a:schemeClr val="accent2">
+                      <a:lumMod val="50000"/>
+                    </a:schemeClr>
+                  </a:solidFill>
+                  <a:latin typeface="Courier New" panose="02070309020205020404" pitchFamily="49" charset="0"/>
+                  <a:cs typeface="Courier New" panose="02070309020205020404" pitchFamily="49" charset="0"/>
+                </a:rPr>
+                <a:t>") </a:t>
               </a:r>
               <a:r>
                 <a:rPr lang="en-US" sz="600" b="1" dirty="0">
@@ -19045,7 +19289,90 @@
                   <a:latin typeface="Courier New" panose="02070309020205020404" pitchFamily="49" charset="0"/>
                   <a:cs typeface="Courier New" panose="02070309020205020404" pitchFamily="49" charset="0"/>
                 </a:rPr>
-                <a:t>=</a:t>
+                <a:t>+</a:t>
+              </a:r>
+            </a:p>
+            <a:p>
+              <a:pPr algn="l" latinLnBrk="1"/>
+              <a:r>
+                <a:rPr lang="en-US" sz="600" b="1" dirty="0">
+                  <a:solidFill>
+                    <a:schemeClr val="accent2">
+                      <a:lumMod val="50000"/>
+                    </a:schemeClr>
+                  </a:solidFill>
+                  <a:latin typeface="Courier New" panose="02070309020205020404" pitchFamily="49" charset="0"/>
+                  <a:cs typeface="Courier New" panose="02070309020205020404" pitchFamily="49" charset="0"/>
+                </a:rPr>
+                <a:t>  </a:t>
+              </a:r>
+              <a:r>
+                <a:rPr lang="en-US" sz="600" b="1" dirty="0" smtClean="0">
+                  <a:solidFill>
+                    <a:schemeClr val="accent2">
+                      <a:lumMod val="50000"/>
+                    </a:schemeClr>
+                  </a:solidFill>
+                  <a:latin typeface="Courier New" panose="02070309020205020404" pitchFamily="49" charset="0"/>
+                  <a:cs typeface="Courier New" panose="02070309020205020404" pitchFamily="49" charset="0"/>
+                </a:rPr>
+                <a:t>  </a:t>
+              </a:r>
+              <a:r>
+                <a:rPr lang="en-US" sz="600" b="1" dirty="0" smtClean="0">
+                  <a:solidFill>
+                    <a:schemeClr val="accent2">
+                      <a:lumMod val="50000"/>
+                    </a:schemeClr>
+                  </a:solidFill>
+                  <a:latin typeface="Courier New" panose="02070309020205020404" pitchFamily="49" charset="0"/>
+                  <a:cs typeface="Courier New" panose="02070309020205020404" pitchFamily="49" charset="0"/>
+                </a:rPr>
+                <a:t>labs(y</a:t>
+              </a:r>
+              <a:r>
+                <a:rPr lang="en-US" sz="600" b="1" dirty="0">
+                  <a:solidFill>
+                    <a:schemeClr val="accent2">
+                      <a:lumMod val="50000"/>
+                    </a:schemeClr>
+                  </a:solidFill>
+                  <a:latin typeface="Courier New" panose="02070309020205020404" pitchFamily="49" charset="0"/>
+                  <a:cs typeface="Courier New" panose="02070309020205020404" pitchFamily="49" charset="0"/>
+                </a:rPr>
+                <a:t>="</a:t>
+              </a:r>
+              <a:r>
+                <a:rPr lang="en-US" sz="600" b="1" dirty="0">
+                  <a:solidFill>
+                    <a:srgbClr val="C00000"/>
+                  </a:solidFill>
+                  <a:latin typeface="Courier New" panose="02070309020205020404" pitchFamily="49" charset="0"/>
+                  <a:cs typeface="Courier New" panose="02070309020205020404" pitchFamily="49" charset="0"/>
+                </a:rPr>
+                <a:t>Highway </a:t>
+              </a:r>
+              <a:r>
+                <a:rPr lang="en-US" sz="600" b="1" dirty="0" err="1" smtClean="0">
+                  <a:solidFill>
+                    <a:srgbClr val="C00000"/>
+                  </a:solidFill>
+                  <a:latin typeface="Courier New" panose="02070309020205020404" pitchFamily="49" charset="0"/>
+                  <a:cs typeface="Courier New" panose="02070309020205020404" pitchFamily="49" charset="0"/>
+                </a:rPr>
+                <a:t>MPG</a:t>
+              </a:r>
+              <a:r>
+                <a:rPr lang="en-US" sz="600" b="1" dirty="0" err="1" smtClean="0">
+                  <a:solidFill>
+                    <a:schemeClr val="accent2">
+                      <a:lumMod val="50000"/>
+                    </a:schemeClr>
+                  </a:solidFill>
+                  <a:latin typeface="Courier New" panose="02070309020205020404" pitchFamily="49" charset="0"/>
+                  <a:cs typeface="Courier New" panose="02070309020205020404" pitchFamily="49" charset="0"/>
+                </a:rPr>
+                <a:t>"</a:t>
               </a:r>
               <a:r>
                 <a:rPr lang="en-US" sz="600" b="1" dirty="0" err="1">
@@ -19057,7 +19384,19 @@
                   <a:latin typeface="Courier New" panose="02070309020205020404" pitchFamily="49" charset="0"/>
                   <a:cs typeface="Courier New" panose="02070309020205020404" pitchFamily="49" charset="0"/>
                 </a:rPr>
-                <a:t>aes</a:t>
+                <a:t>,</a:t>
+              </a:r>
+              <a:r>
+                <a:rPr lang="en-US" sz="600" b="1" dirty="0" err="1" smtClean="0">
+                  <a:solidFill>
+                    <a:schemeClr val="accent2">
+                      <a:lumMod val="50000"/>
+                    </a:schemeClr>
+                  </a:solidFill>
+                  <a:latin typeface="Courier New" panose="02070309020205020404" pitchFamily="49" charset="0"/>
+                  <a:cs typeface="Courier New" panose="02070309020205020404" pitchFamily="49" charset="0"/>
+                </a:rPr>
+                <a:t>x</a:t>
               </a:r>
               <a:r>
                 <a:rPr lang="en-US" sz="600" b="1" dirty="0">
@@ -19069,7 +19408,17 @@
                   <a:latin typeface="Courier New" panose="02070309020205020404" pitchFamily="49" charset="0"/>
                   <a:cs typeface="Courier New" panose="02070309020205020404" pitchFamily="49" charset="0"/>
                 </a:rPr>
-                <a:t>(x=</a:t>
+                <a:t>="</a:t>
+              </a:r>
+              <a:r>
+                <a:rPr lang="en-US" sz="600" b="1" dirty="0">
+                  <a:solidFill>
+                    <a:srgbClr val="C00000"/>
+                  </a:solidFill>
+                  <a:latin typeface="Courier New" panose="02070309020205020404" pitchFamily="49" charset="0"/>
+                  <a:cs typeface="Courier New" panose="02070309020205020404" pitchFamily="49" charset="0"/>
+                </a:rPr>
+                <a:t>Weight (</a:t>
               </a:r>
               <a:r>
                 <a:rPr lang="en-US" sz="600" b="1" dirty="0" err="1">
@@ -19079,41 +19428,29 @@
                   <a:latin typeface="Courier New" panose="02070309020205020404" pitchFamily="49" charset="0"/>
                   <a:cs typeface="Courier New" panose="02070309020205020404" pitchFamily="49" charset="0"/>
                 </a:rPr>
-                <a:t>Weight</a:t>
-              </a:r>
-              <a:r>
-                <a:rPr lang="en-US" sz="600" b="1" dirty="0" err="1">
-                  <a:solidFill>
-                    <a:schemeClr val="accent2">
-                      <a:lumMod val="50000"/>
-                    </a:schemeClr>
-                  </a:solidFill>
-                  <a:latin typeface="Courier New" panose="02070309020205020404" pitchFamily="49" charset="0"/>
-                  <a:cs typeface="Courier New" panose="02070309020205020404" pitchFamily="49" charset="0"/>
-                </a:rPr>
-                <a:t>,y</a:t>
+                <a:t>lbs</a:t>
               </a:r>
               <a:r>
                 <a:rPr lang="en-US" sz="600" b="1" dirty="0">
                   <a:solidFill>
-                    <a:schemeClr val="accent2">
-                      <a:lumMod val="50000"/>
-                    </a:schemeClr>
-                  </a:solidFill>
-                  <a:latin typeface="Courier New" panose="02070309020205020404" pitchFamily="49" charset="0"/>
-                  <a:cs typeface="Courier New" panose="02070309020205020404" pitchFamily="49" charset="0"/>
-                </a:rPr>
-                <a:t>=</a:t>
+                    <a:srgbClr val="C00000"/>
+                  </a:solidFill>
+                  <a:latin typeface="Courier New" panose="02070309020205020404" pitchFamily="49" charset="0"/>
+                  <a:cs typeface="Courier New" panose="02070309020205020404" pitchFamily="49" charset="0"/>
+                </a:rPr>
+                <a:t>)</a:t>
               </a:r>
               <a:r>
                 <a:rPr lang="en-US" sz="600" b="1" dirty="0">
                   <a:solidFill>
-                    <a:srgbClr val="C00000"/>
-                  </a:solidFill>
-                  <a:latin typeface="Courier New" panose="02070309020205020404" pitchFamily="49" charset="0"/>
-                  <a:cs typeface="Courier New" panose="02070309020205020404" pitchFamily="49" charset="0"/>
-                </a:rPr>
-                <a:t>HMPG</a:t>
+                    <a:schemeClr val="accent2">
+                      <a:lumMod val="50000"/>
+                    </a:schemeClr>
+                  </a:solidFill>
+                  <a:latin typeface="Courier New" panose="02070309020205020404" pitchFamily="49" charset="0"/>
+                  <a:cs typeface="Courier New" panose="02070309020205020404" pitchFamily="49" charset="0"/>
+                </a:rPr>
+                <a:t>") </a:t>
               </a:r>
               <a:r>
                 <a:rPr lang="en-US" sz="600" b="1" dirty="0">
@@ -19125,257 +19462,7 @@
                   <a:latin typeface="Courier New" panose="02070309020205020404" pitchFamily="49" charset="0"/>
                   <a:cs typeface="Courier New" panose="02070309020205020404" pitchFamily="49" charset="0"/>
                 </a:rPr>
-                <a:t>)) +</a:t>
-              </a:r>
-            </a:p>
-            <a:p>
-              <a:pPr algn="l" latinLnBrk="1"/>
-              <a:r>
-                <a:rPr lang="en-US" sz="600" b="1" dirty="0">
-                  <a:solidFill>
-                    <a:schemeClr val="accent2">
-                      <a:lumMod val="50000"/>
-                    </a:schemeClr>
-                  </a:solidFill>
-                  <a:latin typeface="Courier New" panose="02070309020205020404" pitchFamily="49" charset="0"/>
-                  <a:cs typeface="Courier New" panose="02070309020205020404" pitchFamily="49" charset="0"/>
-                </a:rPr>
-                <a:t>  </a:t>
-              </a:r>
-              <a:r>
-                <a:rPr lang="en-US" sz="600" b="1" dirty="0" smtClean="0">
-                  <a:solidFill>
-                    <a:schemeClr val="accent2">
-                      <a:lumMod val="50000"/>
-                    </a:schemeClr>
-                  </a:solidFill>
-                  <a:latin typeface="Courier New" panose="02070309020205020404" pitchFamily="49" charset="0"/>
-                  <a:cs typeface="Courier New" panose="02070309020205020404" pitchFamily="49" charset="0"/>
-                </a:rPr>
-                <a:t>  </a:t>
-              </a:r>
-              <a:r>
-                <a:rPr lang="en-US" sz="600" b="1" dirty="0" err="1" smtClean="0">
-                  <a:solidFill>
-                    <a:schemeClr val="accent2">
-                      <a:lumMod val="50000"/>
-                    </a:schemeClr>
-                  </a:solidFill>
-                  <a:latin typeface="Courier New" panose="02070309020205020404" pitchFamily="49" charset="0"/>
-                  <a:cs typeface="Courier New" panose="02070309020205020404" pitchFamily="49" charset="0"/>
-                </a:rPr>
-                <a:t>geom_point</a:t>
-              </a:r>
-              <a:r>
-                <a:rPr lang="en-US" sz="600" b="1" dirty="0" smtClean="0">
-                  <a:solidFill>
-                    <a:schemeClr val="accent2">
-                      <a:lumMod val="50000"/>
-                    </a:schemeClr>
-                  </a:solidFill>
-                  <a:latin typeface="Courier New" panose="02070309020205020404" pitchFamily="49" charset="0"/>
-                  <a:cs typeface="Courier New" panose="02070309020205020404" pitchFamily="49" charset="0"/>
-                </a:rPr>
-                <a:t>(</a:t>
-              </a:r>
-              <a:r>
-                <a:rPr lang="en-US" sz="600" b="1" dirty="0" err="1" smtClean="0">
-                  <a:solidFill>
-                    <a:schemeClr val="accent2">
-                      <a:lumMod val="50000"/>
-                    </a:schemeClr>
-                  </a:solidFill>
-                  <a:latin typeface="Courier New" panose="02070309020205020404" pitchFamily="49" charset="0"/>
-                  <a:cs typeface="Courier New" panose="02070309020205020404" pitchFamily="49" charset="0"/>
-                </a:rPr>
-                <a:t>pch</a:t>
-              </a:r>
-              <a:r>
-                <a:rPr lang="en-US" sz="600" b="1" dirty="0" smtClean="0">
-                  <a:solidFill>
-                    <a:schemeClr val="accent2">
-                      <a:lumMod val="50000"/>
-                    </a:schemeClr>
-                  </a:solidFill>
-                  <a:latin typeface="Courier New" panose="02070309020205020404" pitchFamily="49" charset="0"/>
-                  <a:cs typeface="Courier New" panose="02070309020205020404" pitchFamily="49" charset="0"/>
-                </a:rPr>
-                <a:t>=21,color</a:t>
-              </a:r>
-              <a:r>
-                <a:rPr lang="en-US" sz="600" b="1" dirty="0">
-                  <a:solidFill>
-                    <a:schemeClr val="accent2">
-                      <a:lumMod val="50000"/>
-                    </a:schemeClr>
-                  </a:solidFill>
-                  <a:latin typeface="Courier New" panose="02070309020205020404" pitchFamily="49" charset="0"/>
-                  <a:cs typeface="Courier New" panose="02070309020205020404" pitchFamily="49" charset="0"/>
-                </a:rPr>
-                <a:t>="</a:t>
-              </a:r>
-              <a:r>
-                <a:rPr lang="en-US" sz="600" b="1" dirty="0" err="1">
-                  <a:solidFill>
-                    <a:schemeClr val="accent2">
-                      <a:lumMod val="50000"/>
-                    </a:schemeClr>
-                  </a:solidFill>
-                  <a:latin typeface="Courier New" panose="02070309020205020404" pitchFamily="49" charset="0"/>
-                  <a:cs typeface="Courier New" panose="02070309020205020404" pitchFamily="49" charset="0"/>
-                </a:rPr>
-                <a:t>black",fill</a:t>
-              </a:r>
-              <a:r>
-                <a:rPr lang="en-US" sz="600" b="1" dirty="0">
-                  <a:solidFill>
-                    <a:schemeClr val="accent2">
-                      <a:lumMod val="50000"/>
-                    </a:schemeClr>
-                  </a:solidFill>
-                  <a:latin typeface="Courier New" panose="02070309020205020404" pitchFamily="49" charset="0"/>
-                  <a:cs typeface="Courier New" panose="02070309020205020404" pitchFamily="49" charset="0"/>
-                </a:rPr>
-                <a:t>="</a:t>
-              </a:r>
-              <a:r>
-                <a:rPr lang="en-US" sz="600" b="1" dirty="0" err="1">
-                  <a:solidFill>
-                    <a:schemeClr val="accent2">
-                      <a:lumMod val="50000"/>
-                    </a:schemeClr>
-                  </a:solidFill>
-                  <a:latin typeface="Courier New" panose="02070309020205020404" pitchFamily="49" charset="0"/>
-                  <a:cs typeface="Courier New" panose="02070309020205020404" pitchFamily="49" charset="0"/>
-                </a:rPr>
-                <a:t>lightgray</a:t>
-              </a:r>
-              <a:r>
-                <a:rPr lang="en-US" sz="600" b="1" dirty="0" smtClean="0">
-                  <a:solidFill>
-                    <a:schemeClr val="accent2">
-                      <a:lumMod val="50000"/>
-                    </a:schemeClr>
-                  </a:solidFill>
-                  <a:latin typeface="Courier New" panose="02070309020205020404" pitchFamily="49" charset="0"/>
-                  <a:cs typeface="Courier New" panose="02070309020205020404" pitchFamily="49" charset="0"/>
-                </a:rPr>
-                <a:t>") </a:t>
-              </a:r>
-              <a:r>
-                <a:rPr lang="en-US" sz="600" b="1" dirty="0">
-                  <a:solidFill>
-                    <a:schemeClr val="accent2">
-                      <a:lumMod val="50000"/>
-                    </a:schemeClr>
-                  </a:solidFill>
-                  <a:latin typeface="Courier New" panose="02070309020205020404" pitchFamily="49" charset="0"/>
-                  <a:cs typeface="Courier New" panose="02070309020205020404" pitchFamily="49" charset="0"/>
-                </a:rPr>
                 <a:t>+</a:t>
-              </a:r>
-            </a:p>
-            <a:p>
-              <a:pPr algn="l" latinLnBrk="1"/>
-              <a:r>
-                <a:rPr lang="en-US" sz="600" b="1" dirty="0">
-                  <a:solidFill>
-                    <a:schemeClr val="accent2">
-                      <a:lumMod val="50000"/>
-                    </a:schemeClr>
-                  </a:solidFill>
-                  <a:latin typeface="Courier New" panose="02070309020205020404" pitchFamily="49" charset="0"/>
-                  <a:cs typeface="Courier New" panose="02070309020205020404" pitchFamily="49" charset="0"/>
-                </a:rPr>
-                <a:t>  </a:t>
-              </a:r>
-              <a:r>
-                <a:rPr lang="en-US" sz="600" b="1" dirty="0" smtClean="0">
-                  <a:solidFill>
-                    <a:schemeClr val="accent2">
-                      <a:lumMod val="50000"/>
-                    </a:schemeClr>
-                  </a:solidFill>
-                  <a:latin typeface="Courier New" panose="02070309020205020404" pitchFamily="49" charset="0"/>
-                  <a:cs typeface="Courier New" panose="02070309020205020404" pitchFamily="49" charset="0"/>
-                </a:rPr>
-                <a:t>  labs(x</a:t>
-              </a:r>
-              <a:r>
-                <a:rPr lang="en-US" sz="600" b="1" dirty="0">
-                  <a:solidFill>
-                    <a:schemeClr val="accent2">
-                      <a:lumMod val="50000"/>
-                    </a:schemeClr>
-                  </a:solidFill>
-                  <a:latin typeface="Courier New" panose="02070309020205020404" pitchFamily="49" charset="0"/>
-                  <a:cs typeface="Courier New" panose="02070309020205020404" pitchFamily="49" charset="0"/>
-                </a:rPr>
-                <a:t>="</a:t>
-              </a:r>
-              <a:r>
-                <a:rPr lang="en-US" sz="600" b="1" dirty="0">
-                  <a:solidFill>
-                    <a:srgbClr val="C00000"/>
-                  </a:solidFill>
-                  <a:latin typeface="Courier New" panose="02070309020205020404" pitchFamily="49" charset="0"/>
-                  <a:cs typeface="Courier New" panose="02070309020205020404" pitchFamily="49" charset="0"/>
-                </a:rPr>
-                <a:t>Weight (</a:t>
-              </a:r>
-              <a:r>
-                <a:rPr lang="en-US" sz="600" b="1" dirty="0" err="1">
-                  <a:solidFill>
-                    <a:srgbClr val="C00000"/>
-                  </a:solidFill>
-                  <a:latin typeface="Courier New" panose="02070309020205020404" pitchFamily="49" charset="0"/>
-                  <a:cs typeface="Courier New" panose="02070309020205020404" pitchFamily="49" charset="0"/>
-                </a:rPr>
-                <a:t>lbs</a:t>
-              </a:r>
-              <a:r>
-                <a:rPr lang="en-US" sz="600" b="1" dirty="0">
-                  <a:solidFill>
-                    <a:srgbClr val="C00000"/>
-                  </a:solidFill>
-                  <a:latin typeface="Courier New" panose="02070309020205020404" pitchFamily="49" charset="0"/>
-                  <a:cs typeface="Courier New" panose="02070309020205020404" pitchFamily="49" charset="0"/>
-                </a:rPr>
-                <a:t>)</a:t>
-              </a:r>
-              <a:r>
-                <a:rPr lang="en-US" sz="600" b="1" dirty="0">
-                  <a:solidFill>
-                    <a:schemeClr val="accent2">
-                      <a:lumMod val="50000"/>
-                    </a:schemeClr>
-                  </a:solidFill>
-                  <a:latin typeface="Courier New" panose="02070309020205020404" pitchFamily="49" charset="0"/>
-                  <a:cs typeface="Courier New" panose="02070309020205020404" pitchFamily="49" charset="0"/>
-                </a:rPr>
-                <a:t>",y="</a:t>
-              </a:r>
-              <a:r>
-                <a:rPr lang="en-US" sz="600" b="1" dirty="0">
-                  <a:solidFill>
-                    <a:srgbClr val="C00000"/>
-                  </a:solidFill>
-                  <a:latin typeface="Courier New" panose="02070309020205020404" pitchFamily="49" charset="0"/>
-                  <a:cs typeface="Courier New" panose="02070309020205020404" pitchFamily="49" charset="0"/>
-                </a:rPr>
-                <a:t>Highway MPG</a:t>
-              </a:r>
-              <a:r>
-                <a:rPr lang="en-US" sz="600" b="1" dirty="0">
-                  <a:solidFill>
-                    <a:schemeClr val="accent2">
-                      <a:lumMod val="50000"/>
-                    </a:schemeClr>
-                  </a:solidFill>
-                  <a:latin typeface="Courier New" panose="02070309020205020404" pitchFamily="49" charset="0"/>
-                  <a:cs typeface="Courier New" panose="02070309020205020404" pitchFamily="49" charset="0"/>
-                </a:rPr>
-                <a:t>") +</a:t>
               </a:r>
             </a:p>
             <a:p>
@@ -19694,7 +19781,19 @@
                   <a:latin typeface="Courier New" panose="02070309020205020404" pitchFamily="49" charset="0"/>
                   <a:cs typeface="Courier New" panose="02070309020205020404" pitchFamily="49" charset="0"/>
                 </a:rPr>
-                <a:t>=3)</a:t>
+                <a:t>=3</a:t>
+              </a:r>
+              <a:r>
+                <a:rPr lang="en-US" sz="600" b="1" dirty="0" smtClean="0">
+                  <a:solidFill>
+                    <a:schemeClr val="accent2">
+                      <a:lumMod val="50000"/>
+                    </a:schemeClr>
+                  </a:solidFill>
+                  <a:latin typeface="Courier New" panose="02070309020205020404" pitchFamily="49" charset="0"/>
+                  <a:cs typeface="Courier New" panose="02070309020205020404" pitchFamily="49" charset="0"/>
+                </a:rPr>
+                <a:t>)</a:t>
               </a:r>
               <a:endParaRPr lang="en-US" sz="600" b="1" dirty="0">
                 <a:solidFill>
@@ -19984,7 +20083,7 @@
                   </a:solidFill>
                   <a:latin typeface="Calibri" panose="020F0502020204030204" pitchFamily="34" charset="0"/>
                 </a:rPr>
-                <a:t>(x=</a:t>
+                <a:t>(y=</a:t>
               </a:r>
               <a:r>
                 <a:rPr lang="en-US" sz="800" dirty="0" smtClean="0">
@@ -20004,7 +20103,7 @@
                   </a:solidFill>
                   <a:latin typeface="Calibri" panose="020F0502020204030204" pitchFamily="34" charset="0"/>
                 </a:rPr>
-                <a:t>,y=</a:t>
+                <a:t>,x=</a:t>
               </a:r>
               <a:r>
                 <a:rPr lang="en-US" sz="800" dirty="0" smtClean="0">
@@ -20510,7 +20609,7 @@
             </a:ln>
             <a:extLst>
               <a:ext uri="{C572A759-6A51-4108-AA02-DFA0A04FC94B}">
-                <ma14:wrappingTextBoxFlag xmlns="" xmlns:ma14="http://schemas.microsoft.com/office/mac/drawingml/2011/main" val="1"/>
+                <ma14:wrappingTextBoxFlag xmlns:ma14="http://schemas.microsoft.com/office/mac/drawingml/2011/main" xmlns="" val="1"/>
               </a:ext>
             </a:extLst>
           </p:spPr>
@@ -20943,7 +21042,7 @@
                   <a:t>&gt; </a:t>
                 </a:r>
                 <a:r>
-                  <a:rPr lang="en-US" sz="600" b="1" dirty="0" err="1">
+                  <a:rPr lang="en-US" sz="600" b="1" dirty="0" err="1" smtClean="0">
                     <a:solidFill>
                       <a:schemeClr val="accent2">
                         <a:lumMod val="50000"/>
@@ -20955,7 +21054,7 @@
                   <a:t>ggplot</a:t>
                 </a:r>
                 <a:r>
-                  <a:rPr lang="en-US" sz="600" b="1" dirty="0">
+                  <a:rPr lang="en-US" sz="600" b="1" dirty="0" smtClean="0">
                     <a:solidFill>
                       <a:schemeClr val="accent2">
                         <a:lumMod val="50000"/>
@@ -20967,7 +21066,7 @@
                   <a:t>(data=</a:t>
                 </a:r>
                 <a:r>
-                  <a:rPr lang="en-US" sz="600" b="1" dirty="0" err="1">
+                  <a:rPr lang="en-US" sz="600" b="1" dirty="0" err="1" smtClean="0">
                     <a:solidFill>
                       <a:srgbClr val="C00000"/>
                     </a:solidFill>
@@ -20975,6 +21074,64 @@
                     <a:cs typeface="Courier New" panose="02070309020205020404" pitchFamily="49" charset="0"/>
                   </a:rPr>
                   <a:t>dfcar</a:t>
+                </a:r>
+                <a:r>
+                  <a:rPr lang="en-US" sz="600" b="1" dirty="0" err="1" smtClean="0">
+                    <a:solidFill>
+                      <a:schemeClr val="accent2">
+                        <a:lumMod val="50000"/>
+                      </a:schemeClr>
+                    </a:solidFill>
+                    <a:latin typeface="Courier New" panose="02070309020205020404" pitchFamily="49" charset="0"/>
+                    <a:cs typeface="Courier New" panose="02070309020205020404" pitchFamily="49" charset="0"/>
+                  </a:rPr>
+                  <a:t>,mapping</a:t>
+                </a:r>
+                <a:r>
+                  <a:rPr lang="en-US" sz="600" b="1" dirty="0" smtClean="0">
+                    <a:solidFill>
+                      <a:schemeClr val="accent2">
+                        <a:lumMod val="50000"/>
+                      </a:schemeClr>
+                    </a:solidFill>
+                    <a:latin typeface="Courier New" panose="02070309020205020404" pitchFamily="49" charset="0"/>
+                    <a:cs typeface="Courier New" panose="02070309020205020404" pitchFamily="49" charset="0"/>
+                  </a:rPr>
+                  <a:t>=</a:t>
+                </a:r>
+                <a:r>
+                  <a:rPr lang="en-US" sz="600" b="1" dirty="0" err="1" smtClean="0">
+                    <a:solidFill>
+                      <a:schemeClr val="accent2">
+                        <a:lumMod val="50000"/>
+                      </a:schemeClr>
+                    </a:solidFill>
+                    <a:latin typeface="Courier New" panose="02070309020205020404" pitchFamily="49" charset="0"/>
+                    <a:cs typeface="Courier New" panose="02070309020205020404" pitchFamily="49" charset="0"/>
+                  </a:rPr>
+                  <a:t>aes</a:t>
+                </a:r>
+                <a:r>
+                  <a:rPr lang="en-US" sz="600" b="1" dirty="0" smtClean="0">
+                    <a:solidFill>
+                      <a:schemeClr val="accent2">
+                        <a:lumMod val="50000"/>
+                      </a:schemeClr>
+                    </a:solidFill>
+                    <a:latin typeface="Courier New" panose="02070309020205020404" pitchFamily="49" charset="0"/>
+                    <a:cs typeface="Courier New" panose="02070309020205020404" pitchFamily="49" charset="0"/>
+                  </a:rPr>
+                  <a:t>(y=</a:t>
+                </a:r>
+                <a:r>
+                  <a:rPr lang="en-US" sz="600" b="1" dirty="0" err="1" smtClean="0">
+                    <a:solidFill>
+                      <a:srgbClr val="C00000"/>
+                    </a:solidFill>
+                    <a:latin typeface="Courier New" panose="02070309020205020404" pitchFamily="49" charset="0"/>
+                    <a:cs typeface="Courier New" panose="02070309020205020404" pitchFamily="49" charset="0"/>
+                  </a:rPr>
+                  <a:t>HMPG</a:t>
                 </a:r>
                 <a:r>
                   <a:rPr lang="en-US" sz="600" b="1" dirty="0" err="1">
@@ -20986,7 +21143,7 @@
                     <a:latin typeface="Courier New" panose="02070309020205020404" pitchFamily="49" charset="0"/>
                     <a:cs typeface="Courier New" panose="02070309020205020404" pitchFamily="49" charset="0"/>
                   </a:rPr>
-                  <a:t>,mapping</a:t>
+                  <a:t>,x</a:t>
                 </a:r>
                 <a:r>
                   <a:rPr lang="en-US" sz="600" b="1" dirty="0">
@@ -21001,7 +21158,17 @@
                   <a:t>=</a:t>
                 </a:r>
                 <a:r>
-                  <a:rPr lang="en-US" sz="600" b="1" dirty="0" err="1">
+                  <a:rPr lang="en-US" sz="600" b="1" dirty="0" smtClean="0">
+                    <a:solidFill>
+                      <a:srgbClr val="C00000"/>
+                    </a:solidFill>
+                    <a:latin typeface="Courier New" panose="02070309020205020404" pitchFamily="49" charset="0"/>
+                    <a:cs typeface="Courier New" panose="02070309020205020404" pitchFamily="49" charset="0"/>
+                  </a:rPr>
+                  <a:t>Weight</a:t>
+                </a:r>
+                <a:r>
+                  <a:rPr lang="en-US" sz="600" b="1" dirty="0" smtClean="0">
                     <a:solidFill>
                       <a:schemeClr val="accent2">
                         <a:lumMod val="50000"/>
@@ -21010,7 +21177,7 @@
                     <a:latin typeface="Courier New" panose="02070309020205020404" pitchFamily="49" charset="0"/>
                     <a:cs typeface="Courier New" panose="02070309020205020404" pitchFamily="49" charset="0"/>
                   </a:rPr>
-                  <a:t>aes</a:t>
+                  <a:t>)) </a:t>
                 </a:r>
                 <a:r>
                   <a:rPr lang="en-US" sz="600" b="1" dirty="0">
@@ -21022,63 +21189,7 @@
                     <a:latin typeface="Courier New" panose="02070309020205020404" pitchFamily="49" charset="0"/>
                     <a:cs typeface="Courier New" panose="02070309020205020404" pitchFamily="49" charset="0"/>
                   </a:rPr>
-                  <a:t>(x=</a:t>
-                </a:r>
-                <a:r>
-                  <a:rPr lang="en-US" sz="600" b="1" dirty="0" err="1">
-                    <a:solidFill>
-                      <a:srgbClr val="C00000"/>
-                    </a:solidFill>
-                    <a:latin typeface="Courier New" panose="02070309020205020404" pitchFamily="49" charset="0"/>
-                    <a:cs typeface="Courier New" panose="02070309020205020404" pitchFamily="49" charset="0"/>
-                  </a:rPr>
-                  <a:t>Weight</a:t>
-                </a:r>
-                <a:r>
-                  <a:rPr lang="en-US" sz="600" b="1" dirty="0" err="1">
-                    <a:solidFill>
-                      <a:schemeClr val="accent2">
-                        <a:lumMod val="50000"/>
-                      </a:schemeClr>
-                    </a:solidFill>
-                    <a:latin typeface="Courier New" panose="02070309020205020404" pitchFamily="49" charset="0"/>
-                    <a:cs typeface="Courier New" panose="02070309020205020404" pitchFamily="49" charset="0"/>
-                  </a:rPr>
-                  <a:t>,y</a:t>
-                </a:r>
-                <a:r>
-                  <a:rPr lang="en-US" sz="600" b="1" dirty="0">
-                    <a:solidFill>
-                      <a:schemeClr val="accent2">
-                        <a:lumMod val="50000"/>
-                      </a:schemeClr>
-                    </a:solidFill>
-                    <a:latin typeface="Courier New" panose="02070309020205020404" pitchFamily="49" charset="0"/>
-                    <a:cs typeface="Courier New" panose="02070309020205020404" pitchFamily="49" charset="0"/>
-                  </a:rPr>
-                  <a:t>=</a:t>
-                </a:r>
-                <a:r>
-                  <a:rPr lang="en-US" sz="600" b="1" dirty="0">
-                    <a:solidFill>
-                      <a:srgbClr val="C00000"/>
-                    </a:solidFill>
-                    <a:latin typeface="Courier New" panose="02070309020205020404" pitchFamily="49" charset="0"/>
-                    <a:cs typeface="Courier New" panose="02070309020205020404" pitchFamily="49" charset="0"/>
-                  </a:rPr>
-                  <a:t>HMPG</a:t>
-                </a:r>
-                <a:r>
-                  <a:rPr lang="en-US" sz="600" b="1" dirty="0">
-                    <a:solidFill>
-                      <a:schemeClr val="accent2">
-                        <a:lumMod val="50000"/>
-                      </a:schemeClr>
-                    </a:solidFill>
-                    <a:latin typeface="Courier New" panose="02070309020205020404" pitchFamily="49" charset="0"/>
-                    <a:cs typeface="Courier New" panose="02070309020205020404" pitchFamily="49" charset="0"/>
-                  </a:rPr>
-                  <a:t>)) +</a:t>
+                  <a:t>+</a:t>
                 </a:r>
               </a:p>
               <a:p>
@@ -21204,7 +21315,75 @@
                     <a:latin typeface="Courier New" panose="02070309020205020404" pitchFamily="49" charset="0"/>
                     <a:cs typeface="Courier New" panose="02070309020205020404" pitchFamily="49" charset="0"/>
                   </a:rPr>
-                  <a:t>    labs(x="</a:t>
+                  <a:t>    </a:t>
+                </a:r>
+                <a:r>
+                  <a:rPr lang="en-US" sz="600" b="1" dirty="0">
+                    <a:solidFill>
+                      <a:schemeClr val="accent2">
+                        <a:lumMod val="50000"/>
+                      </a:schemeClr>
+                    </a:solidFill>
+                    <a:latin typeface="Courier New" panose="02070309020205020404" pitchFamily="49" charset="0"/>
+                    <a:cs typeface="Courier New" panose="02070309020205020404" pitchFamily="49" charset="0"/>
+                  </a:rPr>
+                  <a:t>labs(y="</a:t>
+                </a:r>
+                <a:r>
+                  <a:rPr lang="en-US" sz="600" b="1" dirty="0">
+                    <a:solidFill>
+                      <a:srgbClr val="C00000"/>
+                    </a:solidFill>
+                    <a:latin typeface="Courier New" panose="02070309020205020404" pitchFamily="49" charset="0"/>
+                    <a:cs typeface="Courier New" panose="02070309020205020404" pitchFamily="49" charset="0"/>
+                  </a:rPr>
+                  <a:t>Highway </a:t>
+                </a:r>
+                <a:r>
+                  <a:rPr lang="en-US" sz="600" b="1" dirty="0" err="1" smtClean="0">
+                    <a:solidFill>
+                      <a:srgbClr val="C00000"/>
+                    </a:solidFill>
+                    <a:latin typeface="Courier New" panose="02070309020205020404" pitchFamily="49" charset="0"/>
+                    <a:cs typeface="Courier New" panose="02070309020205020404" pitchFamily="49" charset="0"/>
+                  </a:rPr>
+                  <a:t>MPG</a:t>
+                </a:r>
+                <a:r>
+                  <a:rPr lang="en-US" sz="600" b="1" dirty="0" err="1">
+                    <a:solidFill>
+                      <a:schemeClr val="accent2">
+                        <a:lumMod val="50000"/>
+                      </a:schemeClr>
+                    </a:solidFill>
+                    <a:latin typeface="Courier New" panose="02070309020205020404" pitchFamily="49" charset="0"/>
+                    <a:cs typeface="Courier New" panose="02070309020205020404" pitchFamily="49" charset="0"/>
+                  </a:rPr>
+                  <a:t>"</a:t>
+                </a:r>
+                <a:r>
+                  <a:rPr lang="en-US" sz="600" b="1" dirty="0" err="1" smtClean="0">
+                    <a:solidFill>
+                      <a:schemeClr val="accent2">
+                        <a:lumMod val="50000"/>
+                      </a:schemeClr>
+                    </a:solidFill>
+                    <a:latin typeface="Courier New" panose="02070309020205020404" pitchFamily="49" charset="0"/>
+                    <a:cs typeface="Courier New" panose="02070309020205020404" pitchFamily="49" charset="0"/>
+                  </a:rPr>
+                  <a:t>,x</a:t>
+                </a:r>
+                <a:r>
+                  <a:rPr lang="en-US" sz="600" b="1" dirty="0">
+                    <a:solidFill>
+                      <a:schemeClr val="accent2">
+                        <a:lumMod val="50000"/>
+                      </a:schemeClr>
+                    </a:solidFill>
+                    <a:latin typeface="Courier New" panose="02070309020205020404" pitchFamily="49" charset="0"/>
+                    <a:cs typeface="Courier New" panose="02070309020205020404" pitchFamily="49" charset="0"/>
+                  </a:rPr>
+                  <a:t>="</a:t>
                 </a:r>
                 <a:r>
                   <a:rPr lang="en-US" sz="600" b="1" dirty="0">
@@ -21227,7 +21406,7 @@
                   <a:t>lbs</a:t>
                 </a:r>
                 <a:r>
-                  <a:rPr lang="en-US" sz="600" b="1" dirty="0">
+                  <a:rPr lang="en-US" sz="600" b="1" dirty="0" smtClean="0">
                     <a:solidFill>
                       <a:srgbClr val="C00000"/>
                     </a:solidFill>
@@ -21235,6 +21414,18 @@
                     <a:cs typeface="Courier New" panose="02070309020205020404" pitchFamily="49" charset="0"/>
                   </a:rPr>
                   <a:t>)</a:t>
+                </a:r>
+                <a:r>
+                  <a:rPr lang="en-US" sz="600" b="1" dirty="0" smtClean="0">
+                    <a:solidFill>
+                      <a:schemeClr val="accent2">
+                        <a:lumMod val="50000"/>
+                      </a:schemeClr>
+                    </a:solidFill>
+                    <a:latin typeface="Courier New" panose="02070309020205020404" pitchFamily="49" charset="0"/>
+                    <a:cs typeface="Courier New" panose="02070309020205020404" pitchFamily="49" charset="0"/>
+                  </a:rPr>
+                  <a:t>") </a:t>
                 </a:r>
                 <a:r>
                   <a:rPr lang="en-US" sz="600" b="1" dirty="0">
@@ -21246,29 +21437,7 @@
                     <a:latin typeface="Courier New" panose="02070309020205020404" pitchFamily="49" charset="0"/>
                     <a:cs typeface="Courier New" panose="02070309020205020404" pitchFamily="49" charset="0"/>
                   </a:rPr>
-                  <a:t>",y="</a:t>
-                </a:r>
-                <a:r>
-                  <a:rPr lang="en-US" sz="600" b="1" dirty="0">
-                    <a:solidFill>
-                      <a:srgbClr val="C00000"/>
-                    </a:solidFill>
-                    <a:latin typeface="Courier New" panose="02070309020205020404" pitchFamily="49" charset="0"/>
-                    <a:cs typeface="Courier New" panose="02070309020205020404" pitchFamily="49" charset="0"/>
-                  </a:rPr>
-                  <a:t>Highway MPG</a:t>
-                </a:r>
-                <a:r>
-                  <a:rPr lang="en-US" sz="600" b="1" dirty="0">
-                    <a:solidFill>
-                      <a:schemeClr val="accent2">
-                        <a:lumMod val="50000"/>
-                      </a:schemeClr>
-                    </a:solidFill>
-                    <a:latin typeface="Courier New" panose="02070309020205020404" pitchFamily="49" charset="0"/>
-                    <a:cs typeface="Courier New" panose="02070309020205020404" pitchFamily="49" charset="0"/>
-                  </a:rPr>
-                  <a:t>") +</a:t>
+                  <a:t>+</a:t>
                 </a:r>
               </a:p>
               <a:p>
@@ -21385,7 +21554,7 @@
                   <a:t>="</a:t>
                 </a:r>
                 <a:r>
-                  <a:rPr lang="en-US" sz="600" b="1" dirty="0" err="1">
+                  <a:rPr lang="en-US" sz="600" b="1" dirty="0" err="1" smtClean="0">
                     <a:solidFill>
                       <a:schemeClr val="accent2">
                         <a:lumMod val="50000"/>
@@ -21397,7 +21566,7 @@
                   <a:t>lm",se</a:t>
                 </a:r>
                 <a:r>
-                  <a:rPr lang="en-US" sz="600" b="1" dirty="0">
+                  <a:rPr lang="en-US" sz="600" b="1" dirty="0" smtClean="0">
                     <a:solidFill>
                       <a:schemeClr val="accent2">
                         <a:lumMod val="50000"/>
@@ -21837,7 +22006,7 @@
             </a:ln>
             <a:extLst>
               <a:ext uri="{C572A759-6A51-4108-AA02-DFA0A04FC94B}">
-                <ma14:wrappingTextBoxFlag xmlns="" xmlns:ma14="http://schemas.microsoft.com/office/mac/drawingml/2011/main" val="1"/>
+                <ma14:wrappingTextBoxFlag xmlns:ma14="http://schemas.microsoft.com/office/mac/drawingml/2011/main" xmlns="" val="1"/>
               </a:ext>
             </a:extLst>
           </p:spPr>
@@ -22376,8 +22545,8 @@
         </p:nvSpPr>
         <p:spPr>
           <a:xfrm>
-            <a:off x="8230130" y="6639280"/>
-            <a:ext cx="813924" cy="248705"/>
+            <a:off x="8223717" y="6639280"/>
+            <a:ext cx="826749" cy="248705"/>
           </a:xfrm>
           <a:prstGeom prst="rect">
             <a:avLst/>
@@ -22449,7 +22618,7 @@
                 </a:solidFill>
                 <a:latin typeface="Calibri" panose="020F0502020204030204" pitchFamily="34" charset="0"/>
               </a:rPr>
-              <a:t>Oct</a:t>
+              <a:t>Dec</a:t>
             </a:r>
             <a:r>
               <a:rPr kumimoji="0" lang="en-US" sz="900" b="0" i="0" u="none" strike="noStrike" cap="none" spc="0" normalizeH="0" baseline="0" dirty="0" smtClean="0">
@@ -22873,7 +23042,29 @@
                   <a:latin typeface="Courier New" panose="02070309020205020404" pitchFamily="49" charset="0"/>
                   <a:cs typeface="Courier New" panose="02070309020205020404" pitchFamily="49" charset="0"/>
                 </a:rPr>
-                <a:t>=3,boundary=0,</a:t>
+                <a:t>=</a:t>
+              </a:r>
+              <a:r>
+                <a:rPr lang="en-US" sz="600" b="1" dirty="0">
+                  <a:solidFill>
+                    <a:srgbClr val="C00000"/>
+                  </a:solidFill>
+                  <a:latin typeface="Courier New" panose="02070309020205020404" pitchFamily="49" charset="0"/>
+                  <a:cs typeface="Courier New" panose="02070309020205020404" pitchFamily="49" charset="0"/>
+                </a:rPr>
+                <a:t>3</a:t>
+              </a:r>
+              <a:r>
+                <a:rPr lang="en-US" sz="600" b="1" dirty="0">
+                  <a:solidFill>
+                    <a:schemeClr val="accent2">
+                      <a:lumMod val="50000"/>
+                    </a:schemeClr>
+                  </a:solidFill>
+                  <a:latin typeface="Courier New" panose="02070309020205020404" pitchFamily="49" charset="0"/>
+                  <a:cs typeface="Courier New" panose="02070309020205020404" pitchFamily="49" charset="0"/>
+                </a:rPr>
+                <a:t>,boundary=0,</a:t>
               </a:r>
             </a:p>
             <a:p>
@@ -22951,17 +23142,19 @@
                   <a:latin typeface="Courier New" panose="02070309020205020404" pitchFamily="49" charset="0"/>
                   <a:cs typeface="Courier New" panose="02070309020205020404" pitchFamily="49" charset="0"/>
                 </a:rPr>
-                <a:t>    labs(x="</a:t>
+                <a:t>    </a:t>
               </a:r>
               <a:r>
                 <a:rPr lang="en-US" sz="600" b="1" dirty="0">
                   <a:solidFill>
-                    <a:srgbClr val="C00000"/>
-                  </a:solidFill>
-                  <a:latin typeface="Courier New" panose="02070309020205020404" pitchFamily="49" charset="0"/>
-                  <a:cs typeface="Courier New" panose="02070309020205020404" pitchFamily="49" charset="0"/>
-                </a:rPr>
-                <a:t>Highway </a:t>
+                    <a:schemeClr val="accent2">
+                      <a:lumMod val="50000"/>
+                    </a:schemeClr>
+                  </a:solidFill>
+                  <a:latin typeface="Courier New" panose="02070309020205020404" pitchFamily="49" charset="0"/>
+                  <a:cs typeface="Courier New" panose="02070309020205020404" pitchFamily="49" charset="0"/>
+                </a:rPr>
+                <a:t>labs(y="Frequency of </a:t>
               </a:r>
               <a:r>
                 <a:rPr lang="en-US" sz="600" b="1" dirty="0" err="1">
@@ -22971,7 +23164,19 @@
                   <a:latin typeface="Courier New" panose="02070309020205020404" pitchFamily="49" charset="0"/>
                   <a:cs typeface="Courier New" panose="02070309020205020404" pitchFamily="49" charset="0"/>
                 </a:rPr>
-                <a:t>MPG</a:t>
+                <a:t>Cars</a:t>
+              </a:r>
+              <a:r>
+                <a:rPr lang="en-US" sz="600" b="1" dirty="0" err="1" smtClean="0">
+                  <a:solidFill>
+                    <a:schemeClr val="accent2">
+                      <a:lumMod val="50000"/>
+                    </a:schemeClr>
+                  </a:solidFill>
+                  <a:latin typeface="Courier New" panose="02070309020205020404" pitchFamily="49" charset="0"/>
+                  <a:cs typeface="Courier New" panose="02070309020205020404" pitchFamily="49" charset="0"/>
+                </a:rPr>
+                <a:t>"</a:t>
               </a:r>
               <a:r>
                 <a:rPr lang="en-US" sz="600" b="1" dirty="0" err="1">
@@ -22983,7 +23188,19 @@
                   <a:latin typeface="Courier New" panose="02070309020205020404" pitchFamily="49" charset="0"/>
                   <a:cs typeface="Courier New" panose="02070309020205020404" pitchFamily="49" charset="0"/>
                 </a:rPr>
-                <a:t>",y</a:t>
+                <a:t>,</a:t>
+              </a:r>
+              <a:r>
+                <a:rPr lang="en-US" sz="600" b="1" dirty="0" err="1" smtClean="0">
+                  <a:solidFill>
+                    <a:schemeClr val="accent2">
+                      <a:lumMod val="50000"/>
+                    </a:schemeClr>
+                  </a:solidFill>
+                  <a:latin typeface="Courier New" panose="02070309020205020404" pitchFamily="49" charset="0"/>
+                  <a:cs typeface="Courier New" panose="02070309020205020404" pitchFamily="49" charset="0"/>
+                </a:rPr>
+                <a:t>x</a:t>
               </a:r>
               <a:r>
                 <a:rPr lang="en-US" sz="600" b="1" dirty="0">
@@ -23005,7 +23222,19 @@
                   <a:latin typeface="Courier New" panose="02070309020205020404" pitchFamily="49" charset="0"/>
                   <a:cs typeface="Courier New" panose="02070309020205020404" pitchFamily="49" charset="0"/>
                 </a:rPr>
-                <a:t>Frequency of Cars</a:t>
+                <a:t>Highway MPG</a:t>
+              </a:r>
+              <a:r>
+                <a:rPr lang="en-US" sz="600" b="1" dirty="0" smtClean="0">
+                  <a:solidFill>
+                    <a:schemeClr val="accent2">
+                      <a:lumMod val="50000"/>
+                    </a:schemeClr>
+                  </a:solidFill>
+                  <a:latin typeface="Courier New" panose="02070309020205020404" pitchFamily="49" charset="0"/>
+                  <a:cs typeface="Courier New" panose="02070309020205020404" pitchFamily="49" charset="0"/>
+                </a:rPr>
+                <a:t>") </a:t>
               </a:r>
               <a:r>
                 <a:rPr lang="en-US" sz="600" b="1" dirty="0">
@@ -23017,7 +23246,7 @@
                   <a:latin typeface="Courier New" panose="02070309020205020404" pitchFamily="49" charset="0"/>
                   <a:cs typeface="Courier New" panose="02070309020205020404" pitchFamily="49" charset="0"/>
                 </a:rPr>
-                <a:t>") +</a:t>
+                <a:t>+</a:t>
               </a:r>
             </a:p>
             <a:p>
@@ -24009,7 +24238,7 @@
             </a:ln>
             <a:extLst>
               <a:ext uri="{C572A759-6A51-4108-AA02-DFA0A04FC94B}">
-                <ma14:wrappingTextBoxFlag xmlns="" xmlns:ma14="http://schemas.microsoft.com/office/mac/drawingml/2011/main" val="1"/>
+                <ma14:wrappingTextBoxFlag xmlns:ma14="http://schemas.microsoft.com/office/mac/drawingml/2011/main" xmlns="" val="1"/>
               </a:ext>
             </a:extLst>
           </p:spPr>
@@ -24208,7 +24437,7 @@
                 <a:t>,alt=</a:t>
               </a:r>
               <a:r>
-                <a:rPr lang="en-US" sz="800" dirty="0" smtClean="0">
+                <a:rPr lang="en-US" sz="800" dirty="0" err="1" smtClean="0">
                   <a:solidFill>
                     <a:srgbClr val="C00000"/>
                   </a:solidFill>
@@ -24217,17 +24446,6 @@
                 <a:t>HA</a:t>
               </a:r>
               <a:r>
-                <a:rPr lang="en-US" sz="800" dirty="0" smtClean="0">
-                  <a:solidFill>
-                    <a:schemeClr val="accent2">
-                      <a:lumMod val="50000"/>
-                    </a:schemeClr>
-                  </a:solidFill>
-                  <a:latin typeface="Calibri" panose="020F0502020204030204" pitchFamily="34" charset="0"/>
-                </a:rPr>
-                <a:t>, </a:t>
-              </a:r>
-              <a:r>
                 <a:rPr lang="en-US" sz="800" dirty="0" err="1" smtClean="0">
                   <a:solidFill>
                     <a:schemeClr val="accent2">
@@ -24236,7 +24454,7 @@
                   </a:solidFill>
                   <a:latin typeface="Calibri" panose="020F0502020204030204" pitchFamily="34" charset="0"/>
                 </a:rPr>
-                <a:t>conf.level</a:t>
+                <a:t>,conf.level</a:t>
               </a:r>
               <a:r>
                 <a:rPr lang="en-US" sz="800" dirty="0" smtClean="0">
@@ -25889,7 +26107,7 @@
             </a:ln>
             <a:extLst>
               <a:ext uri="{C572A759-6A51-4108-AA02-DFA0A04FC94B}">
-                <ma14:wrappingTextBoxFlag xmlns="" xmlns:ma14="http://schemas.microsoft.com/office/mac/drawingml/2011/main" val="1"/>
+                <ma14:wrappingTextBoxFlag xmlns:ma14="http://schemas.microsoft.com/office/mac/drawingml/2011/main" xmlns="" val="1"/>
               </a:ext>
             </a:extLst>
           </p:spPr>
@@ -26203,7 +26421,29 @@
                   <a:latin typeface="Courier New" panose="02070309020205020404" pitchFamily="49" charset="0"/>
                   <a:cs typeface="Courier New" panose="02070309020205020404" pitchFamily="49" charset="0"/>
                 </a:rPr>
-                <a:t>=3,boundary=0,</a:t>
+                <a:t>=</a:t>
+              </a:r>
+              <a:r>
+                <a:rPr lang="en-US" sz="600" b="1" dirty="0">
+                  <a:solidFill>
+                    <a:srgbClr val="C00000"/>
+                  </a:solidFill>
+                  <a:latin typeface="Courier New" panose="02070309020205020404" pitchFamily="49" charset="0"/>
+                  <a:cs typeface="Courier New" panose="02070309020205020404" pitchFamily="49" charset="0"/>
+                </a:rPr>
+                <a:t>3</a:t>
+              </a:r>
+              <a:r>
+                <a:rPr lang="en-US" sz="600" b="1" dirty="0">
+                  <a:solidFill>
+                    <a:schemeClr val="accent2">
+                      <a:lumMod val="50000"/>
+                    </a:schemeClr>
+                  </a:solidFill>
+                  <a:latin typeface="Courier New" panose="02070309020205020404" pitchFamily="49" charset="0"/>
+                  <a:cs typeface="Courier New" panose="02070309020205020404" pitchFamily="49" charset="0"/>
+                </a:rPr>
+                <a:t>,boundary=0,</a:t>
               </a:r>
             </a:p>
             <a:p>
@@ -26281,17 +26521,19 @@
                   <a:latin typeface="Courier New" panose="02070309020205020404" pitchFamily="49" charset="0"/>
                   <a:cs typeface="Courier New" panose="02070309020205020404" pitchFamily="49" charset="0"/>
                 </a:rPr>
-                <a:t>    labs(x="</a:t>
+                <a:t>    </a:t>
               </a:r>
               <a:r>
                 <a:rPr lang="en-US" sz="600" b="1" dirty="0">
                   <a:solidFill>
-                    <a:srgbClr val="C00000"/>
-                  </a:solidFill>
-                  <a:latin typeface="Courier New" panose="02070309020205020404" pitchFamily="49" charset="0"/>
-                  <a:cs typeface="Courier New" panose="02070309020205020404" pitchFamily="49" charset="0"/>
-                </a:rPr>
-                <a:t>Highway </a:t>
+                    <a:schemeClr val="accent2">
+                      <a:lumMod val="50000"/>
+                    </a:schemeClr>
+                  </a:solidFill>
+                  <a:latin typeface="Courier New" panose="02070309020205020404" pitchFamily="49" charset="0"/>
+                  <a:cs typeface="Courier New" panose="02070309020205020404" pitchFamily="49" charset="0"/>
+                </a:rPr>
+                <a:t>labs(y="Frequency of </a:t>
               </a:r>
               <a:r>
                 <a:rPr lang="en-US" sz="600" b="1" dirty="0" err="1">
@@ -26301,7 +26543,19 @@
                   <a:latin typeface="Courier New" panose="02070309020205020404" pitchFamily="49" charset="0"/>
                   <a:cs typeface="Courier New" panose="02070309020205020404" pitchFamily="49" charset="0"/>
                 </a:rPr>
-                <a:t>MPG</a:t>
+                <a:t>Cars</a:t>
+              </a:r>
+              <a:r>
+                <a:rPr lang="en-US" sz="600" b="1" dirty="0" err="1" smtClean="0">
+                  <a:solidFill>
+                    <a:schemeClr val="accent2">
+                      <a:lumMod val="50000"/>
+                    </a:schemeClr>
+                  </a:solidFill>
+                  <a:latin typeface="Courier New" panose="02070309020205020404" pitchFamily="49" charset="0"/>
+                  <a:cs typeface="Courier New" panose="02070309020205020404" pitchFamily="49" charset="0"/>
+                </a:rPr>
+                <a:t>"</a:t>
               </a:r>
               <a:r>
                 <a:rPr lang="en-US" sz="600" b="1" dirty="0" err="1">
@@ -26313,7 +26567,19 @@
                   <a:latin typeface="Courier New" panose="02070309020205020404" pitchFamily="49" charset="0"/>
                   <a:cs typeface="Courier New" panose="02070309020205020404" pitchFamily="49" charset="0"/>
                 </a:rPr>
-                <a:t>",y</a:t>
+                <a:t>,</a:t>
+              </a:r>
+              <a:r>
+                <a:rPr lang="en-US" sz="600" b="1" dirty="0" err="1" smtClean="0">
+                  <a:solidFill>
+                    <a:schemeClr val="accent2">
+                      <a:lumMod val="50000"/>
+                    </a:schemeClr>
+                  </a:solidFill>
+                  <a:latin typeface="Courier New" panose="02070309020205020404" pitchFamily="49" charset="0"/>
+                  <a:cs typeface="Courier New" panose="02070309020205020404" pitchFamily="49" charset="0"/>
+                </a:rPr>
+                <a:t>x</a:t>
               </a:r>
               <a:r>
                 <a:rPr lang="en-US" sz="600" b="1" dirty="0">
@@ -26335,7 +26601,19 @@
                   <a:latin typeface="Courier New" panose="02070309020205020404" pitchFamily="49" charset="0"/>
                   <a:cs typeface="Courier New" panose="02070309020205020404" pitchFamily="49" charset="0"/>
                 </a:rPr>
-                <a:t>Frequency of Cars</a:t>
+                <a:t>Highway MPG</a:t>
+              </a:r>
+              <a:r>
+                <a:rPr lang="en-US" sz="600" b="1" dirty="0" smtClean="0">
+                  <a:solidFill>
+                    <a:schemeClr val="accent2">
+                      <a:lumMod val="50000"/>
+                    </a:schemeClr>
+                  </a:solidFill>
+                  <a:latin typeface="Courier New" panose="02070309020205020404" pitchFamily="49" charset="0"/>
+                  <a:cs typeface="Courier New" panose="02070309020205020404" pitchFamily="49" charset="0"/>
+                </a:rPr>
+                <a:t>") </a:t>
               </a:r>
               <a:r>
                 <a:rPr lang="en-US" sz="600" b="1" dirty="0">
@@ -26347,7 +26625,7 @@
                   <a:latin typeface="Courier New" panose="02070309020205020404" pitchFamily="49" charset="0"/>
                   <a:cs typeface="Courier New" panose="02070309020205020404" pitchFamily="49" charset="0"/>
                 </a:rPr>
-                <a:t>") +</a:t>
+                <a:t>+</a:t>
               </a:r>
             </a:p>
             <a:p>
@@ -27504,7 +27782,7 @@
             </a:ln>
             <a:extLst>
               <a:ext uri="{C572A759-6A51-4108-AA02-DFA0A04FC94B}">
-                <ma14:wrappingTextBoxFlag xmlns="" xmlns:ma14="http://schemas.microsoft.com/office/mac/drawingml/2011/main" val="1"/>
+                <ma14:wrappingTextBoxFlag xmlns:ma14="http://schemas.microsoft.com/office/mac/drawingml/2011/main" xmlns="" val="1"/>
               </a:ext>
             </a:extLst>
           </p:spPr>
@@ -31269,7 +31547,7 @@
             </a:ln>
             <a:extLst>
               <a:ext uri="{C572A759-6A51-4108-AA02-DFA0A04FC94B}">
-                <ma14:wrappingTextBoxFlag xmlns="" xmlns:ma14="http://schemas.microsoft.com/office/mac/drawingml/2011/main" val="1"/>
+                <ma14:wrappingTextBoxFlag xmlns:ma14="http://schemas.microsoft.com/office/mac/drawingml/2011/main" xmlns="" val="1"/>
               </a:ext>
             </a:extLst>
           </p:spPr>
@@ -33007,8 +33285,8 @@
         </p:nvSpPr>
         <p:spPr>
           <a:xfrm>
-            <a:off x="8230129" y="6639280"/>
-            <a:ext cx="813925" cy="248705"/>
+            <a:off x="8223717" y="6639280"/>
+            <a:ext cx="826749" cy="248705"/>
           </a:xfrm>
           <a:prstGeom prst="rect">
             <a:avLst/>
@@ -33080,7 +33358,7 @@
                 </a:solidFill>
                 <a:latin typeface="Calibri" panose="020F0502020204030204" pitchFamily="34" charset="0"/>
               </a:rPr>
-              <a:t>Oct</a:t>
+              <a:t>Dec</a:t>
             </a:r>
             <a:r>
               <a:rPr kumimoji="0" lang="en-US" sz="900" b="0" i="0" u="none" strike="noStrike" cap="none" spc="0" normalizeH="0" baseline="0" dirty="0" smtClean="0">

</xml_diff>